<commit_message>
add flow chart image
</commit_message>
<xml_diff>
--- a/structure_flow.pptx
+++ b/structure_flow.pptx
@@ -4760,6 +4760,3277 @@
           <a:chExt cx="0" cy="0"/>
         </a:xfrm>
       </p:grpSpPr>
+      <p:grpSp>
+        <p:nvGrpSpPr>
+          <p:cNvPr id="234" name="Group 233"/>
+          <p:cNvGrpSpPr/>
+          <p:nvPr/>
+        </p:nvGrpSpPr>
+        <p:grpSpPr>
+          <a:xfrm>
+            <a:off x="-963869" y="-7827866"/>
+            <a:ext cx="8173719" cy="13892802"/>
+            <a:chOff x="-963869" y="-7827866"/>
+            <a:chExt cx="8173719" cy="13892802"/>
+          </a:xfrm>
+        </p:grpSpPr>
+        <p:sp>
+          <p:nvSpPr>
+            <p:cNvPr id="5" name="Terminator 4"/>
+            <p:cNvSpPr/>
+            <p:nvPr/>
+          </p:nvSpPr>
+          <p:spPr>
+            <a:xfrm>
+              <a:off x="2984889" y="-7827866"/>
+              <a:ext cx="1007755" cy="393077"/>
+            </a:xfrm>
+            <a:prstGeom prst="flowChartTerminator">
+              <a:avLst/>
+            </a:prstGeom>
+            <a:solidFill>
+              <a:schemeClr val="tx2"/>
+            </a:solidFill>
+            <a:ln>
+              <a:noFill/>
+            </a:ln>
+            <a:effectLst/>
+          </p:spPr>
+          <p:style>
+            <a:lnRef idx="1">
+              <a:schemeClr val="accent1"/>
+            </a:lnRef>
+            <a:fillRef idx="3">
+              <a:schemeClr val="accent1"/>
+            </a:fillRef>
+            <a:effectRef idx="2">
+              <a:schemeClr val="accent1"/>
+            </a:effectRef>
+            <a:fontRef idx="minor">
+              <a:schemeClr val="lt1"/>
+            </a:fontRef>
+          </p:style>
+          <p:txBody>
+            <a:bodyPr rtlCol="0" anchor="ctr">
+              <a:normAutofit fontScale="92500" lnSpcReduction="10000"/>
+            </a:bodyPr>
+            <a:lstStyle/>
+            <a:p>
+              <a:pPr algn="ctr"/>
+              <a:r>
+                <a:rPr lang="en-US" sz="1400" dirty="0" smtClean="0"/>
+                <a:t>start</a:t>
+              </a:r>
+              <a:endParaRPr lang="en-US" sz="1400" dirty="0"/>
+            </a:p>
+          </p:txBody>
+        </p:sp>
+        <p:sp>
+          <p:nvSpPr>
+            <p:cNvPr id="6" name="Process 5"/>
+            <p:cNvSpPr/>
+            <p:nvPr/>
+          </p:nvSpPr>
+          <p:spPr>
+            <a:xfrm>
+              <a:off x="2524898" y="-7189889"/>
+              <a:ext cx="1927738" cy="393077"/>
+            </a:xfrm>
+            <a:prstGeom prst="flowChartProcess">
+              <a:avLst/>
+            </a:prstGeom>
+            <a:solidFill>
+              <a:srgbClr val="1F497D"/>
+            </a:solidFill>
+            <a:ln>
+              <a:noFill/>
+            </a:ln>
+            <a:effectLst/>
+          </p:spPr>
+          <p:style>
+            <a:lnRef idx="1">
+              <a:schemeClr val="accent1"/>
+            </a:lnRef>
+            <a:fillRef idx="3">
+              <a:schemeClr val="accent1"/>
+            </a:fillRef>
+            <a:effectRef idx="2">
+              <a:schemeClr val="accent1"/>
+            </a:effectRef>
+            <a:fontRef idx="minor">
+              <a:schemeClr val="lt1"/>
+            </a:fontRef>
+          </p:style>
+          <p:txBody>
+            <a:bodyPr rtlCol="0" anchor="ctr"/>
+            <a:lstStyle/>
+            <a:p>
+              <a:pPr algn="ctr"/>
+              <a:r>
+                <a:rPr lang="en-US" sz="1400" dirty="0" smtClean="0"/>
+                <a:t>Read input arguments</a:t>
+              </a:r>
+              <a:endParaRPr lang="en-US" sz="1400" dirty="0"/>
+            </a:p>
+          </p:txBody>
+        </p:sp>
+        <p:sp>
+          <p:nvSpPr>
+            <p:cNvPr id="8" name="Decision 7"/>
+            <p:cNvSpPr/>
+            <p:nvPr/>
+          </p:nvSpPr>
+          <p:spPr>
+            <a:xfrm>
+              <a:off x="2524898" y="-6536033"/>
+              <a:ext cx="1927738" cy="800922"/>
+            </a:xfrm>
+            <a:prstGeom prst="flowChartDecision">
+              <a:avLst/>
+            </a:prstGeom>
+            <a:solidFill>
+              <a:srgbClr val="1F497D"/>
+            </a:solidFill>
+            <a:ln>
+              <a:noFill/>
+            </a:ln>
+            <a:effectLst/>
+          </p:spPr>
+          <p:style>
+            <a:lnRef idx="1">
+              <a:schemeClr val="accent1"/>
+            </a:lnRef>
+            <a:fillRef idx="3">
+              <a:schemeClr val="accent1"/>
+            </a:fillRef>
+            <a:effectRef idx="2">
+              <a:schemeClr val="accent1"/>
+            </a:effectRef>
+            <a:fontRef idx="minor">
+              <a:schemeClr val="lt1"/>
+            </a:fontRef>
+          </p:style>
+          <p:txBody>
+            <a:bodyPr rtlCol="0" anchor="ctr"/>
+            <a:lstStyle/>
+            <a:p>
+              <a:pPr algn="ctr"/>
+              <a:r>
+                <a:rPr lang="en-US" sz="1400" dirty="0" smtClean="0"/>
+                <a:t>Are inputs valid?</a:t>
+              </a:r>
+              <a:endParaRPr lang="en-US" sz="1400" dirty="0"/>
+            </a:p>
+          </p:txBody>
+        </p:sp>
+        <p:cxnSp>
+          <p:nvCxnSpPr>
+            <p:cNvPr id="10" name="Straight Arrow Connector 9"/>
+            <p:cNvCxnSpPr>
+              <a:stCxn id="5" idx="2"/>
+              <a:endCxn id="6" idx="0"/>
+            </p:cNvCxnSpPr>
+            <p:nvPr/>
+          </p:nvCxnSpPr>
+          <p:spPr>
+            <a:xfrm>
+              <a:off x="3488767" y="-7434789"/>
+              <a:ext cx="0" cy="244900"/>
+            </a:xfrm>
+            <a:prstGeom prst="straightConnector1">
+              <a:avLst/>
+            </a:prstGeom>
+            <a:ln>
+              <a:solidFill>
+                <a:schemeClr val="tx2"/>
+              </a:solidFill>
+              <a:tailEnd type="arrow"/>
+            </a:ln>
+            <a:effectLst/>
+          </p:spPr>
+          <p:style>
+            <a:lnRef idx="2">
+              <a:schemeClr val="accent1"/>
+            </a:lnRef>
+            <a:fillRef idx="0">
+              <a:schemeClr val="accent1"/>
+            </a:fillRef>
+            <a:effectRef idx="1">
+              <a:schemeClr val="accent1"/>
+            </a:effectRef>
+            <a:fontRef idx="minor">
+              <a:schemeClr val="tx1"/>
+            </a:fontRef>
+          </p:style>
+        </p:cxnSp>
+        <p:cxnSp>
+          <p:nvCxnSpPr>
+            <p:cNvPr id="12" name="Straight Arrow Connector 11"/>
+            <p:cNvCxnSpPr>
+              <a:stCxn id="6" idx="2"/>
+              <a:endCxn id="8" idx="0"/>
+            </p:cNvCxnSpPr>
+            <p:nvPr/>
+          </p:nvCxnSpPr>
+          <p:spPr>
+            <a:xfrm>
+              <a:off x="3488767" y="-6796812"/>
+              <a:ext cx="0" cy="260779"/>
+            </a:xfrm>
+            <a:prstGeom prst="straightConnector1">
+              <a:avLst/>
+            </a:prstGeom>
+            <a:ln>
+              <a:solidFill>
+                <a:schemeClr val="tx2"/>
+              </a:solidFill>
+              <a:tailEnd type="arrow"/>
+            </a:ln>
+            <a:effectLst/>
+          </p:spPr>
+          <p:style>
+            <a:lnRef idx="2">
+              <a:schemeClr val="accent1"/>
+            </a:lnRef>
+            <a:fillRef idx="0">
+              <a:schemeClr val="accent1"/>
+            </a:fillRef>
+            <a:effectRef idx="1">
+              <a:schemeClr val="accent1"/>
+            </a:effectRef>
+            <a:fontRef idx="minor">
+              <a:schemeClr val="tx1"/>
+            </a:fontRef>
+          </p:style>
+        </p:cxnSp>
+        <p:sp>
+          <p:nvSpPr>
+            <p:cNvPr id="15" name="Terminator 14"/>
+            <p:cNvSpPr/>
+            <p:nvPr/>
+          </p:nvSpPr>
+          <p:spPr>
+            <a:xfrm>
+              <a:off x="4618889" y="-5821207"/>
+              <a:ext cx="1007755" cy="393077"/>
+            </a:xfrm>
+            <a:prstGeom prst="flowChartTerminator">
+              <a:avLst/>
+            </a:prstGeom>
+            <a:solidFill>
+              <a:schemeClr val="tx2"/>
+            </a:solidFill>
+            <a:ln>
+              <a:noFill/>
+            </a:ln>
+            <a:effectLst/>
+          </p:spPr>
+          <p:style>
+            <a:lnRef idx="1">
+              <a:schemeClr val="accent1"/>
+            </a:lnRef>
+            <a:fillRef idx="3">
+              <a:schemeClr val="accent1"/>
+            </a:fillRef>
+            <a:effectRef idx="2">
+              <a:schemeClr val="accent1"/>
+            </a:effectRef>
+            <a:fontRef idx="minor">
+              <a:schemeClr val="lt1"/>
+            </a:fontRef>
+          </p:style>
+          <p:txBody>
+            <a:bodyPr rtlCol="0" anchor="ctr">
+              <a:normAutofit fontScale="92500" lnSpcReduction="10000"/>
+            </a:bodyPr>
+            <a:lstStyle/>
+            <a:p>
+              <a:pPr algn="ctr"/>
+              <a:r>
+                <a:rPr lang="en-US" sz="1400" dirty="0" smtClean="0"/>
+                <a:t>Exit failure</a:t>
+              </a:r>
+              <a:endParaRPr lang="en-US" sz="1400" dirty="0"/>
+            </a:p>
+          </p:txBody>
+        </p:sp>
+        <p:cxnSp>
+          <p:nvCxnSpPr>
+            <p:cNvPr id="17" name="Elbow Connector 16"/>
+            <p:cNvCxnSpPr>
+              <a:stCxn id="8" idx="3"/>
+              <a:endCxn id="15" idx="0"/>
+            </p:cNvCxnSpPr>
+            <p:nvPr/>
+          </p:nvCxnSpPr>
+          <p:spPr>
+            <a:xfrm>
+              <a:off x="4452636" y="-6135572"/>
+              <a:ext cx="670131" cy="314365"/>
+            </a:xfrm>
+            <a:prstGeom prst="bentConnector2">
+              <a:avLst/>
+            </a:prstGeom>
+            <a:ln>
+              <a:solidFill>
+                <a:srgbClr val="1F497D"/>
+              </a:solidFill>
+              <a:tailEnd type="arrow"/>
+            </a:ln>
+            <a:effectLst/>
+          </p:spPr>
+          <p:style>
+            <a:lnRef idx="2">
+              <a:schemeClr val="accent1"/>
+            </a:lnRef>
+            <a:fillRef idx="0">
+              <a:schemeClr val="accent1"/>
+            </a:fillRef>
+            <a:effectRef idx="1">
+              <a:schemeClr val="accent1"/>
+            </a:effectRef>
+            <a:fontRef idx="minor">
+              <a:schemeClr val="tx1"/>
+            </a:fontRef>
+          </p:style>
+        </p:cxnSp>
+        <p:sp>
+          <p:nvSpPr>
+            <p:cNvPr id="18" name="Process 17"/>
+            <p:cNvSpPr/>
+            <p:nvPr/>
+          </p:nvSpPr>
+          <p:spPr>
+            <a:xfrm>
+              <a:off x="1148950" y="-5821207"/>
+              <a:ext cx="1927738" cy="393077"/>
+            </a:xfrm>
+            <a:prstGeom prst="flowChartProcess">
+              <a:avLst/>
+            </a:prstGeom>
+            <a:solidFill>
+              <a:srgbClr val="1F497D"/>
+            </a:solidFill>
+            <a:ln>
+              <a:noFill/>
+            </a:ln>
+            <a:effectLst/>
+          </p:spPr>
+          <p:style>
+            <a:lnRef idx="1">
+              <a:schemeClr val="accent1"/>
+            </a:lnRef>
+            <a:fillRef idx="3">
+              <a:schemeClr val="accent1"/>
+            </a:fillRef>
+            <a:effectRef idx="2">
+              <a:schemeClr val="accent1"/>
+            </a:effectRef>
+            <a:fontRef idx="minor">
+              <a:schemeClr val="lt1"/>
+            </a:fontRef>
+          </p:style>
+          <p:txBody>
+            <a:bodyPr rtlCol="0" anchor="ctr"/>
+            <a:lstStyle/>
+            <a:p>
+              <a:pPr algn="ctr"/>
+              <a:r>
+                <a:rPr lang="en-US" sz="1400" dirty="0" smtClean="0"/>
+                <a:t>Open files</a:t>
+              </a:r>
+              <a:endParaRPr lang="en-US" sz="1400" dirty="0"/>
+            </a:p>
+          </p:txBody>
+        </p:sp>
+        <p:cxnSp>
+          <p:nvCxnSpPr>
+            <p:cNvPr id="19" name="Elbow Connector 18"/>
+            <p:cNvCxnSpPr>
+              <a:stCxn id="8" idx="1"/>
+              <a:endCxn id="18" idx="0"/>
+            </p:cNvCxnSpPr>
+            <p:nvPr/>
+          </p:nvCxnSpPr>
+          <p:spPr>
+            <a:xfrm rot="10800000" flipV="1">
+              <a:off x="2112820" y="-6135573"/>
+              <a:ext cx="412079" cy="314365"/>
+            </a:xfrm>
+            <a:prstGeom prst="bentConnector2">
+              <a:avLst/>
+            </a:prstGeom>
+            <a:ln>
+              <a:solidFill>
+                <a:srgbClr val="1F497D"/>
+              </a:solidFill>
+              <a:tailEnd type="arrow"/>
+            </a:ln>
+            <a:effectLst/>
+          </p:spPr>
+          <p:style>
+            <a:lnRef idx="2">
+              <a:schemeClr val="accent1"/>
+            </a:lnRef>
+            <a:fillRef idx="0">
+              <a:schemeClr val="accent1"/>
+            </a:fillRef>
+            <a:effectRef idx="1">
+              <a:schemeClr val="accent1"/>
+            </a:effectRef>
+            <a:fontRef idx="minor">
+              <a:schemeClr val="tx1"/>
+            </a:fontRef>
+          </p:style>
+        </p:cxnSp>
+        <p:sp>
+          <p:nvSpPr>
+            <p:cNvPr id="24" name="Decision 23"/>
+            <p:cNvSpPr/>
+            <p:nvPr/>
+          </p:nvSpPr>
+          <p:spPr>
+            <a:xfrm>
+              <a:off x="1148950" y="-5216867"/>
+              <a:ext cx="1927738" cy="800922"/>
+            </a:xfrm>
+            <a:prstGeom prst="flowChartDecision">
+              <a:avLst/>
+            </a:prstGeom>
+            <a:solidFill>
+              <a:srgbClr val="1F497D"/>
+            </a:solidFill>
+            <a:ln>
+              <a:noFill/>
+            </a:ln>
+            <a:effectLst/>
+          </p:spPr>
+          <p:style>
+            <a:lnRef idx="1">
+              <a:schemeClr val="accent1"/>
+            </a:lnRef>
+            <a:fillRef idx="3">
+              <a:schemeClr val="accent1"/>
+            </a:fillRef>
+            <a:effectRef idx="2">
+              <a:schemeClr val="accent1"/>
+            </a:effectRef>
+            <a:fontRef idx="minor">
+              <a:schemeClr val="lt1"/>
+            </a:fontRef>
+          </p:style>
+          <p:txBody>
+            <a:bodyPr rtlCol="0" anchor="ctr"/>
+            <a:lstStyle/>
+            <a:p>
+              <a:pPr algn="ctr"/>
+              <a:r>
+                <a:rPr lang="en-US" sz="1400" dirty="0" smtClean="0"/>
+                <a:t>Success?</a:t>
+              </a:r>
+              <a:endParaRPr lang="en-US" sz="1400" dirty="0"/>
+            </a:p>
+          </p:txBody>
+        </p:sp>
+        <p:cxnSp>
+          <p:nvCxnSpPr>
+            <p:cNvPr id="25" name="Straight Arrow Connector 24"/>
+            <p:cNvCxnSpPr>
+              <a:stCxn id="18" idx="2"/>
+              <a:endCxn id="24" idx="0"/>
+            </p:cNvCxnSpPr>
+            <p:nvPr/>
+          </p:nvCxnSpPr>
+          <p:spPr>
+            <a:xfrm>
+              <a:off x="2112819" y="-5428130"/>
+              <a:ext cx="0" cy="211263"/>
+            </a:xfrm>
+            <a:prstGeom prst="straightConnector1">
+              <a:avLst/>
+            </a:prstGeom>
+            <a:ln>
+              <a:solidFill>
+                <a:schemeClr val="tx2"/>
+              </a:solidFill>
+              <a:tailEnd type="arrow"/>
+            </a:ln>
+            <a:effectLst/>
+          </p:spPr>
+          <p:style>
+            <a:lnRef idx="2">
+              <a:schemeClr val="accent1"/>
+            </a:lnRef>
+            <a:fillRef idx="0">
+              <a:schemeClr val="accent1"/>
+            </a:fillRef>
+            <a:effectRef idx="1">
+              <a:schemeClr val="accent1"/>
+            </a:effectRef>
+            <a:fontRef idx="minor">
+              <a:schemeClr val="tx1"/>
+            </a:fontRef>
+          </p:style>
+        </p:cxnSp>
+        <p:sp>
+          <p:nvSpPr>
+            <p:cNvPr id="28" name="Terminator 27"/>
+            <p:cNvSpPr/>
+            <p:nvPr/>
+          </p:nvSpPr>
+          <p:spPr>
+            <a:xfrm>
+              <a:off x="285783" y="-4523565"/>
+              <a:ext cx="1007755" cy="393077"/>
+            </a:xfrm>
+            <a:prstGeom prst="flowChartTerminator">
+              <a:avLst/>
+            </a:prstGeom>
+            <a:solidFill>
+              <a:schemeClr val="tx2"/>
+            </a:solidFill>
+            <a:ln>
+              <a:noFill/>
+            </a:ln>
+            <a:effectLst/>
+          </p:spPr>
+          <p:style>
+            <a:lnRef idx="1">
+              <a:schemeClr val="accent1"/>
+            </a:lnRef>
+            <a:fillRef idx="3">
+              <a:schemeClr val="accent1"/>
+            </a:fillRef>
+            <a:effectRef idx="2">
+              <a:schemeClr val="accent1"/>
+            </a:effectRef>
+            <a:fontRef idx="minor">
+              <a:schemeClr val="lt1"/>
+            </a:fontRef>
+          </p:style>
+          <p:txBody>
+            <a:bodyPr rtlCol="0" anchor="ctr">
+              <a:normAutofit fontScale="92500" lnSpcReduction="10000"/>
+            </a:bodyPr>
+            <a:lstStyle/>
+            <a:p>
+              <a:pPr algn="ctr"/>
+              <a:r>
+                <a:rPr lang="en-US" sz="1400" dirty="0" smtClean="0"/>
+                <a:t>Exit failure</a:t>
+              </a:r>
+              <a:endParaRPr lang="en-US" sz="1400" dirty="0"/>
+            </a:p>
+          </p:txBody>
+        </p:sp>
+        <p:cxnSp>
+          <p:nvCxnSpPr>
+            <p:cNvPr id="29" name="Elbow Connector 28"/>
+            <p:cNvCxnSpPr>
+              <a:stCxn id="24" idx="1"/>
+              <a:endCxn id="28" idx="0"/>
+            </p:cNvCxnSpPr>
+            <p:nvPr/>
+          </p:nvCxnSpPr>
+          <p:spPr>
+            <a:xfrm rot="10800000" flipV="1">
+              <a:off x="789662" y="-4816407"/>
+              <a:ext cx="359289" cy="292841"/>
+            </a:xfrm>
+            <a:prstGeom prst="bentConnector2">
+              <a:avLst/>
+            </a:prstGeom>
+            <a:ln>
+              <a:solidFill>
+                <a:srgbClr val="1F497D"/>
+              </a:solidFill>
+              <a:tailEnd type="arrow"/>
+            </a:ln>
+            <a:effectLst/>
+          </p:spPr>
+          <p:style>
+            <a:lnRef idx="2">
+              <a:schemeClr val="accent1"/>
+            </a:lnRef>
+            <a:fillRef idx="0">
+              <a:schemeClr val="accent1"/>
+            </a:fillRef>
+            <a:effectRef idx="1">
+              <a:schemeClr val="accent1"/>
+            </a:effectRef>
+            <a:fontRef idx="minor">
+              <a:schemeClr val="tx1"/>
+            </a:fontRef>
+          </p:style>
+        </p:cxnSp>
+        <p:sp>
+          <p:nvSpPr>
+            <p:cNvPr id="32" name="Process 31"/>
+            <p:cNvSpPr/>
+            <p:nvPr/>
+          </p:nvSpPr>
+          <p:spPr>
+            <a:xfrm>
+              <a:off x="2587575" y="-4523565"/>
+              <a:ext cx="1927738" cy="539152"/>
+            </a:xfrm>
+            <a:prstGeom prst="flowChartProcess">
+              <a:avLst/>
+            </a:prstGeom>
+            <a:solidFill>
+              <a:srgbClr val="1F497D"/>
+            </a:solidFill>
+            <a:ln>
+              <a:noFill/>
+            </a:ln>
+            <a:effectLst/>
+          </p:spPr>
+          <p:style>
+            <a:lnRef idx="1">
+              <a:schemeClr val="accent1"/>
+            </a:lnRef>
+            <a:fillRef idx="3">
+              <a:schemeClr val="accent1"/>
+            </a:fillRef>
+            <a:effectRef idx="2">
+              <a:schemeClr val="accent1"/>
+            </a:effectRef>
+            <a:fontRef idx="minor">
+              <a:schemeClr val="lt1"/>
+            </a:fontRef>
+          </p:style>
+          <p:txBody>
+            <a:bodyPr rtlCol="0" anchor="ctr"/>
+            <a:lstStyle/>
+            <a:p>
+              <a:pPr algn="ctr"/>
+              <a:r>
+                <a:rPr lang="en-US" sz="1400" dirty="0" smtClean="0"/>
+                <a:t>Initialize caches and variables</a:t>
+              </a:r>
+              <a:endParaRPr lang="en-US" sz="1400" dirty="0"/>
+            </a:p>
+          </p:txBody>
+        </p:sp>
+        <p:cxnSp>
+          <p:nvCxnSpPr>
+            <p:cNvPr id="33" name="Elbow Connector 32"/>
+            <p:cNvCxnSpPr>
+              <a:stCxn id="24" idx="3"/>
+              <a:endCxn id="32" idx="0"/>
+            </p:cNvCxnSpPr>
+            <p:nvPr/>
+          </p:nvCxnSpPr>
+          <p:spPr>
+            <a:xfrm>
+              <a:off x="3076688" y="-4816406"/>
+              <a:ext cx="474756" cy="292841"/>
+            </a:xfrm>
+            <a:prstGeom prst="bentConnector2">
+              <a:avLst/>
+            </a:prstGeom>
+            <a:ln>
+              <a:solidFill>
+                <a:srgbClr val="1F497D"/>
+              </a:solidFill>
+              <a:tailEnd type="arrow"/>
+            </a:ln>
+            <a:effectLst/>
+          </p:spPr>
+          <p:style>
+            <a:lnRef idx="2">
+              <a:schemeClr val="accent1"/>
+            </a:lnRef>
+            <a:fillRef idx="0">
+              <a:schemeClr val="accent1"/>
+            </a:fillRef>
+            <a:effectRef idx="1">
+              <a:schemeClr val="accent1"/>
+            </a:effectRef>
+            <a:fontRef idx="minor">
+              <a:schemeClr val="tx1"/>
+            </a:fontRef>
+          </p:style>
+        </p:cxnSp>
+        <p:sp>
+          <p:nvSpPr>
+            <p:cNvPr id="37" name="Decision 36"/>
+            <p:cNvSpPr/>
+            <p:nvPr/>
+          </p:nvSpPr>
+          <p:spPr>
+            <a:xfrm>
+              <a:off x="2587575" y="-3771231"/>
+              <a:ext cx="1927738" cy="800922"/>
+            </a:xfrm>
+            <a:prstGeom prst="flowChartDecision">
+              <a:avLst/>
+            </a:prstGeom>
+            <a:solidFill>
+              <a:srgbClr val="1F497D"/>
+            </a:solidFill>
+            <a:ln>
+              <a:noFill/>
+            </a:ln>
+            <a:effectLst/>
+          </p:spPr>
+          <p:style>
+            <a:lnRef idx="1">
+              <a:schemeClr val="accent1"/>
+            </a:lnRef>
+            <a:fillRef idx="3">
+              <a:schemeClr val="accent1"/>
+            </a:fillRef>
+            <a:effectRef idx="2">
+              <a:schemeClr val="accent1"/>
+            </a:effectRef>
+            <a:fontRef idx="minor">
+              <a:schemeClr val="lt1"/>
+            </a:fontRef>
+          </p:style>
+          <p:txBody>
+            <a:bodyPr wrap="square" lIns="36000" rIns="36000" rtlCol="0" anchor="ctr"/>
+            <a:lstStyle/>
+            <a:p>
+              <a:pPr algn="ctr"/>
+              <a:r>
+                <a:rPr lang="en-US" sz="1400" dirty="0" smtClean="0"/>
+                <a:t>Completed?</a:t>
+              </a:r>
+              <a:endParaRPr lang="en-US" sz="1400" dirty="0"/>
+            </a:p>
+          </p:txBody>
+        </p:sp>
+        <p:cxnSp>
+          <p:nvCxnSpPr>
+            <p:cNvPr id="38" name="Straight Arrow Connector 37"/>
+            <p:cNvCxnSpPr>
+              <a:stCxn id="32" idx="2"/>
+              <a:endCxn id="37" idx="0"/>
+            </p:cNvCxnSpPr>
+            <p:nvPr/>
+          </p:nvCxnSpPr>
+          <p:spPr>
+            <a:xfrm>
+              <a:off x="3551444" y="-3984413"/>
+              <a:ext cx="0" cy="213182"/>
+            </a:xfrm>
+            <a:prstGeom prst="straightConnector1">
+              <a:avLst/>
+            </a:prstGeom>
+            <a:ln>
+              <a:solidFill>
+                <a:schemeClr val="tx2"/>
+              </a:solidFill>
+              <a:tailEnd type="arrow"/>
+            </a:ln>
+            <a:effectLst/>
+          </p:spPr>
+          <p:style>
+            <a:lnRef idx="2">
+              <a:schemeClr val="accent1"/>
+            </a:lnRef>
+            <a:fillRef idx="0">
+              <a:schemeClr val="accent1"/>
+            </a:fillRef>
+            <a:effectRef idx="1">
+              <a:schemeClr val="accent1"/>
+            </a:effectRef>
+            <a:fontRef idx="minor">
+              <a:schemeClr val="tx1"/>
+            </a:fontRef>
+          </p:style>
+        </p:cxnSp>
+        <p:cxnSp>
+          <p:nvCxnSpPr>
+            <p:cNvPr id="42" name="Elbow Connector 41"/>
+            <p:cNvCxnSpPr>
+              <a:stCxn id="37" idx="3"/>
+              <a:endCxn id="45" idx="0"/>
+            </p:cNvCxnSpPr>
+            <p:nvPr/>
+          </p:nvCxnSpPr>
+          <p:spPr>
+            <a:xfrm>
+              <a:off x="4515313" y="-3370770"/>
+              <a:ext cx="441200" cy="335889"/>
+            </a:xfrm>
+            <a:prstGeom prst="bentConnector2">
+              <a:avLst/>
+            </a:prstGeom>
+            <a:ln>
+              <a:solidFill>
+                <a:srgbClr val="1F497D"/>
+              </a:solidFill>
+              <a:tailEnd type="arrow"/>
+            </a:ln>
+            <a:effectLst/>
+          </p:spPr>
+          <p:style>
+            <a:lnRef idx="2">
+              <a:schemeClr val="accent1"/>
+            </a:lnRef>
+            <a:fillRef idx="0">
+              <a:schemeClr val="accent1"/>
+            </a:fillRef>
+            <a:effectRef idx="1">
+              <a:schemeClr val="accent1"/>
+            </a:effectRef>
+            <a:fontRef idx="minor">
+              <a:schemeClr val="tx1"/>
+            </a:fontRef>
+          </p:style>
+        </p:cxnSp>
+        <p:sp>
+          <p:nvSpPr>
+            <p:cNvPr id="45" name="Process 44"/>
+            <p:cNvSpPr/>
+            <p:nvPr/>
+          </p:nvSpPr>
+          <p:spPr>
+            <a:xfrm>
+              <a:off x="3992644" y="-3034881"/>
+              <a:ext cx="1927738" cy="539152"/>
+            </a:xfrm>
+            <a:prstGeom prst="flowChartProcess">
+              <a:avLst/>
+            </a:prstGeom>
+            <a:solidFill>
+              <a:srgbClr val="1F497D"/>
+            </a:solidFill>
+            <a:ln>
+              <a:noFill/>
+            </a:ln>
+            <a:effectLst/>
+          </p:spPr>
+          <p:style>
+            <a:lnRef idx="1">
+              <a:schemeClr val="accent1"/>
+            </a:lnRef>
+            <a:fillRef idx="3">
+              <a:schemeClr val="accent1"/>
+            </a:fillRef>
+            <a:effectRef idx="2">
+              <a:schemeClr val="accent1"/>
+            </a:effectRef>
+            <a:fontRef idx="minor">
+              <a:schemeClr val="lt1"/>
+            </a:fontRef>
+          </p:style>
+          <p:txBody>
+            <a:bodyPr rtlCol="0" anchor="ctr"/>
+            <a:lstStyle/>
+            <a:p>
+              <a:pPr algn="ctr"/>
+              <a:r>
+                <a:rPr lang="en-US" sz="1400" dirty="0" smtClean="0"/>
+                <a:t>Display performance statistics </a:t>
+              </a:r>
+              <a:endParaRPr lang="en-US" sz="1400" dirty="0"/>
+            </a:p>
+          </p:txBody>
+        </p:sp>
+        <p:sp>
+          <p:nvSpPr>
+            <p:cNvPr id="48" name="Process 47"/>
+            <p:cNvSpPr/>
+            <p:nvPr/>
+          </p:nvSpPr>
+          <p:spPr>
+            <a:xfrm>
+              <a:off x="3992644" y="-2238905"/>
+              <a:ext cx="1927738" cy="393077"/>
+            </a:xfrm>
+            <a:prstGeom prst="flowChartProcess">
+              <a:avLst/>
+            </a:prstGeom>
+            <a:solidFill>
+              <a:srgbClr val="1F497D"/>
+            </a:solidFill>
+            <a:ln>
+              <a:noFill/>
+            </a:ln>
+            <a:effectLst/>
+          </p:spPr>
+          <p:style>
+            <a:lnRef idx="1">
+              <a:schemeClr val="accent1"/>
+            </a:lnRef>
+            <a:fillRef idx="3">
+              <a:schemeClr val="accent1"/>
+            </a:fillRef>
+            <a:effectRef idx="2">
+              <a:schemeClr val="accent1"/>
+            </a:effectRef>
+            <a:fontRef idx="minor">
+              <a:schemeClr val="lt1"/>
+            </a:fontRef>
+          </p:style>
+          <p:txBody>
+            <a:bodyPr rtlCol="0" anchor="ctr"/>
+            <a:lstStyle/>
+            <a:p>
+              <a:pPr algn="ctr"/>
+              <a:r>
+                <a:rPr lang="en-US" sz="1400" dirty="0" smtClean="0"/>
+                <a:t>Close files</a:t>
+              </a:r>
+              <a:endParaRPr lang="en-US" sz="1400" dirty="0"/>
+            </a:p>
+          </p:txBody>
+        </p:sp>
+        <p:sp>
+          <p:nvSpPr>
+            <p:cNvPr id="49" name="Terminator 48"/>
+            <p:cNvSpPr/>
+            <p:nvPr/>
+          </p:nvSpPr>
+          <p:spPr>
+            <a:xfrm>
+              <a:off x="4452515" y="-1573763"/>
+              <a:ext cx="1007755" cy="393077"/>
+            </a:xfrm>
+            <a:prstGeom prst="flowChartTerminator">
+              <a:avLst/>
+            </a:prstGeom>
+            <a:solidFill>
+              <a:schemeClr val="tx2"/>
+            </a:solidFill>
+            <a:ln>
+              <a:noFill/>
+            </a:ln>
+            <a:effectLst/>
+          </p:spPr>
+          <p:style>
+            <a:lnRef idx="1">
+              <a:schemeClr val="accent1"/>
+            </a:lnRef>
+            <a:fillRef idx="3">
+              <a:schemeClr val="accent1"/>
+            </a:fillRef>
+            <a:effectRef idx="2">
+              <a:schemeClr val="accent1"/>
+            </a:effectRef>
+            <a:fontRef idx="minor">
+              <a:schemeClr val="lt1"/>
+            </a:fontRef>
+          </p:style>
+          <p:txBody>
+            <a:bodyPr rtlCol="0" anchor="ctr">
+              <a:normAutofit fontScale="92500" lnSpcReduction="10000"/>
+            </a:bodyPr>
+            <a:lstStyle/>
+            <a:p>
+              <a:pPr algn="ctr"/>
+              <a:r>
+                <a:rPr lang="en-US" sz="1400" dirty="0" smtClean="0"/>
+                <a:t>Exit failure</a:t>
+              </a:r>
+              <a:endParaRPr lang="en-US" sz="1400" dirty="0"/>
+            </a:p>
+          </p:txBody>
+        </p:sp>
+        <p:cxnSp>
+          <p:nvCxnSpPr>
+            <p:cNvPr id="50" name="Straight Arrow Connector 49"/>
+            <p:cNvCxnSpPr>
+              <a:stCxn id="45" idx="2"/>
+              <a:endCxn id="48" idx="0"/>
+            </p:cNvCxnSpPr>
+            <p:nvPr/>
+          </p:nvCxnSpPr>
+          <p:spPr>
+            <a:xfrm>
+              <a:off x="4956513" y="-2495729"/>
+              <a:ext cx="0" cy="256824"/>
+            </a:xfrm>
+            <a:prstGeom prst="straightConnector1">
+              <a:avLst/>
+            </a:prstGeom>
+            <a:ln>
+              <a:solidFill>
+                <a:schemeClr val="tx2"/>
+              </a:solidFill>
+              <a:tailEnd type="arrow"/>
+            </a:ln>
+            <a:effectLst/>
+          </p:spPr>
+          <p:style>
+            <a:lnRef idx="2">
+              <a:schemeClr val="accent1"/>
+            </a:lnRef>
+            <a:fillRef idx="0">
+              <a:schemeClr val="accent1"/>
+            </a:fillRef>
+            <a:effectRef idx="1">
+              <a:schemeClr val="accent1"/>
+            </a:effectRef>
+            <a:fontRef idx="minor">
+              <a:schemeClr val="tx1"/>
+            </a:fontRef>
+          </p:style>
+        </p:cxnSp>
+        <p:cxnSp>
+          <p:nvCxnSpPr>
+            <p:cNvPr id="53" name="Straight Arrow Connector 52"/>
+            <p:cNvCxnSpPr>
+              <a:stCxn id="48" idx="2"/>
+              <a:endCxn id="49" idx="0"/>
+            </p:cNvCxnSpPr>
+            <p:nvPr/>
+          </p:nvCxnSpPr>
+          <p:spPr>
+            <a:xfrm flipH="1">
+              <a:off x="4956393" y="-1845828"/>
+              <a:ext cx="120" cy="272065"/>
+            </a:xfrm>
+            <a:prstGeom prst="straightConnector1">
+              <a:avLst/>
+            </a:prstGeom>
+            <a:ln>
+              <a:solidFill>
+                <a:schemeClr val="tx2"/>
+              </a:solidFill>
+              <a:tailEnd type="arrow"/>
+            </a:ln>
+            <a:effectLst/>
+          </p:spPr>
+          <p:style>
+            <a:lnRef idx="2">
+              <a:schemeClr val="accent1"/>
+            </a:lnRef>
+            <a:fillRef idx="0">
+              <a:schemeClr val="accent1"/>
+            </a:fillRef>
+            <a:effectRef idx="1">
+              <a:schemeClr val="accent1"/>
+            </a:effectRef>
+            <a:fontRef idx="minor">
+              <a:schemeClr val="tx1"/>
+            </a:fontRef>
+          </p:style>
+        </p:cxnSp>
+        <p:sp>
+          <p:nvSpPr>
+            <p:cNvPr id="56" name="Process 55"/>
+            <p:cNvSpPr/>
+            <p:nvPr/>
+          </p:nvSpPr>
+          <p:spPr>
+            <a:xfrm>
+              <a:off x="1204802" y="-3034881"/>
+              <a:ext cx="1927738" cy="393077"/>
+            </a:xfrm>
+            <a:prstGeom prst="flowChartProcess">
+              <a:avLst/>
+            </a:prstGeom>
+            <a:solidFill>
+              <a:srgbClr val="1F497D"/>
+            </a:solidFill>
+            <a:ln>
+              <a:noFill/>
+            </a:ln>
+            <a:effectLst/>
+          </p:spPr>
+          <p:style>
+            <a:lnRef idx="1">
+              <a:schemeClr val="accent1"/>
+            </a:lnRef>
+            <a:fillRef idx="3">
+              <a:schemeClr val="accent1"/>
+            </a:fillRef>
+            <a:effectRef idx="2">
+              <a:schemeClr val="accent1"/>
+            </a:effectRef>
+            <a:fontRef idx="minor">
+              <a:schemeClr val="lt1"/>
+            </a:fontRef>
+          </p:style>
+          <p:txBody>
+            <a:bodyPr rtlCol="0" anchor="ctr"/>
+            <a:lstStyle/>
+            <a:p>
+              <a:pPr algn="ctr"/>
+              <a:r>
+                <a:rPr lang="en-US" sz="1400" dirty="0" smtClean="0"/>
+                <a:t>Clock cycle ++</a:t>
+              </a:r>
+              <a:endParaRPr lang="en-US" sz="1400" dirty="0"/>
+            </a:p>
+          </p:txBody>
+        </p:sp>
+        <p:cxnSp>
+          <p:nvCxnSpPr>
+            <p:cNvPr id="57" name="Elbow Connector 56"/>
+            <p:cNvCxnSpPr>
+              <a:stCxn id="37" idx="1"/>
+              <a:endCxn id="56" idx="0"/>
+            </p:cNvCxnSpPr>
+            <p:nvPr/>
+          </p:nvCxnSpPr>
+          <p:spPr>
+            <a:xfrm rot="10800000" flipV="1">
+              <a:off x="2168671" y="-3370771"/>
+              <a:ext cx="418904" cy="335889"/>
+            </a:xfrm>
+            <a:prstGeom prst="bentConnector2">
+              <a:avLst/>
+            </a:prstGeom>
+            <a:ln>
+              <a:solidFill>
+                <a:srgbClr val="1F497D"/>
+              </a:solidFill>
+              <a:tailEnd type="arrow"/>
+            </a:ln>
+            <a:effectLst/>
+          </p:spPr>
+          <p:style>
+            <a:lnRef idx="2">
+              <a:schemeClr val="accent1"/>
+            </a:lnRef>
+            <a:fillRef idx="0">
+              <a:schemeClr val="accent1"/>
+            </a:fillRef>
+            <a:effectRef idx="1">
+              <a:schemeClr val="accent1"/>
+            </a:effectRef>
+            <a:fontRef idx="minor">
+              <a:schemeClr val="tx1"/>
+            </a:fontRef>
+          </p:style>
+        </p:cxnSp>
+        <p:sp>
+          <p:nvSpPr>
+            <p:cNvPr id="60" name="Process 59"/>
+            <p:cNvSpPr/>
+            <p:nvPr/>
+          </p:nvSpPr>
+          <p:spPr>
+            <a:xfrm>
+              <a:off x="-963869" y="-1699350"/>
+              <a:ext cx="1927738" cy="393077"/>
+            </a:xfrm>
+            <a:prstGeom prst="flowChartProcess">
+              <a:avLst/>
+            </a:prstGeom>
+            <a:solidFill>
+              <a:srgbClr val="1F497D"/>
+            </a:solidFill>
+            <a:ln>
+              <a:noFill/>
+            </a:ln>
+            <a:effectLst/>
+          </p:spPr>
+          <p:style>
+            <a:lnRef idx="1">
+              <a:schemeClr val="accent1"/>
+            </a:lnRef>
+            <a:fillRef idx="3">
+              <a:schemeClr val="accent1"/>
+            </a:fillRef>
+            <a:effectRef idx="2">
+              <a:schemeClr val="accent1"/>
+            </a:effectRef>
+            <a:fontRef idx="minor">
+              <a:schemeClr val="lt1"/>
+            </a:fontRef>
+          </p:style>
+          <p:txBody>
+            <a:bodyPr lIns="36000" rIns="36000" rtlCol="0" anchor="ctr"/>
+            <a:lstStyle/>
+            <a:p>
+              <a:pPr algn="ctr"/>
+              <a:r>
+                <a:rPr lang="en-US" sz="1400" dirty="0" smtClean="0"/>
+                <a:t>Dequeue bus transaction</a:t>
+              </a:r>
+              <a:endParaRPr lang="en-US" sz="1400" dirty="0"/>
+            </a:p>
+          </p:txBody>
+        </p:sp>
+        <p:sp>
+          <p:nvSpPr>
+            <p:cNvPr id="62" name="Process 61"/>
+            <p:cNvSpPr/>
+            <p:nvPr/>
+          </p:nvSpPr>
+          <p:spPr>
+            <a:xfrm>
+              <a:off x="-963869" y="-1044707"/>
+              <a:ext cx="1927738" cy="539152"/>
+            </a:xfrm>
+            <a:prstGeom prst="flowChartProcess">
+              <a:avLst/>
+            </a:prstGeom>
+            <a:solidFill>
+              <a:srgbClr val="1F497D"/>
+            </a:solidFill>
+            <a:ln>
+              <a:noFill/>
+            </a:ln>
+            <a:effectLst/>
+          </p:spPr>
+          <p:style>
+            <a:lnRef idx="1">
+              <a:schemeClr val="accent1"/>
+            </a:lnRef>
+            <a:fillRef idx="3">
+              <a:schemeClr val="accent1"/>
+            </a:fillRef>
+            <a:effectRef idx="2">
+              <a:schemeClr val="accent1"/>
+            </a:effectRef>
+            <a:fontRef idx="minor">
+              <a:schemeClr val="lt1"/>
+            </a:fontRef>
+          </p:style>
+          <p:txBody>
+            <a:bodyPr rtlCol="0" anchor="ctr"/>
+            <a:lstStyle/>
+            <a:p>
+              <a:pPr algn="ctr"/>
+              <a:r>
+                <a:rPr lang="en-US" sz="1400" dirty="0" smtClean="0"/>
+                <a:t>Change states of all other caches</a:t>
+              </a:r>
+              <a:endParaRPr lang="en-US" sz="1400" dirty="0"/>
+            </a:p>
+          </p:txBody>
+        </p:sp>
+        <p:sp>
+          <p:nvSpPr>
+            <p:cNvPr id="63" name="Process 62"/>
+            <p:cNvSpPr/>
+            <p:nvPr/>
+          </p:nvSpPr>
+          <p:spPr>
+            <a:xfrm>
+              <a:off x="-963868" y="-238065"/>
+              <a:ext cx="1927738" cy="539152"/>
+            </a:xfrm>
+            <a:prstGeom prst="flowChartProcess">
+              <a:avLst/>
+            </a:prstGeom>
+            <a:solidFill>
+              <a:srgbClr val="1F497D"/>
+            </a:solidFill>
+            <a:ln>
+              <a:noFill/>
+            </a:ln>
+            <a:effectLst/>
+          </p:spPr>
+          <p:style>
+            <a:lnRef idx="1">
+              <a:schemeClr val="accent1"/>
+            </a:lnRef>
+            <a:fillRef idx="3">
+              <a:schemeClr val="accent1"/>
+            </a:fillRef>
+            <a:effectRef idx="2">
+              <a:schemeClr val="accent1"/>
+            </a:effectRef>
+            <a:fontRef idx="minor">
+              <a:schemeClr val="lt1"/>
+            </a:fontRef>
+          </p:style>
+          <p:txBody>
+            <a:bodyPr rtlCol="0" anchor="ctr"/>
+            <a:lstStyle/>
+            <a:p>
+              <a:pPr algn="ctr"/>
+              <a:r>
+                <a:rPr lang="en-US" sz="1400" dirty="0" smtClean="0"/>
+                <a:t>Change states of target cache</a:t>
+              </a:r>
+              <a:endParaRPr lang="en-US" sz="1400" dirty="0"/>
+            </a:p>
+          </p:txBody>
+        </p:sp>
+        <p:cxnSp>
+          <p:nvCxnSpPr>
+            <p:cNvPr id="64" name="Straight Arrow Connector 63"/>
+            <p:cNvCxnSpPr>
+              <a:stCxn id="60" idx="2"/>
+              <a:endCxn id="62" idx="0"/>
+            </p:cNvCxnSpPr>
+            <p:nvPr/>
+          </p:nvCxnSpPr>
+          <p:spPr>
+            <a:xfrm>
+              <a:off x="0" y="-1306273"/>
+              <a:ext cx="0" cy="261566"/>
+            </a:xfrm>
+            <a:prstGeom prst="straightConnector1">
+              <a:avLst/>
+            </a:prstGeom>
+            <a:ln>
+              <a:solidFill>
+                <a:schemeClr val="tx2"/>
+              </a:solidFill>
+              <a:tailEnd type="arrow"/>
+            </a:ln>
+            <a:effectLst/>
+          </p:spPr>
+          <p:style>
+            <a:lnRef idx="2">
+              <a:schemeClr val="accent1"/>
+            </a:lnRef>
+            <a:fillRef idx="0">
+              <a:schemeClr val="accent1"/>
+            </a:fillRef>
+            <a:effectRef idx="1">
+              <a:schemeClr val="accent1"/>
+            </a:effectRef>
+            <a:fontRef idx="minor">
+              <a:schemeClr val="tx1"/>
+            </a:fontRef>
+          </p:style>
+        </p:cxnSp>
+        <p:cxnSp>
+          <p:nvCxnSpPr>
+            <p:cNvPr id="67" name="Straight Arrow Connector 66"/>
+            <p:cNvCxnSpPr>
+              <a:stCxn id="62" idx="2"/>
+              <a:endCxn id="63" idx="0"/>
+            </p:cNvCxnSpPr>
+            <p:nvPr/>
+          </p:nvCxnSpPr>
+          <p:spPr>
+            <a:xfrm>
+              <a:off x="0" y="-505555"/>
+              <a:ext cx="1" cy="267490"/>
+            </a:xfrm>
+            <a:prstGeom prst="straightConnector1">
+              <a:avLst/>
+            </a:prstGeom>
+            <a:ln>
+              <a:solidFill>
+                <a:schemeClr val="tx2"/>
+              </a:solidFill>
+              <a:tailEnd type="arrow"/>
+            </a:ln>
+            <a:effectLst/>
+          </p:spPr>
+          <p:style>
+            <a:lnRef idx="2">
+              <a:schemeClr val="accent1"/>
+            </a:lnRef>
+            <a:fillRef idx="0">
+              <a:schemeClr val="accent1"/>
+            </a:fillRef>
+            <a:effectRef idx="1">
+              <a:schemeClr val="accent1"/>
+            </a:effectRef>
+            <a:fontRef idx="minor">
+              <a:schemeClr val="tx1"/>
+            </a:fontRef>
+          </p:style>
+        </p:cxnSp>
+        <p:sp>
+          <p:nvSpPr>
+            <p:cNvPr id="71" name="Process 70"/>
+            <p:cNvSpPr/>
+            <p:nvPr/>
+          </p:nvSpPr>
+          <p:spPr>
+            <a:xfrm>
+              <a:off x="-963868" y="581292"/>
+              <a:ext cx="1927738" cy="393077"/>
+            </a:xfrm>
+            <a:prstGeom prst="flowChartProcess">
+              <a:avLst/>
+            </a:prstGeom>
+            <a:solidFill>
+              <a:srgbClr val="1F497D"/>
+            </a:solidFill>
+            <a:ln>
+              <a:noFill/>
+            </a:ln>
+            <a:effectLst/>
+          </p:spPr>
+          <p:style>
+            <a:lnRef idx="1">
+              <a:schemeClr val="accent1"/>
+            </a:lnRef>
+            <a:fillRef idx="3">
+              <a:schemeClr val="accent1"/>
+            </a:fillRef>
+            <a:effectRef idx="2">
+              <a:schemeClr val="accent1"/>
+            </a:effectRef>
+            <a:fontRef idx="minor">
+              <a:schemeClr val="lt1"/>
+            </a:fontRef>
+          </p:style>
+          <p:txBody>
+            <a:bodyPr rtlCol="0" anchor="ctr"/>
+            <a:lstStyle/>
+            <a:p>
+              <a:pPr algn="ctr"/>
+              <a:r>
+                <a:rPr lang="en-US" sz="1400" dirty="0" smtClean="0"/>
+                <a:t>Unblock target cache</a:t>
+              </a:r>
+              <a:endParaRPr lang="en-US" sz="1400" dirty="0"/>
+            </a:p>
+          </p:txBody>
+        </p:sp>
+        <p:cxnSp>
+          <p:nvCxnSpPr>
+            <p:cNvPr id="72" name="Straight Arrow Connector 71"/>
+            <p:cNvCxnSpPr>
+              <a:stCxn id="63" idx="2"/>
+              <a:endCxn id="71" idx="0"/>
+            </p:cNvCxnSpPr>
+            <p:nvPr/>
+          </p:nvCxnSpPr>
+          <p:spPr>
+            <a:xfrm>
+              <a:off x="1" y="301087"/>
+              <a:ext cx="0" cy="280205"/>
+            </a:xfrm>
+            <a:prstGeom prst="straightConnector1">
+              <a:avLst/>
+            </a:prstGeom>
+            <a:ln>
+              <a:solidFill>
+                <a:schemeClr val="tx2"/>
+              </a:solidFill>
+              <a:tailEnd type="arrow"/>
+            </a:ln>
+            <a:effectLst/>
+          </p:spPr>
+          <p:style>
+            <a:lnRef idx="2">
+              <a:schemeClr val="accent1"/>
+            </a:lnRef>
+            <a:fillRef idx="0">
+              <a:schemeClr val="accent1"/>
+            </a:fillRef>
+            <a:effectRef idx="1">
+              <a:schemeClr val="accent1"/>
+            </a:effectRef>
+            <a:fontRef idx="minor">
+              <a:schemeClr val="tx1"/>
+            </a:fontRef>
+          </p:style>
+        </p:cxnSp>
+        <p:sp>
+          <p:nvSpPr>
+            <p:cNvPr id="75" name="Decision 74"/>
+            <p:cNvSpPr/>
+            <p:nvPr/>
+          </p:nvSpPr>
+          <p:spPr>
+            <a:xfrm>
+              <a:off x="1200522" y="-2374685"/>
+              <a:ext cx="1927738" cy="800922"/>
+            </a:xfrm>
+            <a:prstGeom prst="flowChartDecision">
+              <a:avLst/>
+            </a:prstGeom>
+            <a:solidFill>
+              <a:srgbClr val="1F497D"/>
+            </a:solidFill>
+            <a:ln>
+              <a:noFill/>
+            </a:ln>
+            <a:effectLst/>
+          </p:spPr>
+          <p:style>
+            <a:lnRef idx="1">
+              <a:schemeClr val="accent1"/>
+            </a:lnRef>
+            <a:fillRef idx="3">
+              <a:schemeClr val="accent1"/>
+            </a:fillRef>
+            <a:effectRef idx="2">
+              <a:schemeClr val="accent1"/>
+            </a:effectRef>
+            <a:fontRef idx="minor">
+              <a:schemeClr val="lt1"/>
+            </a:fontRef>
+          </p:style>
+          <p:txBody>
+            <a:bodyPr wrap="square" lIns="36000" rIns="36000" rtlCol="0" anchor="ctr"/>
+            <a:lstStyle/>
+            <a:p>
+              <a:pPr algn="ctr"/>
+              <a:r>
+                <a:rPr lang="en-US" sz="1400" dirty="0" smtClean="0"/>
+                <a:t>Transaction in queue?</a:t>
+              </a:r>
+              <a:endParaRPr lang="en-US" sz="1400" dirty="0"/>
+            </a:p>
+          </p:txBody>
+        </p:sp>
+        <p:cxnSp>
+          <p:nvCxnSpPr>
+            <p:cNvPr id="76" name="Elbow Connector 75"/>
+            <p:cNvCxnSpPr>
+              <a:stCxn id="75" idx="1"/>
+              <a:endCxn id="60" idx="0"/>
+            </p:cNvCxnSpPr>
+            <p:nvPr/>
+          </p:nvCxnSpPr>
+          <p:spPr>
+            <a:xfrm rot="10800000" flipV="1">
+              <a:off x="0" y="-1974224"/>
+              <a:ext cx="1200522" cy="274874"/>
+            </a:xfrm>
+            <a:prstGeom prst="bentConnector2">
+              <a:avLst/>
+            </a:prstGeom>
+            <a:ln>
+              <a:solidFill>
+                <a:srgbClr val="1F497D"/>
+              </a:solidFill>
+              <a:tailEnd type="arrow"/>
+            </a:ln>
+            <a:effectLst/>
+          </p:spPr>
+          <p:style>
+            <a:lnRef idx="2">
+              <a:schemeClr val="accent1"/>
+            </a:lnRef>
+            <a:fillRef idx="0">
+              <a:schemeClr val="accent1"/>
+            </a:fillRef>
+            <a:effectRef idx="1">
+              <a:schemeClr val="accent1"/>
+            </a:effectRef>
+            <a:fontRef idx="minor">
+              <a:schemeClr val="tx1"/>
+            </a:fontRef>
+          </p:style>
+        </p:cxnSp>
+        <p:cxnSp>
+          <p:nvCxnSpPr>
+            <p:cNvPr id="79" name="Straight Arrow Connector 78"/>
+            <p:cNvCxnSpPr>
+              <a:stCxn id="56" idx="2"/>
+              <a:endCxn id="75" idx="0"/>
+            </p:cNvCxnSpPr>
+            <p:nvPr/>
+          </p:nvCxnSpPr>
+          <p:spPr>
+            <a:xfrm flipH="1">
+              <a:off x="2164391" y="-2641804"/>
+              <a:ext cx="4280" cy="267119"/>
+            </a:xfrm>
+            <a:prstGeom prst="straightConnector1">
+              <a:avLst/>
+            </a:prstGeom>
+            <a:ln>
+              <a:solidFill>
+                <a:schemeClr val="tx2"/>
+              </a:solidFill>
+              <a:tailEnd type="arrow"/>
+            </a:ln>
+            <a:effectLst/>
+          </p:spPr>
+          <p:style>
+            <a:lnRef idx="2">
+              <a:schemeClr val="accent1"/>
+            </a:lnRef>
+            <a:fillRef idx="0">
+              <a:schemeClr val="accent1"/>
+            </a:fillRef>
+            <a:effectRef idx="1">
+              <a:schemeClr val="accent1"/>
+            </a:effectRef>
+            <a:fontRef idx="minor">
+              <a:schemeClr val="tx1"/>
+            </a:fontRef>
+          </p:style>
+        </p:cxnSp>
+        <p:sp>
+          <p:nvSpPr>
+            <p:cNvPr id="83" name="Process 82"/>
+            <p:cNvSpPr/>
+            <p:nvPr/>
+          </p:nvSpPr>
+          <p:spPr>
+            <a:xfrm>
+              <a:off x="1200522" y="-1150628"/>
+              <a:ext cx="1927738" cy="393077"/>
+            </a:xfrm>
+            <a:prstGeom prst="flowChartProcess">
+              <a:avLst/>
+            </a:prstGeom>
+            <a:solidFill>
+              <a:srgbClr val="1F497D"/>
+            </a:solidFill>
+            <a:ln>
+              <a:noFill/>
+            </a:ln>
+            <a:effectLst/>
+          </p:spPr>
+          <p:style>
+            <a:lnRef idx="1">
+              <a:schemeClr val="accent1"/>
+            </a:lnRef>
+            <a:fillRef idx="3">
+              <a:schemeClr val="accent1"/>
+            </a:fillRef>
+            <a:effectRef idx="2">
+              <a:schemeClr val="accent1"/>
+            </a:effectRef>
+            <a:fontRef idx="minor">
+              <a:schemeClr val="lt1"/>
+            </a:fontRef>
+          </p:style>
+          <p:txBody>
+            <a:bodyPr rtlCol="0" anchor="ctr"/>
+            <a:lstStyle/>
+            <a:p>
+              <a:pPr algn="ctr"/>
+              <a:r>
+                <a:rPr lang="en-US" sz="1400" dirty="0" smtClean="0"/>
+                <a:t>For each processor</a:t>
+              </a:r>
+              <a:endParaRPr lang="en-US" sz="1400" dirty="0"/>
+            </a:p>
+          </p:txBody>
+        </p:sp>
+        <p:cxnSp>
+          <p:nvCxnSpPr>
+            <p:cNvPr id="84" name="Elbow Connector 83"/>
+            <p:cNvCxnSpPr>
+              <a:stCxn id="71" idx="2"/>
+              <a:endCxn id="83" idx="0"/>
+            </p:cNvCxnSpPr>
+            <p:nvPr/>
+          </p:nvCxnSpPr>
+          <p:spPr>
+            <a:xfrm rot="5400000" flipH="1" flipV="1">
+              <a:off x="19697" y="-1170324"/>
+              <a:ext cx="2124997" cy="2164390"/>
+            </a:xfrm>
+            <a:prstGeom prst="bentConnector5">
+              <a:avLst>
+                <a:gd name="adj1" fmla="val -6505"/>
+                <a:gd name="adj2" fmla="val 50000"/>
+                <a:gd name="adj3" fmla="val 110758"/>
+              </a:avLst>
+            </a:prstGeom>
+            <a:ln>
+              <a:solidFill>
+                <a:srgbClr val="1F497D"/>
+              </a:solidFill>
+              <a:tailEnd type="arrow"/>
+            </a:ln>
+            <a:effectLst/>
+          </p:spPr>
+          <p:style>
+            <a:lnRef idx="2">
+              <a:schemeClr val="accent1"/>
+            </a:lnRef>
+            <a:fillRef idx="0">
+              <a:schemeClr val="accent1"/>
+            </a:fillRef>
+            <a:effectRef idx="1">
+              <a:schemeClr val="accent1"/>
+            </a:effectRef>
+            <a:fontRef idx="minor">
+              <a:schemeClr val="tx1"/>
+            </a:fontRef>
+          </p:style>
+        </p:cxnSp>
+        <p:cxnSp>
+          <p:nvCxnSpPr>
+            <p:cNvPr id="87" name="Straight Arrow Connector 86"/>
+            <p:cNvCxnSpPr>
+              <a:stCxn id="75" idx="2"/>
+              <a:endCxn id="83" idx="0"/>
+            </p:cNvCxnSpPr>
+            <p:nvPr/>
+          </p:nvCxnSpPr>
+          <p:spPr>
+            <a:xfrm>
+              <a:off x="2164391" y="-1573763"/>
+              <a:ext cx="0" cy="423135"/>
+            </a:xfrm>
+            <a:prstGeom prst="straightConnector1">
+              <a:avLst/>
+            </a:prstGeom>
+            <a:ln>
+              <a:solidFill>
+                <a:schemeClr val="tx2"/>
+              </a:solidFill>
+              <a:tailEnd type="arrow"/>
+            </a:ln>
+            <a:effectLst/>
+          </p:spPr>
+          <p:style>
+            <a:lnRef idx="2">
+              <a:schemeClr val="accent1"/>
+            </a:lnRef>
+            <a:fillRef idx="0">
+              <a:schemeClr val="accent1"/>
+            </a:fillRef>
+            <a:effectRef idx="1">
+              <a:schemeClr val="accent1"/>
+            </a:effectRef>
+            <a:fontRef idx="minor">
+              <a:schemeClr val="tx1"/>
+            </a:fontRef>
+          </p:style>
+        </p:cxnSp>
+        <p:sp>
+          <p:nvSpPr>
+            <p:cNvPr id="92" name="Decision 91"/>
+            <p:cNvSpPr/>
+            <p:nvPr/>
+          </p:nvSpPr>
+          <p:spPr>
+            <a:xfrm>
+              <a:off x="1204802" y="-505555"/>
+              <a:ext cx="1927738" cy="800922"/>
+            </a:xfrm>
+            <a:prstGeom prst="flowChartDecision">
+              <a:avLst/>
+            </a:prstGeom>
+            <a:solidFill>
+              <a:srgbClr val="1F497D"/>
+            </a:solidFill>
+            <a:ln>
+              <a:noFill/>
+            </a:ln>
+            <a:effectLst/>
+          </p:spPr>
+          <p:style>
+            <a:lnRef idx="1">
+              <a:schemeClr val="accent1"/>
+            </a:lnRef>
+            <a:fillRef idx="3">
+              <a:schemeClr val="accent1"/>
+            </a:fillRef>
+            <a:effectRef idx="2">
+              <a:schemeClr val="accent1"/>
+            </a:effectRef>
+            <a:fontRef idx="minor">
+              <a:schemeClr val="lt1"/>
+            </a:fontRef>
+          </p:style>
+          <p:txBody>
+            <a:bodyPr wrap="square" lIns="36000" rIns="36000" rtlCol="0" anchor="ctr"/>
+            <a:lstStyle/>
+            <a:p>
+              <a:pPr algn="ctr"/>
+              <a:r>
+                <a:rPr lang="en-US" sz="1400" dirty="0" smtClean="0"/>
+                <a:t>Blocked?</a:t>
+              </a:r>
+              <a:endParaRPr lang="en-US" sz="1400" dirty="0"/>
+            </a:p>
+          </p:txBody>
+        </p:sp>
+        <p:sp>
+          <p:nvSpPr>
+            <p:cNvPr id="93" name="Process 92"/>
+            <p:cNvSpPr/>
+            <p:nvPr/>
+          </p:nvSpPr>
+          <p:spPr>
+            <a:xfrm>
+              <a:off x="2560270" y="391379"/>
+              <a:ext cx="1927738" cy="393077"/>
+            </a:xfrm>
+            <a:prstGeom prst="flowChartProcess">
+              <a:avLst/>
+            </a:prstGeom>
+            <a:solidFill>
+              <a:srgbClr val="1F497D"/>
+            </a:solidFill>
+            <a:ln>
+              <a:noFill/>
+            </a:ln>
+            <a:effectLst/>
+          </p:spPr>
+          <p:style>
+            <a:lnRef idx="1">
+              <a:schemeClr val="accent1"/>
+            </a:lnRef>
+            <a:fillRef idx="3">
+              <a:schemeClr val="accent1"/>
+            </a:fillRef>
+            <a:effectRef idx="2">
+              <a:schemeClr val="accent1"/>
+            </a:effectRef>
+            <a:fontRef idx="minor">
+              <a:schemeClr val="lt1"/>
+            </a:fontRef>
+          </p:style>
+          <p:txBody>
+            <a:bodyPr rtlCol="0" anchor="ctr"/>
+            <a:lstStyle/>
+            <a:p>
+              <a:pPr algn="ctr"/>
+              <a:r>
+                <a:rPr lang="en-US" sz="1400" dirty="0" smtClean="0"/>
+                <a:t>Read next instruction</a:t>
+              </a:r>
+              <a:endParaRPr lang="en-US" sz="1400" dirty="0"/>
+            </a:p>
+          </p:txBody>
+        </p:sp>
+        <p:sp>
+          <p:nvSpPr>
+            <p:cNvPr id="95" name="Decision 94"/>
+            <p:cNvSpPr/>
+            <p:nvPr/>
+          </p:nvSpPr>
+          <p:spPr>
+            <a:xfrm>
+              <a:off x="2560270" y="1158336"/>
+              <a:ext cx="1927738" cy="800922"/>
+            </a:xfrm>
+            <a:prstGeom prst="flowChartDecision">
+              <a:avLst/>
+            </a:prstGeom>
+            <a:solidFill>
+              <a:srgbClr val="1F497D"/>
+            </a:solidFill>
+            <a:ln>
+              <a:noFill/>
+            </a:ln>
+            <a:effectLst/>
+          </p:spPr>
+          <p:style>
+            <a:lnRef idx="1">
+              <a:schemeClr val="accent1"/>
+            </a:lnRef>
+            <a:fillRef idx="3">
+              <a:schemeClr val="accent1"/>
+            </a:fillRef>
+            <a:effectRef idx="2">
+              <a:schemeClr val="accent1"/>
+            </a:effectRef>
+            <a:fontRef idx="minor">
+              <a:schemeClr val="lt1"/>
+            </a:fontRef>
+          </p:style>
+          <p:txBody>
+            <a:bodyPr wrap="square" lIns="36000" rIns="36000" rtlCol="0" anchor="ctr"/>
+            <a:lstStyle/>
+            <a:p>
+              <a:pPr algn="ctr"/>
+              <a:r>
+                <a:rPr lang="en-US" sz="1400" dirty="0" smtClean="0"/>
+                <a:t>Is cache hit?</a:t>
+              </a:r>
+              <a:endParaRPr lang="en-US" sz="1400" dirty="0"/>
+            </a:p>
+          </p:txBody>
+        </p:sp>
+        <p:cxnSp>
+          <p:nvCxnSpPr>
+            <p:cNvPr id="96" name="Straight Arrow Connector 95"/>
+            <p:cNvCxnSpPr>
+              <a:stCxn id="83" idx="2"/>
+              <a:endCxn id="92" idx="0"/>
+            </p:cNvCxnSpPr>
+            <p:nvPr/>
+          </p:nvCxnSpPr>
+          <p:spPr>
+            <a:xfrm>
+              <a:off x="2164391" y="-757551"/>
+              <a:ext cx="4280" cy="251996"/>
+            </a:xfrm>
+            <a:prstGeom prst="straightConnector1">
+              <a:avLst/>
+            </a:prstGeom>
+            <a:ln>
+              <a:solidFill>
+                <a:schemeClr val="tx2"/>
+              </a:solidFill>
+              <a:tailEnd type="arrow"/>
+            </a:ln>
+            <a:effectLst/>
+          </p:spPr>
+          <p:style>
+            <a:lnRef idx="2">
+              <a:schemeClr val="accent1"/>
+            </a:lnRef>
+            <a:fillRef idx="0">
+              <a:schemeClr val="accent1"/>
+            </a:fillRef>
+            <a:effectRef idx="1">
+              <a:schemeClr val="accent1"/>
+            </a:effectRef>
+            <a:fontRef idx="minor">
+              <a:schemeClr val="tx1"/>
+            </a:fontRef>
+          </p:style>
+        </p:cxnSp>
+        <p:cxnSp>
+          <p:nvCxnSpPr>
+            <p:cNvPr id="99" name="Elbow Connector 98"/>
+            <p:cNvCxnSpPr>
+              <a:stCxn id="92" idx="3"/>
+              <a:endCxn id="93" idx="0"/>
+            </p:cNvCxnSpPr>
+            <p:nvPr/>
+          </p:nvCxnSpPr>
+          <p:spPr>
+            <a:xfrm>
+              <a:off x="3132540" y="-105094"/>
+              <a:ext cx="391599" cy="496473"/>
+            </a:xfrm>
+            <a:prstGeom prst="bentConnector2">
+              <a:avLst/>
+            </a:prstGeom>
+            <a:ln>
+              <a:solidFill>
+                <a:srgbClr val="1F497D"/>
+              </a:solidFill>
+              <a:tailEnd type="arrow"/>
+            </a:ln>
+            <a:effectLst/>
+          </p:spPr>
+          <p:style>
+            <a:lnRef idx="2">
+              <a:schemeClr val="accent1"/>
+            </a:lnRef>
+            <a:fillRef idx="0">
+              <a:schemeClr val="accent1"/>
+            </a:fillRef>
+            <a:effectRef idx="1">
+              <a:schemeClr val="accent1"/>
+            </a:effectRef>
+            <a:fontRef idx="minor">
+              <a:schemeClr val="tx1"/>
+            </a:fontRef>
+          </p:style>
+        </p:cxnSp>
+        <p:sp>
+          <p:nvSpPr>
+            <p:cNvPr id="104" name="Decision 103"/>
+            <p:cNvSpPr/>
+            <p:nvPr/>
+          </p:nvSpPr>
+          <p:spPr>
+            <a:xfrm>
+              <a:off x="4167384" y="1677175"/>
+              <a:ext cx="1927738" cy="800922"/>
+            </a:xfrm>
+            <a:prstGeom prst="flowChartDecision">
+              <a:avLst/>
+            </a:prstGeom>
+            <a:solidFill>
+              <a:srgbClr val="1F497D"/>
+            </a:solidFill>
+            <a:ln>
+              <a:noFill/>
+            </a:ln>
+            <a:effectLst/>
+          </p:spPr>
+          <p:style>
+            <a:lnRef idx="1">
+              <a:schemeClr val="accent1"/>
+            </a:lnRef>
+            <a:fillRef idx="3">
+              <a:schemeClr val="accent1"/>
+            </a:fillRef>
+            <a:effectRef idx="2">
+              <a:schemeClr val="accent1"/>
+            </a:effectRef>
+            <a:fontRef idx="minor">
+              <a:schemeClr val="lt1"/>
+            </a:fontRef>
+          </p:style>
+          <p:txBody>
+            <a:bodyPr wrap="square" lIns="36000" rIns="36000" rtlCol="0" anchor="ctr"/>
+            <a:lstStyle/>
+            <a:p>
+              <a:pPr algn="ctr"/>
+              <a:r>
+                <a:rPr lang="en-US" sz="1400" dirty="0" smtClean="0"/>
+                <a:t>Need transaction?</a:t>
+              </a:r>
+              <a:endParaRPr lang="en-US" sz="1400" dirty="0"/>
+            </a:p>
+          </p:txBody>
+        </p:sp>
+        <p:cxnSp>
+          <p:nvCxnSpPr>
+            <p:cNvPr id="105" name="Elbow Connector 104"/>
+            <p:cNvCxnSpPr>
+              <a:stCxn id="95" idx="3"/>
+              <a:endCxn id="104" idx="0"/>
+            </p:cNvCxnSpPr>
+            <p:nvPr/>
+          </p:nvCxnSpPr>
+          <p:spPr>
+            <a:xfrm>
+              <a:off x="4488008" y="1558797"/>
+              <a:ext cx="643245" cy="118378"/>
+            </a:xfrm>
+            <a:prstGeom prst="bentConnector2">
+              <a:avLst/>
+            </a:prstGeom>
+            <a:ln>
+              <a:solidFill>
+                <a:srgbClr val="1F497D"/>
+              </a:solidFill>
+              <a:tailEnd type="arrow"/>
+            </a:ln>
+            <a:effectLst/>
+          </p:spPr>
+          <p:style>
+            <a:lnRef idx="2">
+              <a:schemeClr val="accent1"/>
+            </a:lnRef>
+            <a:fillRef idx="0">
+              <a:schemeClr val="accent1"/>
+            </a:fillRef>
+            <a:effectRef idx="1">
+              <a:schemeClr val="accent1"/>
+            </a:effectRef>
+            <a:fontRef idx="minor">
+              <a:schemeClr val="tx1"/>
+            </a:fontRef>
+          </p:style>
+        </p:cxnSp>
+        <p:sp>
+          <p:nvSpPr>
+            <p:cNvPr id="108" name="Process 107"/>
+            <p:cNvSpPr/>
+            <p:nvPr/>
+          </p:nvSpPr>
+          <p:spPr>
+            <a:xfrm>
+              <a:off x="5282112" y="2549304"/>
+              <a:ext cx="1927738" cy="393077"/>
+            </a:xfrm>
+            <a:prstGeom prst="flowChartProcess">
+              <a:avLst/>
+            </a:prstGeom>
+            <a:solidFill>
+              <a:srgbClr val="1F497D"/>
+            </a:solidFill>
+            <a:ln>
+              <a:noFill/>
+            </a:ln>
+            <a:effectLst/>
+          </p:spPr>
+          <p:style>
+            <a:lnRef idx="1">
+              <a:schemeClr val="accent1"/>
+            </a:lnRef>
+            <a:fillRef idx="3">
+              <a:schemeClr val="accent1"/>
+            </a:fillRef>
+            <a:effectRef idx="2">
+              <a:schemeClr val="accent1"/>
+            </a:effectRef>
+            <a:fontRef idx="minor">
+              <a:schemeClr val="lt1"/>
+            </a:fontRef>
+          </p:style>
+          <p:txBody>
+            <a:bodyPr rtlCol="0" anchor="ctr"/>
+            <a:lstStyle/>
+            <a:p>
+              <a:pPr algn="ctr"/>
+              <a:r>
+                <a:rPr lang="en-US" sz="1400" dirty="0" err="1" smtClean="0"/>
+                <a:t>Enqueue</a:t>
+              </a:r>
+              <a:r>
+                <a:rPr lang="en-US" sz="1400" dirty="0" smtClean="0"/>
+                <a:t> transaction</a:t>
+              </a:r>
+              <a:endParaRPr lang="en-US" sz="1400" dirty="0"/>
+            </a:p>
+          </p:txBody>
+        </p:sp>
+        <p:cxnSp>
+          <p:nvCxnSpPr>
+            <p:cNvPr id="109" name="Elbow Connector 108"/>
+            <p:cNvCxnSpPr>
+              <a:stCxn id="104" idx="3"/>
+              <a:endCxn id="108" idx="0"/>
+            </p:cNvCxnSpPr>
+            <p:nvPr/>
+          </p:nvCxnSpPr>
+          <p:spPr>
+            <a:xfrm>
+              <a:off x="6095122" y="2077636"/>
+              <a:ext cx="150859" cy="471668"/>
+            </a:xfrm>
+            <a:prstGeom prst="bentConnector2">
+              <a:avLst/>
+            </a:prstGeom>
+            <a:ln>
+              <a:solidFill>
+                <a:srgbClr val="1F497D"/>
+              </a:solidFill>
+              <a:tailEnd type="arrow"/>
+            </a:ln>
+            <a:effectLst/>
+          </p:spPr>
+          <p:style>
+            <a:lnRef idx="2">
+              <a:schemeClr val="accent1"/>
+            </a:lnRef>
+            <a:fillRef idx="0">
+              <a:schemeClr val="accent1"/>
+            </a:fillRef>
+            <a:effectRef idx="1">
+              <a:schemeClr val="accent1"/>
+            </a:effectRef>
+            <a:fontRef idx="minor">
+              <a:schemeClr val="tx1"/>
+            </a:fontRef>
+          </p:style>
+        </p:cxnSp>
+        <p:cxnSp>
+          <p:nvCxnSpPr>
+            <p:cNvPr id="112" name="Straight Arrow Connector 111"/>
+            <p:cNvCxnSpPr>
+              <a:stCxn id="93" idx="2"/>
+              <a:endCxn id="95" idx="0"/>
+            </p:cNvCxnSpPr>
+            <p:nvPr/>
+          </p:nvCxnSpPr>
+          <p:spPr>
+            <a:xfrm>
+              <a:off x="3524139" y="784456"/>
+              <a:ext cx="0" cy="373880"/>
+            </a:xfrm>
+            <a:prstGeom prst="straightConnector1">
+              <a:avLst/>
+            </a:prstGeom>
+            <a:ln>
+              <a:solidFill>
+                <a:schemeClr val="tx2"/>
+              </a:solidFill>
+              <a:tailEnd type="arrow"/>
+            </a:ln>
+            <a:effectLst/>
+          </p:spPr>
+          <p:style>
+            <a:lnRef idx="2">
+              <a:schemeClr val="accent1"/>
+            </a:lnRef>
+            <a:fillRef idx="0">
+              <a:schemeClr val="accent1"/>
+            </a:fillRef>
+            <a:effectRef idx="1">
+              <a:schemeClr val="accent1"/>
+            </a:effectRef>
+            <a:fontRef idx="minor">
+              <a:schemeClr val="tx1"/>
+            </a:fontRef>
+          </p:style>
+        </p:cxnSp>
+        <p:sp>
+          <p:nvSpPr>
+            <p:cNvPr id="117" name="Process 116"/>
+            <p:cNvSpPr/>
+            <p:nvPr/>
+          </p:nvSpPr>
+          <p:spPr>
+            <a:xfrm>
+              <a:off x="2823185" y="2402527"/>
+              <a:ext cx="1927738" cy="539152"/>
+            </a:xfrm>
+            <a:prstGeom prst="flowChartProcess">
+              <a:avLst/>
+            </a:prstGeom>
+            <a:solidFill>
+              <a:srgbClr val="1F497D"/>
+            </a:solidFill>
+            <a:ln>
+              <a:noFill/>
+            </a:ln>
+            <a:effectLst/>
+          </p:spPr>
+          <p:style>
+            <a:lnRef idx="1">
+              <a:schemeClr val="accent1"/>
+            </a:lnRef>
+            <a:fillRef idx="3">
+              <a:schemeClr val="accent1"/>
+            </a:fillRef>
+            <a:effectRef idx="2">
+              <a:schemeClr val="accent1"/>
+            </a:effectRef>
+            <a:fontRef idx="minor">
+              <a:schemeClr val="lt1"/>
+            </a:fontRef>
+          </p:style>
+          <p:txBody>
+            <a:bodyPr rtlCol="0" anchor="ctr"/>
+            <a:lstStyle/>
+            <a:p>
+              <a:pPr algn="ctr"/>
+              <a:r>
+                <a:rPr lang="en-US" sz="1400" dirty="0" smtClean="0"/>
+                <a:t>Change states of target cache</a:t>
+              </a:r>
+              <a:endParaRPr lang="en-US" sz="1400" dirty="0"/>
+            </a:p>
+          </p:txBody>
+        </p:sp>
+        <p:cxnSp>
+          <p:nvCxnSpPr>
+            <p:cNvPr id="118" name="Elbow Connector 117"/>
+            <p:cNvCxnSpPr>
+              <a:stCxn id="104" idx="1"/>
+              <a:endCxn id="117" idx="0"/>
+            </p:cNvCxnSpPr>
+            <p:nvPr/>
+          </p:nvCxnSpPr>
+          <p:spPr>
+            <a:xfrm rot="10800000" flipV="1">
+              <a:off x="3787054" y="2077635"/>
+              <a:ext cx="380330" cy="324891"/>
+            </a:xfrm>
+            <a:prstGeom prst="bentConnector2">
+              <a:avLst/>
+            </a:prstGeom>
+            <a:ln>
+              <a:solidFill>
+                <a:srgbClr val="1F497D"/>
+              </a:solidFill>
+              <a:tailEnd type="arrow"/>
+            </a:ln>
+            <a:effectLst/>
+          </p:spPr>
+          <p:style>
+            <a:lnRef idx="2">
+              <a:schemeClr val="accent1"/>
+            </a:lnRef>
+            <a:fillRef idx="0">
+              <a:schemeClr val="accent1"/>
+            </a:fillRef>
+            <a:effectRef idx="1">
+              <a:schemeClr val="accent1"/>
+            </a:effectRef>
+            <a:fontRef idx="minor">
+              <a:schemeClr val="tx1"/>
+            </a:fontRef>
+          </p:style>
+        </p:cxnSp>
+        <p:sp>
+          <p:nvSpPr>
+            <p:cNvPr id="122" name="Process 121"/>
+            <p:cNvSpPr/>
+            <p:nvPr/>
+          </p:nvSpPr>
+          <p:spPr>
+            <a:xfrm>
+              <a:off x="1204802" y="1925958"/>
+              <a:ext cx="1927738" cy="393077"/>
+            </a:xfrm>
+            <a:prstGeom prst="flowChartProcess">
+              <a:avLst/>
+            </a:prstGeom>
+            <a:solidFill>
+              <a:srgbClr val="1F497D"/>
+            </a:solidFill>
+            <a:ln>
+              <a:noFill/>
+            </a:ln>
+            <a:effectLst/>
+          </p:spPr>
+          <p:style>
+            <a:lnRef idx="1">
+              <a:schemeClr val="accent1"/>
+            </a:lnRef>
+            <a:fillRef idx="3">
+              <a:schemeClr val="accent1"/>
+            </a:fillRef>
+            <a:effectRef idx="2">
+              <a:schemeClr val="accent1"/>
+            </a:effectRef>
+            <a:fontRef idx="minor">
+              <a:schemeClr val="lt1"/>
+            </a:fontRef>
+          </p:style>
+          <p:txBody>
+            <a:bodyPr rtlCol="0" anchor="ctr"/>
+            <a:lstStyle/>
+            <a:p>
+              <a:pPr algn="ctr"/>
+              <a:r>
+                <a:rPr lang="en-US" sz="1400" dirty="0" err="1" smtClean="0"/>
+                <a:t>Enqueue</a:t>
+              </a:r>
+              <a:r>
+                <a:rPr lang="en-US" sz="1400" dirty="0" smtClean="0"/>
+                <a:t> data request</a:t>
+              </a:r>
+              <a:endParaRPr lang="en-US" sz="1400" dirty="0"/>
+            </a:p>
+          </p:txBody>
+        </p:sp>
+        <p:cxnSp>
+          <p:nvCxnSpPr>
+            <p:cNvPr id="123" name="Elbow Connector 122"/>
+            <p:cNvCxnSpPr>
+              <a:stCxn id="95" idx="1"/>
+              <a:endCxn id="122" idx="0"/>
+            </p:cNvCxnSpPr>
+            <p:nvPr/>
+          </p:nvCxnSpPr>
+          <p:spPr>
+            <a:xfrm rot="10800000" flipV="1">
+              <a:off x="2168672" y="1558796"/>
+              <a:ext cx="391599" cy="367161"/>
+            </a:xfrm>
+            <a:prstGeom prst="bentConnector2">
+              <a:avLst/>
+            </a:prstGeom>
+            <a:ln>
+              <a:solidFill>
+                <a:srgbClr val="1F497D"/>
+              </a:solidFill>
+              <a:tailEnd type="arrow"/>
+            </a:ln>
+            <a:effectLst/>
+          </p:spPr>
+          <p:style>
+            <a:lnRef idx="2">
+              <a:schemeClr val="accent1"/>
+            </a:lnRef>
+            <a:fillRef idx="0">
+              <a:schemeClr val="accent1"/>
+            </a:fillRef>
+            <a:effectRef idx="1">
+              <a:schemeClr val="accent1"/>
+            </a:effectRef>
+            <a:fontRef idx="minor">
+              <a:schemeClr val="tx1"/>
+            </a:fontRef>
+          </p:style>
+        </p:cxnSp>
+        <p:sp>
+          <p:nvSpPr>
+            <p:cNvPr id="126" name="Decision 125"/>
+            <p:cNvSpPr/>
+            <p:nvPr/>
+          </p:nvSpPr>
+          <p:spPr>
+            <a:xfrm>
+              <a:off x="1200522" y="3175430"/>
+              <a:ext cx="1927738" cy="800922"/>
+            </a:xfrm>
+            <a:prstGeom prst="flowChartDecision">
+              <a:avLst/>
+            </a:prstGeom>
+            <a:solidFill>
+              <a:srgbClr val="1F497D"/>
+            </a:solidFill>
+            <a:ln>
+              <a:noFill/>
+            </a:ln>
+            <a:effectLst/>
+          </p:spPr>
+          <p:style>
+            <a:lnRef idx="1">
+              <a:schemeClr val="accent1"/>
+            </a:lnRef>
+            <a:fillRef idx="3">
+              <a:schemeClr val="accent1"/>
+            </a:fillRef>
+            <a:effectRef idx="2">
+              <a:schemeClr val="accent1"/>
+            </a:effectRef>
+            <a:fontRef idx="minor">
+              <a:schemeClr val="lt1"/>
+            </a:fontRef>
+          </p:style>
+          <p:txBody>
+            <a:bodyPr wrap="square" lIns="36000" rIns="36000" rtlCol="0" anchor="ctr"/>
+            <a:lstStyle/>
+            <a:p>
+              <a:pPr algn="ctr"/>
+              <a:r>
+                <a:rPr lang="en-US" sz="1400" dirty="0" smtClean="0"/>
+                <a:t>Data bus busy?</a:t>
+              </a:r>
+              <a:endParaRPr lang="en-US" sz="1400" dirty="0"/>
+            </a:p>
+          </p:txBody>
+        </p:sp>
+        <p:cxnSp>
+          <p:nvCxnSpPr>
+            <p:cNvPr id="127" name="Elbow Connector 126"/>
+            <p:cNvCxnSpPr>
+              <a:stCxn id="117" idx="2"/>
+              <a:endCxn id="126" idx="0"/>
+            </p:cNvCxnSpPr>
+            <p:nvPr/>
+          </p:nvCxnSpPr>
+          <p:spPr>
+            <a:xfrm rot="5400000">
+              <a:off x="2858848" y="2247223"/>
+              <a:ext cx="233751" cy="1622663"/>
+            </a:xfrm>
+            <a:prstGeom prst="bentConnector3">
+              <a:avLst>
+                <a:gd name="adj1" fmla="val 50000"/>
+              </a:avLst>
+            </a:prstGeom>
+            <a:ln>
+              <a:solidFill>
+                <a:srgbClr val="1F497D"/>
+              </a:solidFill>
+              <a:tailEnd type="arrow"/>
+            </a:ln>
+            <a:effectLst/>
+          </p:spPr>
+          <p:style>
+            <a:lnRef idx="2">
+              <a:schemeClr val="accent1"/>
+            </a:lnRef>
+            <a:fillRef idx="0">
+              <a:schemeClr val="accent1"/>
+            </a:fillRef>
+            <a:effectRef idx="1">
+              <a:schemeClr val="accent1"/>
+            </a:effectRef>
+            <a:fontRef idx="minor">
+              <a:schemeClr val="tx1"/>
+            </a:fontRef>
+          </p:style>
+        </p:cxnSp>
+        <p:cxnSp>
+          <p:nvCxnSpPr>
+            <p:cNvPr id="135" name="Elbow Connector 134"/>
+            <p:cNvCxnSpPr>
+              <a:stCxn id="108" idx="2"/>
+              <a:endCxn id="126" idx="0"/>
+            </p:cNvCxnSpPr>
+            <p:nvPr/>
+          </p:nvCxnSpPr>
+          <p:spPr>
+            <a:xfrm rot="5400000">
+              <a:off x="4088662" y="1018110"/>
+              <a:ext cx="233049" cy="4081590"/>
+            </a:xfrm>
+            <a:prstGeom prst="bentConnector3">
+              <a:avLst>
+                <a:gd name="adj1" fmla="val 50000"/>
+              </a:avLst>
+            </a:prstGeom>
+            <a:ln>
+              <a:solidFill>
+                <a:srgbClr val="1F497D"/>
+              </a:solidFill>
+              <a:tailEnd type="arrow"/>
+            </a:ln>
+            <a:effectLst/>
+          </p:spPr>
+          <p:style>
+            <a:lnRef idx="2">
+              <a:schemeClr val="accent1"/>
+            </a:lnRef>
+            <a:fillRef idx="0">
+              <a:schemeClr val="accent1"/>
+            </a:fillRef>
+            <a:effectRef idx="1">
+              <a:schemeClr val="accent1"/>
+            </a:effectRef>
+            <a:fontRef idx="minor">
+              <a:schemeClr val="tx1"/>
+            </a:fontRef>
+          </p:style>
+        </p:cxnSp>
+        <p:cxnSp>
+          <p:nvCxnSpPr>
+            <p:cNvPr id="147" name="Straight Arrow Connector 146"/>
+            <p:cNvCxnSpPr>
+              <a:stCxn id="122" idx="2"/>
+              <a:endCxn id="126" idx="0"/>
+            </p:cNvCxnSpPr>
+            <p:nvPr/>
+          </p:nvCxnSpPr>
+          <p:spPr>
+            <a:xfrm flipH="1">
+              <a:off x="2164391" y="2319035"/>
+              <a:ext cx="4280" cy="856395"/>
+            </a:xfrm>
+            <a:prstGeom prst="straightConnector1">
+              <a:avLst/>
+            </a:prstGeom>
+            <a:ln>
+              <a:solidFill>
+                <a:schemeClr val="tx2"/>
+              </a:solidFill>
+              <a:tailEnd type="arrow"/>
+            </a:ln>
+            <a:effectLst/>
+          </p:spPr>
+          <p:style>
+            <a:lnRef idx="2">
+              <a:schemeClr val="accent1"/>
+            </a:lnRef>
+            <a:fillRef idx="0">
+              <a:schemeClr val="accent1"/>
+            </a:fillRef>
+            <a:effectRef idx="1">
+              <a:schemeClr val="accent1"/>
+            </a:effectRef>
+            <a:fontRef idx="minor">
+              <a:schemeClr val="tx1"/>
+            </a:fontRef>
+          </p:style>
+        </p:cxnSp>
+        <p:cxnSp>
+          <p:nvCxnSpPr>
+            <p:cNvPr id="163" name="Elbow Connector 162"/>
+            <p:cNvCxnSpPr>
+              <a:stCxn id="92" idx="2"/>
+            </p:cNvCxnSpPr>
+            <p:nvPr/>
+          </p:nvCxnSpPr>
+          <p:spPr>
+            <a:xfrm rot="5400000">
+              <a:off x="185306" y="1073930"/>
+              <a:ext cx="2761928" cy="1204802"/>
+            </a:xfrm>
+            <a:prstGeom prst="bentConnector3">
+              <a:avLst>
+                <a:gd name="adj1" fmla="val 34523"/>
+              </a:avLst>
+            </a:prstGeom>
+            <a:ln>
+              <a:solidFill>
+                <a:srgbClr val="1F497D"/>
+              </a:solidFill>
+            </a:ln>
+            <a:effectLst/>
+          </p:spPr>
+          <p:style>
+            <a:lnRef idx="2">
+              <a:schemeClr val="accent1"/>
+            </a:lnRef>
+            <a:fillRef idx="0">
+              <a:schemeClr val="accent1"/>
+            </a:fillRef>
+            <a:effectRef idx="1">
+              <a:schemeClr val="accent1"/>
+            </a:effectRef>
+            <a:fontRef idx="minor">
+              <a:schemeClr val="tx1"/>
+            </a:fontRef>
+          </p:style>
+        </p:cxnSp>
+        <p:cxnSp>
+          <p:nvCxnSpPr>
+            <p:cNvPr id="170" name="Elbow Connector 169"/>
+            <p:cNvCxnSpPr>
+              <a:endCxn id="126" idx="0"/>
+            </p:cNvCxnSpPr>
+            <p:nvPr/>
+          </p:nvCxnSpPr>
+          <p:spPr>
+            <a:xfrm>
+              <a:off x="963870" y="3057293"/>
+              <a:ext cx="1200521" cy="118137"/>
+            </a:xfrm>
+            <a:prstGeom prst="bentConnector2">
+              <a:avLst/>
+            </a:prstGeom>
+            <a:ln>
+              <a:solidFill>
+                <a:srgbClr val="1F497D"/>
+              </a:solidFill>
+              <a:tailEnd type="arrow"/>
+            </a:ln>
+            <a:effectLst/>
+          </p:spPr>
+          <p:style>
+            <a:lnRef idx="2">
+              <a:schemeClr val="accent1"/>
+            </a:lnRef>
+            <a:fillRef idx="0">
+              <a:schemeClr val="accent1"/>
+            </a:fillRef>
+            <a:effectRef idx="1">
+              <a:schemeClr val="accent1"/>
+            </a:effectRef>
+            <a:fontRef idx="minor">
+              <a:schemeClr val="tx1"/>
+            </a:fontRef>
+          </p:style>
+        </p:cxnSp>
+        <p:sp>
+          <p:nvSpPr>
+            <p:cNvPr id="178" name="Process 177"/>
+            <p:cNvSpPr/>
+            <p:nvPr/>
+          </p:nvSpPr>
+          <p:spPr>
+            <a:xfrm>
+              <a:off x="3859850" y="4078798"/>
+              <a:ext cx="1927738" cy="393077"/>
+            </a:xfrm>
+            <a:prstGeom prst="flowChartProcess">
+              <a:avLst/>
+            </a:prstGeom>
+            <a:solidFill>
+              <a:srgbClr val="1F497D"/>
+            </a:solidFill>
+            <a:ln>
+              <a:noFill/>
+            </a:ln>
+            <a:effectLst/>
+          </p:spPr>
+          <p:style>
+            <a:lnRef idx="1">
+              <a:schemeClr val="accent1"/>
+            </a:lnRef>
+            <a:fillRef idx="3">
+              <a:schemeClr val="accent1"/>
+            </a:fillRef>
+            <a:effectRef idx="2">
+              <a:schemeClr val="accent1"/>
+            </a:effectRef>
+            <a:fontRef idx="minor">
+              <a:schemeClr val="lt1"/>
+            </a:fontRef>
+          </p:style>
+          <p:txBody>
+            <a:bodyPr rtlCol="0" anchor="ctr"/>
+            <a:lstStyle/>
+            <a:p>
+              <a:pPr algn="ctr"/>
+              <a:r>
+                <a:rPr lang="en-US" sz="1400" dirty="0" smtClean="0"/>
+                <a:t>Request countdown --</a:t>
+              </a:r>
+              <a:endParaRPr lang="en-US" sz="1400" dirty="0"/>
+            </a:p>
+          </p:txBody>
+        </p:sp>
+        <p:sp>
+          <p:nvSpPr>
+            <p:cNvPr id="180" name="Process 179"/>
+            <p:cNvSpPr/>
+            <p:nvPr/>
+          </p:nvSpPr>
+          <p:spPr>
+            <a:xfrm>
+              <a:off x="-174207" y="4078798"/>
+              <a:ext cx="1927738" cy="393077"/>
+            </a:xfrm>
+            <a:prstGeom prst="flowChartProcess">
+              <a:avLst/>
+            </a:prstGeom>
+            <a:solidFill>
+              <a:srgbClr val="1F497D"/>
+            </a:solidFill>
+            <a:ln>
+              <a:noFill/>
+            </a:ln>
+            <a:effectLst/>
+          </p:spPr>
+          <p:style>
+            <a:lnRef idx="1">
+              <a:schemeClr val="accent1"/>
+            </a:lnRef>
+            <a:fillRef idx="3">
+              <a:schemeClr val="accent1"/>
+            </a:fillRef>
+            <a:effectRef idx="2">
+              <a:schemeClr val="accent1"/>
+            </a:effectRef>
+            <a:fontRef idx="minor">
+              <a:schemeClr val="lt1"/>
+            </a:fontRef>
+          </p:style>
+          <p:txBody>
+            <a:bodyPr rtlCol="0" anchor="ctr"/>
+            <a:lstStyle/>
+            <a:p>
+              <a:pPr algn="ctr"/>
+              <a:r>
+                <a:rPr lang="en-US" sz="1400" dirty="0" smtClean="0"/>
+                <a:t>Dequeue data request</a:t>
+              </a:r>
+              <a:endParaRPr lang="en-US" sz="1400" dirty="0"/>
+            </a:p>
+          </p:txBody>
+        </p:sp>
+        <p:sp>
+          <p:nvSpPr>
+            <p:cNvPr id="181" name="Decision 180"/>
+            <p:cNvSpPr/>
+            <p:nvPr/>
+          </p:nvSpPr>
+          <p:spPr>
+            <a:xfrm>
+              <a:off x="-174207" y="4738733"/>
+              <a:ext cx="1927738" cy="800922"/>
+            </a:xfrm>
+            <a:prstGeom prst="flowChartDecision">
+              <a:avLst/>
+            </a:prstGeom>
+            <a:solidFill>
+              <a:srgbClr val="1F497D"/>
+            </a:solidFill>
+            <a:ln>
+              <a:noFill/>
+            </a:ln>
+            <a:effectLst/>
+          </p:spPr>
+          <p:style>
+            <a:lnRef idx="1">
+              <a:schemeClr val="accent1"/>
+            </a:lnRef>
+            <a:fillRef idx="3">
+              <a:schemeClr val="accent1"/>
+            </a:fillRef>
+            <a:effectRef idx="2">
+              <a:schemeClr val="accent1"/>
+            </a:effectRef>
+            <a:fontRef idx="minor">
+              <a:schemeClr val="lt1"/>
+            </a:fontRef>
+          </p:style>
+          <p:txBody>
+            <a:bodyPr wrap="square" lIns="36000" rIns="36000" rtlCol="0" anchor="ctr"/>
+            <a:lstStyle/>
+            <a:p>
+              <a:pPr algn="ctr"/>
+              <a:r>
+                <a:rPr lang="en-US" sz="1400" dirty="0" smtClean="0"/>
+                <a:t>Block shared?</a:t>
+              </a:r>
+              <a:endParaRPr lang="en-US" sz="1400" dirty="0"/>
+            </a:p>
+          </p:txBody>
+        </p:sp>
+        <p:sp>
+          <p:nvSpPr>
+            <p:cNvPr id="182" name="Process 181"/>
+            <p:cNvSpPr/>
+            <p:nvPr/>
+          </p:nvSpPr>
+          <p:spPr>
+            <a:xfrm>
+              <a:off x="-963868" y="5671858"/>
+              <a:ext cx="1291738" cy="393077"/>
+            </a:xfrm>
+            <a:prstGeom prst="flowChartProcess">
+              <a:avLst/>
+            </a:prstGeom>
+            <a:solidFill>
+              <a:srgbClr val="1F497D"/>
+            </a:solidFill>
+            <a:ln>
+              <a:noFill/>
+            </a:ln>
+            <a:effectLst/>
+          </p:spPr>
+          <p:style>
+            <a:lnRef idx="1">
+              <a:schemeClr val="accent1"/>
+            </a:lnRef>
+            <a:fillRef idx="3">
+              <a:schemeClr val="accent1"/>
+            </a:fillRef>
+            <a:effectRef idx="2">
+              <a:schemeClr val="accent1"/>
+            </a:effectRef>
+            <a:fontRef idx="minor">
+              <a:schemeClr val="lt1"/>
+            </a:fontRef>
+          </p:style>
+          <p:txBody>
+            <a:bodyPr rtlCol="0" anchor="ctr"/>
+            <a:lstStyle/>
+            <a:p>
+              <a:pPr algn="ctr"/>
+              <a:r>
+                <a:rPr lang="en-US" sz="1400" dirty="0" smtClean="0"/>
+                <a:t>Flush</a:t>
+              </a:r>
+              <a:endParaRPr lang="en-US" sz="1400" dirty="0"/>
+            </a:p>
+          </p:txBody>
+        </p:sp>
+        <p:sp>
+          <p:nvSpPr>
+            <p:cNvPr id="183" name="Process 182"/>
+            <p:cNvSpPr/>
+            <p:nvPr/>
+          </p:nvSpPr>
+          <p:spPr>
+            <a:xfrm>
+              <a:off x="1060949" y="5671858"/>
+              <a:ext cx="1725393" cy="393077"/>
+            </a:xfrm>
+            <a:prstGeom prst="flowChartProcess">
+              <a:avLst/>
+            </a:prstGeom>
+            <a:solidFill>
+              <a:srgbClr val="1F497D"/>
+            </a:solidFill>
+            <a:ln>
+              <a:noFill/>
+            </a:ln>
+            <a:effectLst/>
+          </p:spPr>
+          <p:style>
+            <a:lnRef idx="1">
+              <a:schemeClr val="accent1"/>
+            </a:lnRef>
+            <a:fillRef idx="3">
+              <a:schemeClr val="accent1"/>
+            </a:fillRef>
+            <a:effectRef idx="2">
+              <a:schemeClr val="accent1"/>
+            </a:effectRef>
+            <a:fontRef idx="minor">
+              <a:schemeClr val="lt1"/>
+            </a:fontRef>
+          </p:style>
+          <p:txBody>
+            <a:bodyPr rtlCol="0" anchor="ctr"/>
+            <a:lstStyle/>
+            <a:p>
+              <a:pPr algn="ctr"/>
+              <a:r>
+                <a:rPr lang="en-US" sz="1400" dirty="0" smtClean="0"/>
+                <a:t>Fetch form MEM</a:t>
+              </a:r>
+              <a:endParaRPr lang="en-US" sz="1400" dirty="0"/>
+            </a:p>
+          </p:txBody>
+        </p:sp>
+        <p:cxnSp>
+          <p:nvCxnSpPr>
+            <p:cNvPr id="184" name="Elbow Connector 183"/>
+            <p:cNvCxnSpPr>
+              <a:stCxn id="126" idx="1"/>
+              <a:endCxn id="180" idx="0"/>
+            </p:cNvCxnSpPr>
+            <p:nvPr/>
+          </p:nvCxnSpPr>
+          <p:spPr>
+            <a:xfrm rot="10800000" flipV="1">
+              <a:off x="789662" y="3575890"/>
+              <a:ext cx="410860" cy="502907"/>
+            </a:xfrm>
+            <a:prstGeom prst="bentConnector2">
+              <a:avLst/>
+            </a:prstGeom>
+            <a:ln>
+              <a:solidFill>
+                <a:srgbClr val="1F497D"/>
+              </a:solidFill>
+              <a:tailEnd type="arrow"/>
+            </a:ln>
+            <a:effectLst/>
+          </p:spPr>
+          <p:style>
+            <a:lnRef idx="2">
+              <a:schemeClr val="accent1"/>
+            </a:lnRef>
+            <a:fillRef idx="0">
+              <a:schemeClr val="accent1"/>
+            </a:fillRef>
+            <a:effectRef idx="1">
+              <a:schemeClr val="accent1"/>
+            </a:effectRef>
+            <a:fontRef idx="minor">
+              <a:schemeClr val="tx1"/>
+            </a:fontRef>
+          </p:style>
+        </p:cxnSp>
+        <p:cxnSp>
+          <p:nvCxnSpPr>
+            <p:cNvPr id="187" name="Elbow Connector 186"/>
+            <p:cNvCxnSpPr>
+              <a:stCxn id="126" idx="3"/>
+              <a:endCxn id="178" idx="0"/>
+            </p:cNvCxnSpPr>
+            <p:nvPr/>
+          </p:nvCxnSpPr>
+          <p:spPr>
+            <a:xfrm>
+              <a:off x="3128260" y="3575891"/>
+              <a:ext cx="1695459" cy="502907"/>
+            </a:xfrm>
+            <a:prstGeom prst="bentConnector2">
+              <a:avLst/>
+            </a:prstGeom>
+            <a:ln>
+              <a:solidFill>
+                <a:srgbClr val="1F497D"/>
+              </a:solidFill>
+              <a:tailEnd type="arrow"/>
+            </a:ln>
+            <a:effectLst/>
+          </p:spPr>
+          <p:style>
+            <a:lnRef idx="2">
+              <a:schemeClr val="accent1"/>
+            </a:lnRef>
+            <a:fillRef idx="0">
+              <a:schemeClr val="accent1"/>
+            </a:fillRef>
+            <a:effectRef idx="1">
+              <a:schemeClr val="accent1"/>
+            </a:effectRef>
+            <a:fontRef idx="minor">
+              <a:schemeClr val="tx1"/>
+            </a:fontRef>
+          </p:style>
+        </p:cxnSp>
+        <p:cxnSp>
+          <p:nvCxnSpPr>
+            <p:cNvPr id="191" name="Elbow Connector 190"/>
+            <p:cNvCxnSpPr>
+              <a:stCxn id="181" idx="3"/>
+              <a:endCxn id="183" idx="0"/>
+            </p:cNvCxnSpPr>
+            <p:nvPr/>
+          </p:nvCxnSpPr>
+          <p:spPr>
+            <a:xfrm>
+              <a:off x="1753531" y="5139194"/>
+              <a:ext cx="170115" cy="532664"/>
+            </a:xfrm>
+            <a:prstGeom prst="bentConnector2">
+              <a:avLst/>
+            </a:prstGeom>
+            <a:ln>
+              <a:solidFill>
+                <a:srgbClr val="1F497D"/>
+              </a:solidFill>
+              <a:tailEnd type="arrow"/>
+            </a:ln>
+            <a:effectLst/>
+          </p:spPr>
+          <p:style>
+            <a:lnRef idx="2">
+              <a:schemeClr val="accent1"/>
+            </a:lnRef>
+            <a:fillRef idx="0">
+              <a:schemeClr val="accent1"/>
+            </a:fillRef>
+            <a:effectRef idx="1">
+              <a:schemeClr val="accent1"/>
+            </a:effectRef>
+            <a:fontRef idx="minor">
+              <a:schemeClr val="tx1"/>
+            </a:fontRef>
+          </p:style>
+        </p:cxnSp>
+        <p:cxnSp>
+          <p:nvCxnSpPr>
+            <p:cNvPr id="194" name="Elbow Connector 193"/>
+            <p:cNvCxnSpPr>
+              <a:stCxn id="181" idx="1"/>
+              <a:endCxn id="182" idx="0"/>
+            </p:cNvCxnSpPr>
+            <p:nvPr/>
+          </p:nvCxnSpPr>
+          <p:spPr>
+            <a:xfrm rot="10800000" flipV="1">
+              <a:off x="-317999" y="5139194"/>
+              <a:ext cx="143792" cy="532664"/>
+            </a:xfrm>
+            <a:prstGeom prst="bentConnector2">
+              <a:avLst/>
+            </a:prstGeom>
+            <a:ln>
+              <a:solidFill>
+                <a:srgbClr val="1F497D"/>
+              </a:solidFill>
+              <a:tailEnd type="arrow"/>
+            </a:ln>
+            <a:effectLst/>
+          </p:spPr>
+          <p:style>
+            <a:lnRef idx="2">
+              <a:schemeClr val="accent1"/>
+            </a:lnRef>
+            <a:fillRef idx="0">
+              <a:schemeClr val="accent1"/>
+            </a:fillRef>
+            <a:effectRef idx="1">
+              <a:schemeClr val="accent1"/>
+            </a:effectRef>
+            <a:fontRef idx="minor">
+              <a:schemeClr val="tx1"/>
+            </a:fontRef>
+          </p:style>
+        </p:cxnSp>
+        <p:cxnSp>
+          <p:nvCxnSpPr>
+            <p:cNvPr id="201" name="Straight Arrow Connector 200"/>
+            <p:cNvCxnSpPr>
+              <a:stCxn id="180" idx="2"/>
+              <a:endCxn id="181" idx="0"/>
+            </p:cNvCxnSpPr>
+            <p:nvPr/>
+          </p:nvCxnSpPr>
+          <p:spPr>
+            <a:xfrm>
+              <a:off x="789662" y="4471875"/>
+              <a:ext cx="0" cy="266858"/>
+            </a:xfrm>
+            <a:prstGeom prst="straightConnector1">
+              <a:avLst/>
+            </a:prstGeom>
+            <a:ln>
+              <a:solidFill>
+                <a:schemeClr val="tx2"/>
+              </a:solidFill>
+              <a:tailEnd type="arrow"/>
+            </a:ln>
+            <a:effectLst/>
+          </p:spPr>
+          <p:style>
+            <a:lnRef idx="2">
+              <a:schemeClr val="accent1"/>
+            </a:lnRef>
+            <a:fillRef idx="0">
+              <a:schemeClr val="accent1"/>
+            </a:fillRef>
+            <a:effectRef idx="1">
+              <a:schemeClr val="accent1"/>
+            </a:effectRef>
+            <a:fontRef idx="minor">
+              <a:schemeClr val="tx1"/>
+            </a:fontRef>
+          </p:style>
+        </p:cxnSp>
+        <p:cxnSp>
+          <p:nvCxnSpPr>
+            <p:cNvPr id="206" name="Straight Arrow Connector 205"/>
+            <p:cNvCxnSpPr>
+              <a:stCxn id="178" idx="2"/>
+              <a:endCxn id="209" idx="0"/>
+            </p:cNvCxnSpPr>
+            <p:nvPr/>
+          </p:nvCxnSpPr>
+          <p:spPr>
+            <a:xfrm>
+              <a:off x="4823719" y="4471875"/>
+              <a:ext cx="0" cy="266858"/>
+            </a:xfrm>
+            <a:prstGeom prst="straightConnector1">
+              <a:avLst/>
+            </a:prstGeom>
+            <a:ln>
+              <a:solidFill>
+                <a:schemeClr val="tx2"/>
+              </a:solidFill>
+              <a:tailEnd type="arrow"/>
+            </a:ln>
+            <a:effectLst/>
+          </p:spPr>
+          <p:style>
+            <a:lnRef idx="2">
+              <a:schemeClr val="accent1"/>
+            </a:lnRef>
+            <a:fillRef idx="0">
+              <a:schemeClr val="accent1"/>
+            </a:fillRef>
+            <a:effectRef idx="1">
+              <a:schemeClr val="accent1"/>
+            </a:effectRef>
+            <a:fontRef idx="minor">
+              <a:schemeClr val="tx1"/>
+            </a:fontRef>
+          </p:style>
+        </p:cxnSp>
+        <p:sp>
+          <p:nvSpPr>
+            <p:cNvPr id="209" name="Process 208"/>
+            <p:cNvSpPr/>
+            <p:nvPr/>
+          </p:nvSpPr>
+          <p:spPr>
+            <a:xfrm>
+              <a:off x="3859850" y="4738733"/>
+              <a:ext cx="1927738" cy="1326202"/>
+            </a:xfrm>
+            <a:prstGeom prst="flowChartProcess">
+              <a:avLst/>
+            </a:prstGeom>
+            <a:solidFill>
+              <a:srgbClr val="1F497D"/>
+            </a:solidFill>
+            <a:ln>
+              <a:noFill/>
+            </a:ln>
+            <a:effectLst/>
+          </p:spPr>
+          <p:style>
+            <a:lnRef idx="1">
+              <a:schemeClr val="accent1"/>
+            </a:lnRef>
+            <a:fillRef idx="3">
+              <a:schemeClr val="accent1"/>
+            </a:fillRef>
+            <a:effectRef idx="2">
+              <a:schemeClr val="accent1"/>
+            </a:effectRef>
+            <a:fontRef idx="minor">
+              <a:schemeClr val="lt1"/>
+            </a:fontRef>
+          </p:style>
+          <p:txBody>
+            <a:bodyPr rtlCol="0" anchor="ctr"/>
+            <a:lstStyle/>
+            <a:p>
+              <a:pPr algn="ctr"/>
+              <a:r>
+                <a:rPr lang="en-US" sz="1400" dirty="0" err="1" smtClean="0"/>
+                <a:t>Enqueue</a:t>
+              </a:r>
+              <a:r>
+                <a:rPr lang="en-US" sz="1400" dirty="0" smtClean="0"/>
+                <a:t> new bus transaction based on data request status (Flush &amp; countdown=9, fetch &amp; countdown=0)</a:t>
+              </a:r>
+              <a:endParaRPr lang="en-US" sz="1400" dirty="0"/>
+            </a:p>
+          </p:txBody>
+        </p:sp>
+        <p:cxnSp>
+          <p:nvCxnSpPr>
+            <p:cNvPr id="217" name="Elbow Connector 216"/>
+            <p:cNvCxnSpPr>
+              <a:stCxn id="209" idx="2"/>
+              <a:endCxn id="37" idx="0"/>
+            </p:cNvCxnSpPr>
+            <p:nvPr/>
+          </p:nvCxnSpPr>
+          <p:spPr>
+            <a:xfrm rot="5400000" flipH="1">
+              <a:off x="-730501" y="510715"/>
+              <a:ext cx="9836166" cy="1272275"/>
+            </a:xfrm>
+            <a:prstGeom prst="bentConnector5">
+              <a:avLst>
+                <a:gd name="adj1" fmla="val -2324"/>
+                <a:gd name="adj2" fmla="val -230986"/>
+                <a:gd name="adj3" fmla="val 101449"/>
+              </a:avLst>
+            </a:prstGeom>
+            <a:ln>
+              <a:solidFill>
+                <a:srgbClr val="1F497D"/>
+              </a:solidFill>
+              <a:tailEnd type="arrow"/>
+            </a:ln>
+            <a:effectLst/>
+          </p:spPr>
+          <p:style>
+            <a:lnRef idx="2">
+              <a:schemeClr val="accent1"/>
+            </a:lnRef>
+            <a:fillRef idx="0">
+              <a:schemeClr val="accent1"/>
+            </a:fillRef>
+            <a:effectRef idx="1">
+              <a:schemeClr val="accent1"/>
+            </a:effectRef>
+            <a:fontRef idx="minor">
+              <a:schemeClr val="tx1"/>
+            </a:fontRef>
+          </p:style>
+        </p:cxnSp>
+        <p:cxnSp>
+          <p:nvCxnSpPr>
+            <p:cNvPr id="223" name="Elbow Connector 222"/>
+            <p:cNvCxnSpPr>
+              <a:stCxn id="183" idx="2"/>
+              <a:endCxn id="37" idx="0"/>
+            </p:cNvCxnSpPr>
+            <p:nvPr/>
+          </p:nvCxnSpPr>
+          <p:spPr>
+            <a:xfrm rot="5400000" flipH="1" flipV="1">
+              <a:off x="-2180538" y="332953"/>
+              <a:ext cx="9836166" cy="1627798"/>
+            </a:xfrm>
+            <a:prstGeom prst="bentConnector5">
+              <a:avLst>
+                <a:gd name="adj1" fmla="val -2324"/>
+                <a:gd name="adj2" fmla="val 358410"/>
+                <a:gd name="adj3" fmla="val 101449"/>
+              </a:avLst>
+            </a:prstGeom>
+            <a:ln>
+              <a:solidFill>
+                <a:srgbClr val="1F497D"/>
+              </a:solidFill>
+              <a:tailEnd type="arrow"/>
+            </a:ln>
+            <a:effectLst/>
+          </p:spPr>
+          <p:style>
+            <a:lnRef idx="2">
+              <a:schemeClr val="accent1"/>
+            </a:lnRef>
+            <a:fillRef idx="0">
+              <a:schemeClr val="accent1"/>
+            </a:fillRef>
+            <a:effectRef idx="1">
+              <a:schemeClr val="accent1"/>
+            </a:effectRef>
+            <a:fontRef idx="minor">
+              <a:schemeClr val="tx1"/>
+            </a:fontRef>
+          </p:style>
+        </p:cxnSp>
+        <p:cxnSp>
+          <p:nvCxnSpPr>
+            <p:cNvPr id="228" name="Elbow Connector 227"/>
+            <p:cNvCxnSpPr>
+              <a:stCxn id="182" idx="2"/>
+              <a:endCxn id="37" idx="0"/>
+            </p:cNvCxnSpPr>
+            <p:nvPr/>
+          </p:nvCxnSpPr>
+          <p:spPr>
+            <a:xfrm rot="5400000" flipH="1" flipV="1">
+              <a:off x="-3301361" y="-787870"/>
+              <a:ext cx="9836166" cy="3869443"/>
+            </a:xfrm>
+            <a:prstGeom prst="bentConnector5">
+              <a:avLst>
+                <a:gd name="adj1" fmla="val -2324"/>
+                <a:gd name="adj2" fmla="val 208904"/>
+                <a:gd name="adj3" fmla="val 101449"/>
+              </a:avLst>
+            </a:prstGeom>
+            <a:ln>
+              <a:solidFill>
+                <a:srgbClr val="1F497D"/>
+              </a:solidFill>
+              <a:tailEnd type="arrow"/>
+            </a:ln>
+            <a:effectLst/>
+          </p:spPr>
+          <p:style>
+            <a:lnRef idx="2">
+              <a:schemeClr val="accent1"/>
+            </a:lnRef>
+            <a:fillRef idx="0">
+              <a:schemeClr val="accent1"/>
+            </a:fillRef>
+            <a:effectRef idx="1">
+              <a:schemeClr val="accent1"/>
+            </a:effectRef>
+            <a:fontRef idx="minor">
+              <a:schemeClr val="tx1"/>
+            </a:fontRef>
+          </p:style>
+        </p:cxnSp>
+      </p:grpSp>
     </p:spTree>
     <p:extLst>
       <p:ext uri="{BB962C8B-B14F-4D97-AF65-F5344CB8AC3E}">

</xml_diff>

<commit_message>
add flow charts and uml
</commit_message>
<xml_diff>
--- a/structure_flow.pptx
+++ b/structure_flow.pptx
@@ -3098,153 +3098,793 @@
       </p:grpSpPr>
       <p:grpSp>
         <p:nvGrpSpPr>
-          <p:cNvPr id="17" name="Group 16"/>
+          <p:cNvPr id="6" name="Group 5"/>
           <p:cNvGrpSpPr/>
           <p:nvPr/>
         </p:nvGrpSpPr>
         <p:grpSpPr>
           <a:xfrm>
-            <a:off x="-136472" y="264115"/>
-            <a:ext cx="1949188" cy="1604739"/>
-            <a:chOff x="6857897" y="1247167"/>
-            <a:chExt cx="2199795" cy="2494339"/>
+            <a:off x="4291945" y="1039699"/>
+            <a:ext cx="6185020" cy="7971529"/>
+            <a:chOff x="4291945" y="1039699"/>
+            <a:chExt cx="6185020" cy="7971529"/>
           </a:xfrm>
         </p:grpSpPr>
-        <p:sp>
-          <p:nvSpPr>
-            <p:cNvPr id="5" name="Rectangle 4"/>
-            <p:cNvSpPr/>
+        <p:grpSp>
+          <p:nvGrpSpPr>
+            <p:cNvPr id="18" name="Group 17"/>
+            <p:cNvGrpSpPr/>
             <p:nvPr/>
-          </p:nvSpPr>
-          <p:spPr>
+          </p:nvGrpSpPr>
+          <p:grpSpPr>
             <a:xfrm>
-              <a:off x="6861074" y="1247167"/>
-              <a:ext cx="2196618" cy="2494339"/>
+              <a:off x="5776390" y="1039699"/>
+              <a:ext cx="3104635" cy="3455071"/>
+              <a:chOff x="6857897" y="1247167"/>
+              <a:chExt cx="2199793" cy="2494339"/>
             </a:xfrm>
-            <a:prstGeom prst="rect">
-              <a:avLst/>
-            </a:prstGeom>
-            <a:noFill/>
-            <a:ln w="28575" cmpd="sng">
-              <a:solidFill>
-                <a:schemeClr val="tx2"/>
-              </a:solidFill>
-            </a:ln>
-            <a:effectLst/>
-          </p:spPr>
-          <p:style>
-            <a:lnRef idx="1">
-              <a:schemeClr val="accent1"/>
-            </a:lnRef>
-            <a:fillRef idx="3">
-              <a:schemeClr val="accent1"/>
-            </a:fillRef>
-            <a:effectRef idx="2">
-              <a:schemeClr val="accent1"/>
-            </a:effectRef>
-            <a:fontRef idx="minor">
-              <a:schemeClr val="lt1"/>
-            </a:fontRef>
-          </p:style>
-          <p:txBody>
-            <a:bodyPr rtlCol="0" anchor="t"/>
-            <a:lstStyle/>
-            <a:p>
-              <a:pPr algn="ctr"/>
-              <a:r>
-                <a:rPr lang="en-US" sz="1200" b="1" dirty="0" smtClean="0">
-                  <a:solidFill>
-                    <a:schemeClr val="tx2"/>
-                  </a:solidFill>
-                </a:rPr>
-                <a:t>cacheBlock</a:t>
-              </a:r>
-            </a:p>
-            <a:p>
-              <a:pPr algn="ctr"/>
-              <a:endParaRPr lang="en-US" sz="1200" dirty="0">
+          </p:grpSpPr>
+          <p:sp>
+            <p:nvSpPr>
+              <p:cNvPr id="19" name="Rectangle 18"/>
+              <p:cNvSpPr/>
+              <p:nvPr/>
+            </p:nvSpPr>
+            <p:spPr>
+              <a:xfrm>
+                <a:off x="6861072" y="1247167"/>
+                <a:ext cx="2196618" cy="2494339"/>
+              </a:xfrm>
+              <a:prstGeom prst="rect">
+                <a:avLst/>
+              </a:prstGeom>
+              <a:noFill/>
+              <a:ln w="28575" cmpd="sng">
                 <a:solidFill>
                   <a:schemeClr val="tx2"/>
                 </a:solidFill>
-              </a:endParaRPr>
-            </a:p>
-            <a:p>
-              <a:r>
-                <a:rPr lang="en-US" sz="1200" dirty="0" smtClean="0">
+              </a:ln>
+              <a:effectLst/>
+            </p:spPr>
+            <p:style>
+              <a:lnRef idx="1">
+                <a:schemeClr val="accent1"/>
+              </a:lnRef>
+              <a:fillRef idx="3">
+                <a:schemeClr val="accent1"/>
+              </a:fillRef>
+              <a:effectRef idx="2">
+                <a:schemeClr val="accent1"/>
+              </a:effectRef>
+              <a:fontRef idx="minor">
+                <a:schemeClr val="lt1"/>
+              </a:fontRef>
+            </p:style>
+            <p:txBody>
+              <a:bodyPr rtlCol="0" anchor="t"/>
+              <a:lstStyle/>
+              <a:p>
+                <a:pPr algn="ctr"/>
+                <a:r>
+                  <a:rPr lang="en-US" sz="1200" b="1" dirty="0" smtClean="0">
+                    <a:solidFill>
+                      <a:srgbClr val="1F497D"/>
+                    </a:solidFill>
+                  </a:rPr>
+                  <a:t>cache</a:t>
+                </a:r>
+              </a:p>
+              <a:p>
+                <a:pPr algn="ctr"/>
+                <a:endParaRPr lang="en-US" sz="1200" dirty="0">
                   <a:solidFill>
-                    <a:schemeClr val="tx2"/>
+                    <a:srgbClr val="1F497D"/>
                   </a:solidFill>
-                </a:rPr>
-                <a:t>+ blockStatus : status</a:t>
-              </a:r>
-            </a:p>
-            <a:p>
-              <a:r>
-                <a:rPr lang="en-US" sz="1200" dirty="0" smtClean="0">
+                </a:endParaRPr>
+              </a:p>
+              <a:p>
+                <a:r>
+                  <a:rPr lang="en-US" sz="1200" dirty="0" smtClean="0">
+                    <a:solidFill>
+                      <a:srgbClr val="1F497D"/>
+                    </a:solidFill>
+                  </a:rPr>
+                  <a:t># _cacheSize : int</a:t>
+                </a:r>
+              </a:p>
+              <a:p>
+                <a:r>
+                  <a:rPr lang="en-US" sz="1200" dirty="0" smtClean="0">
+                    <a:solidFill>
+                      <a:srgbClr val="1F497D"/>
+                    </a:solidFill>
+                  </a:rPr>
+                  <a:t># _blockSize : int</a:t>
+                </a:r>
+              </a:p>
+              <a:p>
+                <a:r>
+                  <a:rPr lang="en-US" sz="1200" dirty="0" smtClean="0">
+                    <a:solidFill>
+                      <a:srgbClr val="1F497D"/>
+                    </a:solidFill>
+                  </a:rPr>
+                  <a:t># _associativity : int</a:t>
+                </a:r>
+              </a:p>
+              <a:p>
+                <a:r>
+                  <a:rPr lang="en-US" sz="1200" dirty="0" smtClean="0">
+                    <a:solidFill>
+                      <a:srgbClr val="1F497D"/>
+                    </a:solidFill>
+                  </a:rPr>
+                  <a:t># _height : int</a:t>
+                </a:r>
+              </a:p>
+              <a:p>
+                <a:r>
+                  <a:rPr lang="en-US" sz="1200" dirty="0" smtClean="0">
+                    <a:solidFill>
+                      <a:srgbClr val="1F497D"/>
+                    </a:solidFill>
+                  </a:rPr>
+                  <a:t>#</a:t>
+                </a:r>
+                <a:r>
+                  <a:rPr lang="en-US" sz="1200" dirty="0">
+                    <a:solidFill>
+                      <a:srgbClr val="1F497D"/>
+                    </a:solidFill>
+                  </a:rPr>
+                  <a:t> </a:t>
+                </a:r>
+                <a:r>
+                  <a:rPr lang="en-US" sz="1200" dirty="0" smtClean="0">
+                    <a:solidFill>
+                      <a:srgbClr val="1F497D"/>
+                    </a:solidFill>
+                  </a:rPr>
+                  <a:t>_width : int</a:t>
+                </a:r>
+              </a:p>
+              <a:p>
+                <a:r>
+                  <a:rPr lang="en-US" sz="1200" dirty="0" smtClean="0">
+                    <a:solidFill>
+                      <a:srgbClr val="1F497D"/>
+                    </a:solidFill>
+                  </a:rPr>
+                  <a:t># _numOfBlocks : int</a:t>
+                </a:r>
+              </a:p>
+              <a:p>
+                <a:r>
+                  <a:rPr lang="en-US" sz="1200" dirty="0" smtClean="0">
+                    <a:solidFill>
+                      <a:srgbClr val="1F497D"/>
+                    </a:solidFill>
+                  </a:rPr>
+                  <a:t># _cacheBlocks : vector&lt;vector&lt;cacheBlock&gt;&gt; </a:t>
+                </a:r>
+                <a:endParaRPr lang="en-US" sz="1200" dirty="0">
                   <a:solidFill>
-                    <a:schemeClr val="tx2"/>
+                    <a:srgbClr val="1F497D"/>
                   </a:solidFill>
-                </a:rPr>
-                <a:t>+ tag : int</a:t>
-              </a:r>
-            </a:p>
-            <a:p>
-              <a:r>
-                <a:rPr lang="en-US" sz="1200" dirty="0" smtClean="0">
+                </a:endParaRPr>
+              </a:p>
+              <a:p>
+                <a:r>
+                  <a:rPr lang="en-US" sz="1200" dirty="0" smtClean="0">
+                    <a:solidFill>
+                      <a:srgbClr val="1F497D"/>
+                    </a:solidFill>
+                  </a:rPr>
+                  <a:t>+ blocked : bool</a:t>
+                </a:r>
+              </a:p>
+              <a:p>
+                <a:endParaRPr lang="en-US" sz="1200" dirty="0">
                   <a:solidFill>
-                    <a:schemeClr val="tx2"/>
+                    <a:srgbClr val="1F497D"/>
                   </a:solidFill>
-                </a:rPr>
-                <a:t>+ numOfWords : int</a:t>
-              </a:r>
-            </a:p>
-            <a:p>
-              <a:r>
-                <a:rPr lang="en-US" sz="1200" dirty="0" smtClean="0">
+                </a:endParaRPr>
+              </a:p>
+              <a:p>
+                <a:r>
+                  <a:rPr lang="en-US" sz="1200" dirty="0" smtClean="0">
+                    <a:solidFill>
+                      <a:srgbClr val="1F497D"/>
+                    </a:solidFill>
+                  </a:rPr>
+                  <a:t># getRowIndex(addr : int) : int</a:t>
+                </a:r>
+              </a:p>
+              <a:p>
+                <a:r>
+                  <a:rPr lang="en-US" sz="1200" dirty="0" smtClean="0">
+                    <a:solidFill>
+                      <a:srgbClr val="1F497D"/>
+                    </a:solidFill>
+                  </a:rPr>
+                  <a:t># getColIndex(addr : int) : int</a:t>
+                </a:r>
+              </a:p>
+              <a:p>
+                <a:r>
+                  <a:rPr lang="en-US" sz="1200" dirty="0" smtClean="0">
+                    <a:solidFill>
+                      <a:srgbClr val="1F497D"/>
+                    </a:solidFill>
+                  </a:rPr>
+                  <a:t># </a:t>
+                </a:r>
+                <a:r>
+                  <a:rPr lang="en-US" sz="1200" dirty="0">
+                    <a:solidFill>
+                      <a:srgbClr val="1F497D"/>
+                    </a:solidFill>
+                  </a:rPr>
+                  <a:t>g</a:t>
+                </a:r>
+                <a:r>
+                  <a:rPr lang="en-US" sz="1200" dirty="0" smtClean="0">
+                    <a:solidFill>
+                      <a:srgbClr val="1F497D"/>
+                    </a:solidFill>
+                  </a:rPr>
+                  <a:t>etRowNum(addr : int) : int</a:t>
+                </a:r>
+              </a:p>
+              <a:p>
+                <a:r>
+                  <a:rPr lang="en-US" sz="1200" dirty="0" smtClean="0">
+                    <a:solidFill>
+                      <a:srgbClr val="1F497D"/>
+                    </a:solidFill>
+                  </a:rPr>
+                  <a:t>+ cache()</a:t>
+                </a:r>
+              </a:p>
+              <a:p>
+                <a:r>
+                  <a:rPr lang="en-US" sz="1200" dirty="0" smtClean="0">
+                    <a:solidFill>
+                      <a:srgbClr val="1F497D"/>
+                    </a:solidFill>
+                  </a:rPr>
+                  <a:t>+ cache(cacheSize : int, blockSize : int, associativity : int)</a:t>
+                </a:r>
+              </a:p>
+              <a:p>
+                <a:r>
+                  <a:rPr lang="en-US" sz="1200" dirty="0" smtClean="0">
+                    <a:solidFill>
+                      <a:srgbClr val="1F497D"/>
+                    </a:solidFill>
+                  </a:rPr>
+                  <a:t>+ isCacheHit(addr : unsigned) : bool</a:t>
+                </a:r>
+              </a:p>
+              <a:p>
+                <a:endParaRPr lang="en-US" sz="1200" dirty="0" smtClean="0">
                   <a:solidFill>
-                    <a:schemeClr val="tx2"/>
+                    <a:srgbClr val="1F497D"/>
                   </a:solidFill>
-                </a:rPr>
-                <a:t>+ lru : int</a:t>
-              </a:r>
-            </a:p>
-            <a:p>
-              <a:endParaRPr lang="en-US" sz="1200" dirty="0">
+                </a:endParaRPr>
+              </a:p>
+            </p:txBody>
+          </p:sp>
+          <p:cxnSp>
+            <p:nvCxnSpPr>
+              <p:cNvPr id="20" name="Straight Connector 19"/>
+              <p:cNvCxnSpPr/>
+              <p:nvPr/>
+            </p:nvCxnSpPr>
+            <p:spPr>
+              <a:xfrm>
+                <a:off x="6857897" y="1488596"/>
+                <a:ext cx="2199793" cy="0"/>
+              </a:xfrm>
+              <a:prstGeom prst="line">
+                <a:avLst/>
+              </a:prstGeom>
+              <a:ln w="28575" cmpd="sng">
                 <a:solidFill>
                   <a:schemeClr val="tx2"/>
                 </a:solidFill>
-              </a:endParaRPr>
-            </a:p>
-            <a:p>
-              <a:r>
-                <a:rPr lang="en-US" sz="1200" dirty="0" smtClean="0">
+              </a:ln>
+              <a:effectLst/>
+            </p:spPr>
+            <p:style>
+              <a:lnRef idx="2">
+                <a:schemeClr val="accent1"/>
+              </a:lnRef>
+              <a:fillRef idx="0">
+                <a:schemeClr val="accent1"/>
+              </a:fillRef>
+              <a:effectRef idx="1">
+                <a:schemeClr val="accent1"/>
+              </a:effectRef>
+              <a:fontRef idx="minor">
+                <a:schemeClr val="tx1"/>
+              </a:fontRef>
+            </p:style>
+          </p:cxnSp>
+          <p:cxnSp>
+            <p:nvCxnSpPr>
+              <p:cNvPr id="21" name="Straight Connector 20"/>
+              <p:cNvCxnSpPr/>
+              <p:nvPr/>
+            </p:nvCxnSpPr>
+            <p:spPr>
+              <a:xfrm>
+                <a:off x="6859185" y="2693168"/>
+                <a:ext cx="2198505" cy="0"/>
+              </a:xfrm>
+              <a:prstGeom prst="line">
+                <a:avLst/>
+              </a:prstGeom>
+              <a:ln w="28575" cmpd="sng">
+                <a:solidFill>
+                  <a:schemeClr val="tx2"/>
+                </a:solidFill>
+              </a:ln>
+              <a:effectLst/>
+            </p:spPr>
+            <p:style>
+              <a:lnRef idx="2">
+                <a:schemeClr val="accent1"/>
+              </a:lnRef>
+              <a:fillRef idx="0">
+                <a:schemeClr val="accent1"/>
+              </a:fillRef>
+              <a:effectRef idx="1">
+                <a:schemeClr val="accent1"/>
+              </a:effectRef>
+              <a:fontRef idx="minor">
+                <a:schemeClr val="tx1"/>
+              </a:fontRef>
+            </p:style>
+          </p:cxnSp>
+        </p:grpSp>
+        <p:grpSp>
+          <p:nvGrpSpPr>
+            <p:cNvPr id="24" name="Group 23"/>
+            <p:cNvGrpSpPr/>
+            <p:nvPr/>
+          </p:nvGrpSpPr>
+          <p:grpSpPr>
+            <a:xfrm>
+              <a:off x="7516978" y="5776855"/>
+              <a:ext cx="2959987" cy="2199637"/>
+              <a:chOff x="6857897" y="1247167"/>
+              <a:chExt cx="2199798" cy="2494339"/>
+            </a:xfrm>
+          </p:grpSpPr>
+          <p:sp>
+            <p:nvSpPr>
+              <p:cNvPr id="25" name="Rectangle 24"/>
+              <p:cNvSpPr/>
+              <p:nvPr/>
+            </p:nvSpPr>
+            <p:spPr>
+              <a:xfrm>
+                <a:off x="6861076" y="1247167"/>
+                <a:ext cx="2196619" cy="2494339"/>
+              </a:xfrm>
+              <a:prstGeom prst="rect">
+                <a:avLst/>
+              </a:prstGeom>
+              <a:noFill/>
+              <a:ln w="28575" cmpd="sng">
+                <a:solidFill>
+                  <a:schemeClr val="tx2"/>
+                </a:solidFill>
+              </a:ln>
+              <a:effectLst/>
+            </p:spPr>
+            <p:style>
+              <a:lnRef idx="1">
+                <a:schemeClr val="accent1"/>
+              </a:lnRef>
+              <a:fillRef idx="3">
+                <a:schemeClr val="accent1"/>
+              </a:fillRef>
+              <a:effectRef idx="2">
+                <a:schemeClr val="accent1"/>
+              </a:effectRef>
+              <a:fontRef idx="minor">
+                <a:schemeClr val="lt1"/>
+              </a:fontRef>
+            </p:style>
+            <p:txBody>
+              <a:bodyPr rtlCol="0" anchor="t"/>
+              <a:lstStyle/>
+              <a:p>
+                <a:pPr algn="ctr"/>
+                <a:r>
+                  <a:rPr lang="en-US" sz="1200" b="1" dirty="0" smtClean="0">
+                    <a:solidFill>
+                      <a:srgbClr val="1F497D"/>
+                    </a:solidFill>
+                  </a:rPr>
+                  <a:t>dragonCache</a:t>
+                </a:r>
+              </a:p>
+              <a:p>
+                <a:pPr algn="ctr"/>
+                <a:endParaRPr lang="en-US" sz="1200" dirty="0" smtClean="0">
                   <a:solidFill>
-                    <a:schemeClr val="tx2"/>
+                    <a:srgbClr val="1F497D"/>
                   </a:solidFill>
-                </a:rPr>
-                <a:t>+ cacheBlock(blockSize : int)</a:t>
-              </a:r>
-            </a:p>
-          </p:txBody>
-        </p:sp>
+                </a:endParaRPr>
+              </a:p>
+              <a:p>
+                <a:r>
+                  <a:rPr lang="en-US" sz="1200" dirty="0" smtClean="0">
+                    <a:solidFill>
+                      <a:srgbClr val="1F497D"/>
+                    </a:solidFill>
+                  </a:rPr>
+                  <a:t>+ dragonCache(cacheSize : int, blockSize : int, associativity : int)</a:t>
+                </a:r>
+              </a:p>
+              <a:p>
+                <a:endParaRPr lang="en-US" sz="1200" dirty="0">
+                  <a:solidFill>
+                    <a:srgbClr val="1F497D"/>
+                  </a:solidFill>
+                </a:endParaRPr>
+              </a:p>
+              <a:p>
+                <a:r>
+                  <a:rPr lang="en-US" sz="1200" dirty="0" smtClean="0">
+                    <a:solidFill>
+                      <a:srgbClr val="1F497D"/>
+                    </a:solidFill>
+                  </a:rPr>
+                  <a:t>+ selfChangeState(addr : unsigned, instrType : int, isHit : bool, cycle : int) : bool</a:t>
+                </a:r>
+              </a:p>
+              <a:p>
+                <a:r>
+                  <a:rPr lang="en-US" sz="1200" dirty="0" smtClean="0">
+                    <a:solidFill>
+                      <a:srgbClr val="1F497D"/>
+                    </a:solidFill>
+                  </a:rPr>
+                  <a:t>+</a:t>
+                </a:r>
+                <a:r>
+                  <a:rPr lang="en-US" sz="1200" dirty="0">
+                    <a:solidFill>
+                      <a:srgbClr val="1F497D"/>
+                    </a:solidFill>
+                  </a:rPr>
+                  <a:t> </a:t>
+                </a:r>
+                <a:r>
+                  <a:rPr lang="en-US" sz="1200" dirty="0" smtClean="0">
+                    <a:solidFill>
+                      <a:srgbClr val="1F497D"/>
+                    </a:solidFill>
+                  </a:rPr>
+                  <a:t>otherChangeState(addr : unsigned, transType : int, cycle : int) : int</a:t>
+                </a:r>
+              </a:p>
+              <a:p>
+                <a:r>
+                  <a:rPr lang="en-US" sz="1200" dirty="0" smtClean="0">
+                    <a:solidFill>
+                      <a:srgbClr val="1F497D"/>
+                    </a:solidFill>
+                  </a:rPr>
+                  <a:t>+ generateTransaction(addr : unsigned, instrType : int, prIndex : int) : transaction </a:t>
+                </a:r>
+                <a:endParaRPr lang="en-US" sz="1200" dirty="0">
+                  <a:solidFill>
+                    <a:srgbClr val="1F497D"/>
+                  </a:solidFill>
+                </a:endParaRPr>
+              </a:p>
+            </p:txBody>
+          </p:sp>
+          <p:cxnSp>
+            <p:nvCxnSpPr>
+              <p:cNvPr id="26" name="Straight Connector 25"/>
+              <p:cNvCxnSpPr/>
+              <p:nvPr/>
+            </p:nvCxnSpPr>
+            <p:spPr>
+              <a:xfrm>
+                <a:off x="6857897" y="1631828"/>
+                <a:ext cx="2199793" cy="0"/>
+              </a:xfrm>
+              <a:prstGeom prst="line">
+                <a:avLst/>
+              </a:prstGeom>
+              <a:ln w="28575" cmpd="sng">
+                <a:solidFill>
+                  <a:schemeClr val="tx2"/>
+                </a:solidFill>
+              </a:ln>
+              <a:effectLst/>
+            </p:spPr>
+            <p:style>
+              <a:lnRef idx="2">
+                <a:schemeClr val="accent1"/>
+              </a:lnRef>
+              <a:fillRef idx="0">
+                <a:schemeClr val="accent1"/>
+              </a:fillRef>
+              <a:effectRef idx="1">
+                <a:schemeClr val="accent1"/>
+              </a:effectRef>
+              <a:fontRef idx="minor">
+                <a:schemeClr val="tx1"/>
+              </a:fontRef>
+            </p:style>
+          </p:cxnSp>
+        </p:grpSp>
+        <p:grpSp>
+          <p:nvGrpSpPr>
+            <p:cNvPr id="28" name="Group 27"/>
+            <p:cNvGrpSpPr/>
+            <p:nvPr/>
+          </p:nvGrpSpPr>
+          <p:grpSpPr>
+            <a:xfrm>
+              <a:off x="4291945" y="5758180"/>
+              <a:ext cx="3039004" cy="3253048"/>
+              <a:chOff x="6857897" y="1247167"/>
+              <a:chExt cx="2199793" cy="2494339"/>
+            </a:xfrm>
+          </p:grpSpPr>
+          <p:sp>
+            <p:nvSpPr>
+              <p:cNvPr id="29" name="Rectangle 28"/>
+              <p:cNvSpPr/>
+              <p:nvPr/>
+            </p:nvSpPr>
+            <p:spPr>
+              <a:xfrm>
+                <a:off x="6861072" y="1247167"/>
+                <a:ext cx="2196618" cy="2494339"/>
+              </a:xfrm>
+              <a:prstGeom prst="rect">
+                <a:avLst/>
+              </a:prstGeom>
+              <a:noFill/>
+              <a:ln w="28575" cmpd="sng">
+                <a:solidFill>
+                  <a:schemeClr val="tx2"/>
+                </a:solidFill>
+              </a:ln>
+              <a:effectLst/>
+            </p:spPr>
+            <p:style>
+              <a:lnRef idx="1">
+                <a:schemeClr val="accent1"/>
+              </a:lnRef>
+              <a:fillRef idx="3">
+                <a:schemeClr val="accent1"/>
+              </a:fillRef>
+              <a:effectRef idx="2">
+                <a:schemeClr val="accent1"/>
+              </a:effectRef>
+              <a:fontRef idx="minor">
+                <a:schemeClr val="lt1"/>
+              </a:fontRef>
+            </p:style>
+            <p:txBody>
+              <a:bodyPr rtlCol="0" anchor="t"/>
+              <a:lstStyle/>
+              <a:p>
+                <a:pPr algn="ctr"/>
+                <a:r>
+                  <a:rPr lang="en-US" sz="1200" b="1" dirty="0" smtClean="0">
+                    <a:solidFill>
+                      <a:srgbClr val="1F497D"/>
+                    </a:solidFill>
+                  </a:rPr>
+                  <a:t>mesiCache</a:t>
+                </a:r>
+              </a:p>
+              <a:p>
+                <a:pPr algn="ctr"/>
+                <a:endParaRPr lang="en-US" sz="1200" dirty="0" smtClean="0">
+                  <a:solidFill>
+                    <a:srgbClr val="1F497D"/>
+                  </a:solidFill>
+                </a:endParaRPr>
+              </a:p>
+              <a:p>
+                <a:r>
+                  <a:rPr lang="en-US" sz="1200" dirty="0" smtClean="0">
+                    <a:solidFill>
+                      <a:srgbClr val="1F497D"/>
+                    </a:solidFill>
+                  </a:rPr>
+                  <a:t>+ mesiCache(cacheSize : int, blockSize : int, associativity : int)</a:t>
+                </a:r>
+              </a:p>
+              <a:p>
+                <a:endParaRPr lang="en-US" sz="1200" dirty="0">
+                  <a:solidFill>
+                    <a:srgbClr val="1F497D"/>
+                  </a:solidFill>
+                </a:endParaRPr>
+              </a:p>
+              <a:p>
+                <a:r>
+                  <a:rPr lang="en-US" sz="1200" dirty="0" smtClean="0">
+                    <a:solidFill>
+                      <a:srgbClr val="1F497D"/>
+                    </a:solidFill>
+                  </a:rPr>
+                  <a:t>+ isReadHit(addr : int) : bool</a:t>
+                </a:r>
+              </a:p>
+              <a:p>
+                <a:r>
+                  <a:rPr lang="en-US" sz="1200" dirty="0" smtClean="0">
+                    <a:solidFill>
+                      <a:srgbClr val="1F497D"/>
+                    </a:solidFill>
+                  </a:rPr>
+                  <a:t>+ isWriteHit(addr : int) : bool</a:t>
+                </a:r>
+              </a:p>
+              <a:p>
+                <a:r>
+                  <a:rPr lang="en-US" sz="1200" dirty="0" smtClean="0">
+                    <a:solidFill>
+                      <a:srgbClr val="1F497D"/>
+                    </a:solidFill>
+                  </a:rPr>
+                  <a:t>+ readCache(addr : int) : bool</a:t>
+                </a:r>
+              </a:p>
+              <a:p>
+                <a:r>
+                  <a:rPr lang="en-US" sz="1200" dirty="0" smtClean="0">
+                    <a:solidFill>
+                      <a:srgbClr val="1F497D"/>
+                    </a:solidFill>
+                  </a:rPr>
+                  <a:t>+ writeCache(addr : int) : bool</a:t>
+                </a:r>
+              </a:p>
+              <a:p>
+                <a:endParaRPr lang="en-US" sz="1200" dirty="0">
+                  <a:solidFill>
+                    <a:srgbClr val="1F497D"/>
+                  </a:solidFill>
+                </a:endParaRPr>
+              </a:p>
+              <a:p>
+                <a:r>
+                  <a:rPr lang="en-US" sz="1200" dirty="0" smtClean="0">
+                    <a:solidFill>
+                      <a:srgbClr val="1F497D"/>
+                    </a:solidFill>
+                  </a:rPr>
+                  <a:t>+ selfChangeState(addr : unsigned, instrType : int, isHit : bool, cycle : int)</a:t>
+                </a:r>
+              </a:p>
+              <a:p>
+                <a:r>
+                  <a:rPr lang="en-US" sz="1200" dirty="0" smtClean="0">
+                    <a:solidFill>
+                      <a:srgbClr val="1F497D"/>
+                    </a:solidFill>
+                  </a:rPr>
+                  <a:t>+</a:t>
+                </a:r>
+                <a:r>
+                  <a:rPr lang="en-US" sz="1200" dirty="0">
+                    <a:solidFill>
+                      <a:srgbClr val="1F497D"/>
+                    </a:solidFill>
+                  </a:rPr>
+                  <a:t> </a:t>
+                </a:r>
+                <a:r>
+                  <a:rPr lang="en-US" sz="1200" dirty="0" smtClean="0">
+                    <a:solidFill>
+                      <a:srgbClr val="1F497D"/>
+                    </a:solidFill>
+                  </a:rPr>
+                  <a:t>otherChangeState(addr : unsigned, transType : int, cycle : int) : int</a:t>
+                </a:r>
+              </a:p>
+              <a:p>
+                <a:r>
+                  <a:rPr lang="en-US" sz="1200" dirty="0" smtClean="0">
+                    <a:solidFill>
+                      <a:srgbClr val="1F497D"/>
+                    </a:solidFill>
+                  </a:rPr>
+                  <a:t>+ isCacheModified(addr : unsigned) : bool</a:t>
+                </a:r>
+              </a:p>
+              <a:p>
+                <a:r>
+                  <a:rPr lang="en-US" sz="1200" dirty="0" smtClean="0">
+                    <a:solidFill>
+                      <a:srgbClr val="1F497D"/>
+                    </a:solidFill>
+                  </a:rPr>
+                  <a:t>+ generateTransaction(addr : unsigned, instrType : int, prIndex : int) : transaction</a:t>
+                </a:r>
+                <a:endParaRPr lang="en-US" sz="1200" dirty="0">
+                  <a:solidFill>
+                    <a:srgbClr val="1F497D"/>
+                  </a:solidFill>
+                </a:endParaRPr>
+              </a:p>
+            </p:txBody>
+          </p:sp>
+          <p:cxnSp>
+            <p:nvCxnSpPr>
+              <p:cNvPr id="30" name="Straight Connector 29"/>
+              <p:cNvCxnSpPr/>
+              <p:nvPr/>
+            </p:nvCxnSpPr>
+            <p:spPr>
+              <a:xfrm>
+                <a:off x="6857897" y="1521385"/>
+                <a:ext cx="2199793" cy="0"/>
+              </a:xfrm>
+              <a:prstGeom prst="line">
+                <a:avLst/>
+              </a:prstGeom>
+              <a:ln w="28575" cmpd="sng">
+                <a:solidFill>
+                  <a:schemeClr val="tx2"/>
+                </a:solidFill>
+              </a:ln>
+              <a:effectLst/>
+            </p:spPr>
+            <p:style>
+              <a:lnRef idx="2">
+                <a:schemeClr val="accent1"/>
+              </a:lnRef>
+              <a:fillRef idx="0">
+                <a:schemeClr val="accent1"/>
+              </a:fillRef>
+              <a:effectRef idx="1">
+                <a:schemeClr val="accent1"/>
+              </a:effectRef>
+              <a:fontRef idx="minor">
+                <a:schemeClr val="tx1"/>
+              </a:fontRef>
+            </p:style>
+          </p:cxnSp>
+        </p:grpSp>
         <p:cxnSp>
           <p:nvCxnSpPr>
-            <p:cNvPr id="9" name="Straight Connector 8"/>
-            <p:cNvCxnSpPr/>
+            <p:cNvPr id="34" name="Elbow Connector 33"/>
+            <p:cNvCxnSpPr>
+              <a:stCxn id="29" idx="0"/>
+              <a:endCxn id="19" idx="2"/>
+            </p:cNvCxnSpPr>
             <p:nvPr/>
           </p:nvCxnSpPr>
           <p:spPr>
-            <a:xfrm>
-              <a:off x="6857897" y="1775411"/>
-              <a:ext cx="2199793" cy="0"/>
+            <a:xfrm rot="5400000" flipH="1" flipV="1">
+              <a:off x="5940589" y="4367821"/>
+              <a:ext cx="1263410" cy="1517308"/>
             </a:xfrm>
-            <a:prstGeom prst="line">
+            <a:prstGeom prst="bentConnector3">
               <a:avLst/>
             </a:prstGeom>
-            <a:ln w="28575" cmpd="sng">
+            <a:ln>
               <a:solidFill>
-                <a:schemeClr val="tx2"/>
+                <a:srgbClr val="1F497D"/>
               </a:solidFill>
+              <a:tailEnd type="arrow"/>
             </a:ln>
             <a:effectLst/>
           </p:spPr>
@@ -3265,22 +3905,28 @@
         </p:cxnSp>
         <p:cxnSp>
           <p:nvCxnSpPr>
-            <p:cNvPr id="12" name="Straight Connector 11"/>
-            <p:cNvCxnSpPr/>
+            <p:cNvPr id="35" name="Elbow Connector 34"/>
+            <p:cNvCxnSpPr>
+              <a:stCxn id="25" idx="0"/>
+              <a:endCxn id="19" idx="2"/>
+            </p:cNvCxnSpPr>
             <p:nvPr/>
           </p:nvCxnSpPr>
           <p:spPr>
-            <a:xfrm>
-              <a:off x="6859185" y="3201934"/>
-              <a:ext cx="2198505" cy="0"/>
+            <a:xfrm rot="16200000" flipV="1">
+              <a:off x="7523988" y="4301731"/>
+              <a:ext cx="1282085" cy="1668163"/>
             </a:xfrm>
-            <a:prstGeom prst="line">
-              <a:avLst/>
+            <a:prstGeom prst="bentConnector3">
+              <a:avLst>
+                <a:gd name="adj1" fmla="val 50000"/>
+              </a:avLst>
             </a:prstGeom>
-            <a:ln w="28575" cmpd="sng">
+            <a:ln>
               <a:solidFill>
-                <a:schemeClr val="tx2"/>
+                <a:srgbClr val="1F497D"/>
               </a:solidFill>
+              <a:tailEnd type="arrow"/>
             </a:ln>
             <a:effectLst/>
           </p:spPr>
@@ -3302,1433 +3948,785 @@
       </p:grpSp>
       <p:grpSp>
         <p:nvGrpSpPr>
-          <p:cNvPr id="18" name="Group 17"/>
+          <p:cNvPr id="2" name="Group 1"/>
           <p:cNvGrpSpPr/>
           <p:nvPr/>
         </p:nvGrpSpPr>
         <p:grpSpPr>
           <a:xfrm>
-            <a:off x="2100332" y="264115"/>
-            <a:ext cx="3104635" cy="3455071"/>
-            <a:chOff x="6857897" y="1247167"/>
-            <a:chExt cx="2199793" cy="2494339"/>
+            <a:off x="-2788" y="264115"/>
+            <a:ext cx="4903897" cy="3330044"/>
+            <a:chOff x="-2788" y="264115"/>
+            <a:chExt cx="4903897" cy="3330044"/>
           </a:xfrm>
         </p:grpSpPr>
-        <p:sp>
-          <p:nvSpPr>
-            <p:cNvPr id="19" name="Rectangle 18"/>
-            <p:cNvSpPr/>
+        <p:grpSp>
+          <p:nvGrpSpPr>
+            <p:cNvPr id="17" name="Group 16"/>
+            <p:cNvGrpSpPr/>
             <p:nvPr/>
-          </p:nvSpPr>
-          <p:spPr>
+          </p:nvGrpSpPr>
+          <p:grpSpPr>
             <a:xfrm>
-              <a:off x="6861072" y="1247167"/>
-              <a:ext cx="2196618" cy="2494339"/>
+              <a:off x="-2788" y="264115"/>
+              <a:ext cx="1949188" cy="1604739"/>
+              <a:chOff x="6857897" y="1247167"/>
+              <a:chExt cx="2199795" cy="2494339"/>
             </a:xfrm>
-            <a:prstGeom prst="rect">
-              <a:avLst/>
-            </a:prstGeom>
-            <a:noFill/>
-            <a:ln w="28575" cmpd="sng">
-              <a:solidFill>
-                <a:schemeClr val="tx2"/>
-              </a:solidFill>
-            </a:ln>
-            <a:effectLst/>
-          </p:spPr>
-          <p:style>
-            <a:lnRef idx="1">
-              <a:schemeClr val="accent1"/>
-            </a:lnRef>
-            <a:fillRef idx="3">
-              <a:schemeClr val="accent1"/>
-            </a:fillRef>
-            <a:effectRef idx="2">
-              <a:schemeClr val="accent1"/>
-            </a:effectRef>
-            <a:fontRef idx="minor">
-              <a:schemeClr val="lt1"/>
-            </a:fontRef>
-          </p:style>
-          <p:txBody>
-            <a:bodyPr rtlCol="0" anchor="t"/>
-            <a:lstStyle/>
-            <a:p>
-              <a:pPr algn="ctr"/>
-              <a:r>
-                <a:rPr lang="en-US" sz="1200" b="1" dirty="0" smtClean="0">
-                  <a:solidFill>
-                    <a:srgbClr val="1F497D"/>
-                  </a:solidFill>
-                </a:rPr>
-                <a:t>cache</a:t>
-              </a:r>
-            </a:p>
-            <a:p>
-              <a:pPr algn="ctr"/>
-              <a:endParaRPr lang="en-US" sz="1200" dirty="0">
+          </p:grpSpPr>
+          <p:sp>
+            <p:nvSpPr>
+              <p:cNvPr id="5" name="Rectangle 4"/>
+              <p:cNvSpPr/>
+              <p:nvPr/>
+            </p:nvSpPr>
+            <p:spPr>
+              <a:xfrm>
+                <a:off x="6861074" y="1247167"/>
+                <a:ext cx="2196618" cy="2494339"/>
+              </a:xfrm>
+              <a:prstGeom prst="rect">
+                <a:avLst/>
+              </a:prstGeom>
+              <a:noFill/>
+              <a:ln w="28575" cmpd="sng">
                 <a:solidFill>
-                  <a:srgbClr val="1F497D"/>
+                  <a:schemeClr val="tx2"/>
                 </a:solidFill>
-              </a:endParaRPr>
-            </a:p>
-            <a:p>
-              <a:r>
-                <a:rPr lang="en-US" sz="1200" dirty="0" smtClean="0">
-                  <a:solidFill>
-                    <a:srgbClr val="1F497D"/>
-                  </a:solidFill>
-                </a:rPr>
-                <a:t># _cacheSize : int</a:t>
-              </a:r>
-            </a:p>
-            <a:p>
-              <a:r>
-                <a:rPr lang="en-US" sz="1200" dirty="0" smtClean="0">
-                  <a:solidFill>
-                    <a:srgbClr val="1F497D"/>
-                  </a:solidFill>
-                </a:rPr>
-                <a:t># _blockSize : int</a:t>
-              </a:r>
-            </a:p>
-            <a:p>
-              <a:r>
-                <a:rPr lang="en-US" sz="1200" dirty="0" smtClean="0">
-                  <a:solidFill>
-                    <a:srgbClr val="1F497D"/>
-                  </a:solidFill>
-                </a:rPr>
-                <a:t># _associativity : int</a:t>
-              </a:r>
-            </a:p>
-            <a:p>
-              <a:r>
-                <a:rPr lang="en-US" sz="1200" dirty="0" smtClean="0">
-                  <a:solidFill>
-                    <a:srgbClr val="1F497D"/>
-                  </a:solidFill>
-                </a:rPr>
-                <a:t># _height : int</a:t>
-              </a:r>
-            </a:p>
-            <a:p>
-              <a:r>
-                <a:rPr lang="en-US" sz="1200" dirty="0" smtClean="0">
-                  <a:solidFill>
-                    <a:srgbClr val="1F497D"/>
-                  </a:solidFill>
-                </a:rPr>
-                <a:t>#</a:t>
-              </a:r>
-              <a:r>
-                <a:rPr lang="en-US" sz="1200" dirty="0">
-                  <a:solidFill>
-                    <a:srgbClr val="1F497D"/>
-                  </a:solidFill>
-                </a:rPr>
-                <a:t> </a:t>
-              </a:r>
-              <a:r>
-                <a:rPr lang="en-US" sz="1200" dirty="0" smtClean="0">
-                  <a:solidFill>
-                    <a:srgbClr val="1F497D"/>
-                  </a:solidFill>
-                </a:rPr>
-                <a:t>_width : int</a:t>
-              </a:r>
-            </a:p>
-            <a:p>
-              <a:r>
-                <a:rPr lang="en-US" sz="1200" dirty="0" smtClean="0">
-                  <a:solidFill>
-                    <a:srgbClr val="1F497D"/>
-                  </a:solidFill>
-                </a:rPr>
-                <a:t># _numOfBlocks : int</a:t>
-              </a:r>
-            </a:p>
-            <a:p>
-              <a:r>
-                <a:rPr lang="en-US" sz="1200" dirty="0" smtClean="0">
-                  <a:solidFill>
-                    <a:srgbClr val="1F497D"/>
-                  </a:solidFill>
-                </a:rPr>
-                <a:t># _cacheBlocks : </a:t>
-              </a:r>
-              <a:r>
-                <a:rPr lang="en-US" sz="1200" dirty="0" smtClean="0">
-                  <a:solidFill>
-                    <a:srgbClr val="1F497D"/>
-                  </a:solidFill>
-                </a:rPr>
-                <a:t>vector&lt;vector&lt;cacheBlock&gt;&gt; </a:t>
-              </a:r>
-              <a:endParaRPr lang="en-US" sz="1200" dirty="0">
-                <a:solidFill>
-                  <a:srgbClr val="1F497D"/>
-                </a:solidFill>
-              </a:endParaRPr>
-            </a:p>
-            <a:p>
-              <a:r>
-                <a:rPr lang="en-US" sz="1200" dirty="0" smtClean="0">
-                  <a:solidFill>
-                    <a:srgbClr val="1F497D"/>
-                  </a:solidFill>
-                </a:rPr>
-                <a:t>+ blocked : bool</a:t>
-              </a:r>
-            </a:p>
-            <a:p>
-              <a:endParaRPr lang="en-US" sz="1200" dirty="0">
-                <a:solidFill>
-                  <a:srgbClr val="1F497D"/>
-                </a:solidFill>
-              </a:endParaRPr>
-            </a:p>
-            <a:p>
-              <a:r>
-                <a:rPr lang="en-US" sz="1200" dirty="0" smtClean="0">
-                  <a:solidFill>
-                    <a:srgbClr val="1F497D"/>
-                  </a:solidFill>
-                </a:rPr>
-                <a:t># getRowIndex(addr : int) : int</a:t>
-              </a:r>
-            </a:p>
-            <a:p>
-              <a:r>
-                <a:rPr lang="en-US" sz="1200" dirty="0" smtClean="0">
-                  <a:solidFill>
-                    <a:srgbClr val="1F497D"/>
-                  </a:solidFill>
-                </a:rPr>
-                <a:t># getColIndex(addr : int) : int</a:t>
-              </a:r>
-            </a:p>
-            <a:p>
-              <a:r>
-                <a:rPr lang="en-US" sz="1200" dirty="0" smtClean="0">
-                  <a:solidFill>
-                    <a:srgbClr val="1F497D"/>
-                  </a:solidFill>
-                </a:rPr>
-                <a:t># </a:t>
-              </a:r>
-              <a:r>
-                <a:rPr lang="en-US" sz="1200" dirty="0">
-                  <a:solidFill>
-                    <a:srgbClr val="1F497D"/>
-                  </a:solidFill>
-                </a:rPr>
-                <a:t>g</a:t>
-              </a:r>
-              <a:r>
-                <a:rPr lang="en-US" sz="1200" dirty="0" smtClean="0">
-                  <a:solidFill>
-                    <a:srgbClr val="1F497D"/>
-                  </a:solidFill>
-                </a:rPr>
-                <a:t>etRowNum(addr : int) : int</a:t>
-              </a:r>
-            </a:p>
-            <a:p>
-              <a:r>
-                <a:rPr lang="en-US" sz="1200" dirty="0" smtClean="0">
-                  <a:solidFill>
-                    <a:srgbClr val="1F497D"/>
-                  </a:solidFill>
-                </a:rPr>
-                <a:t>+ cache()</a:t>
-              </a:r>
-            </a:p>
-            <a:p>
-              <a:r>
-                <a:rPr lang="en-US" sz="1200" dirty="0" smtClean="0">
-                  <a:solidFill>
-                    <a:srgbClr val="1F497D"/>
-                  </a:solidFill>
-                </a:rPr>
-                <a:t>+ cache(cacheSize : int, blockSize : int, associativity : int)</a:t>
-              </a:r>
-            </a:p>
-            <a:p>
-              <a:r>
-                <a:rPr lang="en-US" sz="1200" dirty="0" smtClean="0">
-                  <a:solidFill>
-                    <a:srgbClr val="1F497D"/>
-                  </a:solidFill>
-                </a:rPr>
-                <a:t>+ isCacheHit(addr : unsigned) : bool</a:t>
-              </a:r>
-            </a:p>
-            <a:p>
-              <a:endParaRPr lang="en-US" sz="1200" dirty="0" smtClean="0">
-                <a:solidFill>
-                  <a:srgbClr val="1F497D"/>
-                </a:solidFill>
-              </a:endParaRPr>
-            </a:p>
-          </p:txBody>
-        </p:sp>
-        <p:cxnSp>
-          <p:nvCxnSpPr>
-            <p:cNvPr id="20" name="Straight Connector 19"/>
-            <p:cNvCxnSpPr/>
-            <p:nvPr/>
-          </p:nvCxnSpPr>
-          <p:spPr>
-            <a:xfrm>
-              <a:off x="6857897" y="1488596"/>
-              <a:ext cx="2199793" cy="0"/>
-            </a:xfrm>
-            <a:prstGeom prst="line">
-              <a:avLst/>
-            </a:prstGeom>
-            <a:ln w="28575" cmpd="sng">
-              <a:solidFill>
-                <a:schemeClr val="tx2"/>
-              </a:solidFill>
-            </a:ln>
-            <a:effectLst/>
-          </p:spPr>
-          <p:style>
-            <a:lnRef idx="2">
-              <a:schemeClr val="accent1"/>
-            </a:lnRef>
-            <a:fillRef idx="0">
-              <a:schemeClr val="accent1"/>
-            </a:fillRef>
-            <a:effectRef idx="1">
-              <a:schemeClr val="accent1"/>
-            </a:effectRef>
-            <a:fontRef idx="minor">
-              <a:schemeClr val="tx1"/>
-            </a:fontRef>
-          </p:style>
-        </p:cxnSp>
-        <p:cxnSp>
-          <p:nvCxnSpPr>
-            <p:cNvPr id="21" name="Straight Connector 20"/>
-            <p:cNvCxnSpPr/>
-            <p:nvPr/>
-          </p:nvCxnSpPr>
-          <p:spPr>
-            <a:xfrm>
-              <a:off x="6859185" y="2693168"/>
-              <a:ext cx="2198505" cy="0"/>
-            </a:xfrm>
-            <a:prstGeom prst="line">
-              <a:avLst/>
-            </a:prstGeom>
-            <a:ln w="28575" cmpd="sng">
-              <a:solidFill>
-                <a:schemeClr val="tx2"/>
-              </a:solidFill>
-            </a:ln>
-            <a:effectLst/>
-          </p:spPr>
-          <p:style>
-            <a:lnRef idx="2">
-              <a:schemeClr val="accent1"/>
-            </a:lnRef>
-            <a:fillRef idx="0">
-              <a:schemeClr val="accent1"/>
-            </a:fillRef>
-            <a:effectRef idx="1">
-              <a:schemeClr val="accent1"/>
-            </a:effectRef>
-            <a:fontRef idx="minor">
-              <a:schemeClr val="tx1"/>
-            </a:fontRef>
-          </p:style>
-        </p:cxnSp>
-      </p:grpSp>
-      <p:grpSp>
-        <p:nvGrpSpPr>
-          <p:cNvPr id="24" name="Group 23"/>
-          <p:cNvGrpSpPr/>
-          <p:nvPr/>
-        </p:nvGrpSpPr>
-        <p:grpSpPr>
-          <a:xfrm>
-            <a:off x="4014156" y="4982597"/>
-            <a:ext cx="3104635" cy="2199637"/>
-            <a:chOff x="6857897" y="1247167"/>
-            <a:chExt cx="2199793" cy="2494339"/>
-          </a:xfrm>
-        </p:grpSpPr>
-        <p:sp>
-          <p:nvSpPr>
-            <p:cNvPr id="25" name="Rectangle 24"/>
-            <p:cNvSpPr/>
-            <p:nvPr/>
-          </p:nvSpPr>
-          <p:spPr>
-            <a:xfrm>
-              <a:off x="6861072" y="1247167"/>
-              <a:ext cx="2196618" cy="2494339"/>
-            </a:xfrm>
-            <a:prstGeom prst="rect">
-              <a:avLst/>
-            </a:prstGeom>
-            <a:noFill/>
-            <a:ln w="28575" cmpd="sng">
-              <a:solidFill>
-                <a:schemeClr val="tx2"/>
-              </a:solidFill>
-            </a:ln>
-            <a:effectLst/>
-          </p:spPr>
-          <p:style>
-            <a:lnRef idx="1">
-              <a:schemeClr val="accent1"/>
-            </a:lnRef>
-            <a:fillRef idx="3">
-              <a:schemeClr val="accent1"/>
-            </a:fillRef>
-            <a:effectRef idx="2">
-              <a:schemeClr val="accent1"/>
-            </a:effectRef>
-            <a:fontRef idx="minor">
-              <a:schemeClr val="lt1"/>
-            </a:fontRef>
-          </p:style>
-          <p:txBody>
-            <a:bodyPr rtlCol="0" anchor="t"/>
-            <a:lstStyle/>
-            <a:p>
-              <a:pPr algn="ctr"/>
-              <a:r>
-                <a:rPr lang="en-US" sz="1200" b="1" dirty="0" smtClean="0">
-                  <a:solidFill>
-                    <a:srgbClr val="1F497D"/>
-                  </a:solidFill>
-                </a:rPr>
-                <a:t>dragonCache</a:t>
-              </a:r>
-            </a:p>
-            <a:p>
-              <a:pPr algn="ctr"/>
-              <a:endParaRPr lang="en-US" sz="1200" dirty="0" smtClean="0">
-                <a:solidFill>
-                  <a:srgbClr val="1F497D"/>
-                </a:solidFill>
-              </a:endParaRPr>
-            </a:p>
-            <a:p>
-              <a:r>
-                <a:rPr lang="en-US" sz="1200" dirty="0" smtClean="0">
-                  <a:solidFill>
-                    <a:srgbClr val="1F497D"/>
-                  </a:solidFill>
-                </a:rPr>
-                <a:t>+ dragonCache(cacheSize : int, blockSize : int, associativity : int)</a:t>
-              </a:r>
-            </a:p>
-            <a:p>
-              <a:endParaRPr lang="en-US" sz="1200" dirty="0">
-                <a:solidFill>
-                  <a:srgbClr val="1F497D"/>
-                </a:solidFill>
-              </a:endParaRPr>
-            </a:p>
-            <a:p>
-              <a:r>
-                <a:rPr lang="en-US" sz="1200" dirty="0" smtClean="0">
-                  <a:solidFill>
-                    <a:srgbClr val="1F497D"/>
-                  </a:solidFill>
-                </a:rPr>
-                <a:t>+ selfChangeState(addr : unsigned, instrType : int, isHit : bool, cycle : int) : bool</a:t>
-              </a:r>
-            </a:p>
-            <a:p>
-              <a:r>
-                <a:rPr lang="en-US" sz="1200" dirty="0" smtClean="0">
-                  <a:solidFill>
-                    <a:srgbClr val="1F497D"/>
-                  </a:solidFill>
-                </a:rPr>
-                <a:t>+</a:t>
-              </a:r>
-              <a:r>
-                <a:rPr lang="en-US" sz="1200" dirty="0">
-                  <a:solidFill>
-                    <a:srgbClr val="1F497D"/>
-                  </a:solidFill>
-                </a:rPr>
-                <a:t> </a:t>
-              </a:r>
-              <a:r>
-                <a:rPr lang="en-US" sz="1200" dirty="0" smtClean="0">
-                  <a:solidFill>
-                    <a:srgbClr val="1F497D"/>
-                  </a:solidFill>
-                </a:rPr>
-                <a:t>otherChangeState(addr : unsigned, transType : int, cycle : int) : int</a:t>
-              </a:r>
-            </a:p>
-            <a:p>
-              <a:r>
-                <a:rPr lang="en-US" sz="1200" dirty="0" smtClean="0">
-                  <a:solidFill>
-                    <a:srgbClr val="1F497D"/>
-                  </a:solidFill>
-                </a:rPr>
-                <a:t>+ generateTransaction(addr : </a:t>
-              </a:r>
-              <a:r>
-                <a:rPr lang="en-US" sz="1200" dirty="0" smtClean="0">
-                  <a:solidFill>
-                    <a:srgbClr val="1F497D"/>
-                  </a:solidFill>
-                </a:rPr>
-                <a:t>unsigned</a:t>
-              </a:r>
-              <a:r>
-                <a:rPr lang="en-US" sz="1200" dirty="0" smtClean="0">
-                  <a:solidFill>
-                    <a:srgbClr val="1F497D"/>
-                  </a:solidFill>
-                </a:rPr>
-                <a:t>, instrType : int, prIndex : int) : </a:t>
-              </a:r>
-              <a:r>
-                <a:rPr lang="en-US" sz="1200" dirty="0" smtClean="0">
-                  <a:solidFill>
-                    <a:srgbClr val="1F497D"/>
-                  </a:solidFill>
-                </a:rPr>
-                <a:t>transaction </a:t>
-              </a:r>
-              <a:endParaRPr lang="en-US" sz="1200" dirty="0">
-                <a:solidFill>
-                  <a:srgbClr val="1F497D"/>
-                </a:solidFill>
-              </a:endParaRPr>
-            </a:p>
-          </p:txBody>
-        </p:sp>
-        <p:cxnSp>
-          <p:nvCxnSpPr>
-            <p:cNvPr id="26" name="Straight Connector 25"/>
-            <p:cNvCxnSpPr/>
-            <p:nvPr/>
-          </p:nvCxnSpPr>
-          <p:spPr>
-            <a:xfrm>
-              <a:off x="6857897" y="1631828"/>
-              <a:ext cx="2199793" cy="0"/>
-            </a:xfrm>
-            <a:prstGeom prst="line">
-              <a:avLst/>
-            </a:prstGeom>
-            <a:ln w="28575" cmpd="sng">
-              <a:solidFill>
-                <a:schemeClr val="tx2"/>
-              </a:solidFill>
-            </a:ln>
-            <a:effectLst/>
-          </p:spPr>
-          <p:style>
-            <a:lnRef idx="2">
-              <a:schemeClr val="accent1"/>
-            </a:lnRef>
-            <a:fillRef idx="0">
-              <a:schemeClr val="accent1"/>
-            </a:fillRef>
-            <a:effectRef idx="1">
-              <a:schemeClr val="accent1"/>
-            </a:effectRef>
-            <a:fontRef idx="minor">
-              <a:schemeClr val="tx1"/>
-            </a:fontRef>
-          </p:style>
-        </p:cxnSp>
-      </p:grpSp>
-      <p:grpSp>
-        <p:nvGrpSpPr>
-          <p:cNvPr id="28" name="Group 27"/>
-          <p:cNvGrpSpPr/>
-          <p:nvPr/>
-        </p:nvGrpSpPr>
-        <p:grpSpPr>
-          <a:xfrm>
-            <a:off x="260398" y="4982596"/>
-            <a:ext cx="3104635" cy="3253048"/>
-            <a:chOff x="6857897" y="1247167"/>
-            <a:chExt cx="2199793" cy="2494339"/>
-          </a:xfrm>
-        </p:grpSpPr>
-        <p:sp>
-          <p:nvSpPr>
-            <p:cNvPr id="29" name="Rectangle 28"/>
-            <p:cNvSpPr/>
-            <p:nvPr/>
-          </p:nvSpPr>
-          <p:spPr>
-            <a:xfrm>
-              <a:off x="6861072" y="1247167"/>
-              <a:ext cx="2196618" cy="2494339"/>
-            </a:xfrm>
-            <a:prstGeom prst="rect">
-              <a:avLst/>
-            </a:prstGeom>
-            <a:noFill/>
-            <a:ln w="28575" cmpd="sng">
-              <a:solidFill>
-                <a:schemeClr val="tx2"/>
-              </a:solidFill>
-            </a:ln>
-            <a:effectLst/>
-          </p:spPr>
-          <p:style>
-            <a:lnRef idx="1">
-              <a:schemeClr val="accent1"/>
-            </a:lnRef>
-            <a:fillRef idx="3">
-              <a:schemeClr val="accent1"/>
-            </a:fillRef>
-            <a:effectRef idx="2">
-              <a:schemeClr val="accent1"/>
-            </a:effectRef>
-            <a:fontRef idx="minor">
-              <a:schemeClr val="lt1"/>
-            </a:fontRef>
-          </p:style>
-          <p:txBody>
-            <a:bodyPr rtlCol="0" anchor="t"/>
-            <a:lstStyle/>
-            <a:p>
-              <a:pPr algn="ctr"/>
-              <a:r>
-                <a:rPr lang="en-US" sz="1200" b="1" dirty="0" smtClean="0">
-                  <a:solidFill>
-                    <a:srgbClr val="1F497D"/>
-                  </a:solidFill>
-                </a:rPr>
-                <a:t>mesiCache</a:t>
-              </a:r>
-            </a:p>
-            <a:p>
-              <a:pPr algn="ctr"/>
-              <a:endParaRPr lang="en-US" sz="1200" dirty="0" smtClean="0">
-                <a:solidFill>
-                  <a:srgbClr val="1F497D"/>
-                </a:solidFill>
-              </a:endParaRPr>
-            </a:p>
-            <a:p>
-              <a:r>
-                <a:rPr lang="en-US" sz="1200" dirty="0" smtClean="0">
-                  <a:solidFill>
-                    <a:srgbClr val="1F497D"/>
-                  </a:solidFill>
-                </a:rPr>
-                <a:t>+ mesiCache(cacheSize : int, blockSize : int, associativity : int)</a:t>
-              </a:r>
-            </a:p>
-            <a:p>
-              <a:endParaRPr lang="en-US" sz="1200" dirty="0">
-                <a:solidFill>
-                  <a:srgbClr val="1F497D"/>
-                </a:solidFill>
-              </a:endParaRPr>
-            </a:p>
-            <a:p>
-              <a:r>
-                <a:rPr lang="en-US" sz="1200" dirty="0" smtClean="0">
-                  <a:solidFill>
-                    <a:srgbClr val="1F497D"/>
-                  </a:solidFill>
-                </a:rPr>
-                <a:t>+ isReadHit(addr : int) : bool</a:t>
-              </a:r>
-            </a:p>
-            <a:p>
-              <a:r>
-                <a:rPr lang="en-US" sz="1200" dirty="0" smtClean="0">
-                  <a:solidFill>
-                    <a:srgbClr val="1F497D"/>
-                  </a:solidFill>
-                </a:rPr>
-                <a:t>+ isWriteHit(addr : int) : bool</a:t>
-              </a:r>
-            </a:p>
-            <a:p>
-              <a:r>
-                <a:rPr lang="en-US" sz="1200" dirty="0" smtClean="0">
-                  <a:solidFill>
-                    <a:srgbClr val="1F497D"/>
-                  </a:solidFill>
-                </a:rPr>
-                <a:t>+ readCache(addr : int) : bool</a:t>
-              </a:r>
-            </a:p>
-            <a:p>
-              <a:r>
-                <a:rPr lang="en-US" sz="1200" dirty="0" smtClean="0">
-                  <a:solidFill>
-                    <a:srgbClr val="1F497D"/>
-                  </a:solidFill>
-                </a:rPr>
-                <a:t>+ writeCache(addr : int) : bool</a:t>
-              </a:r>
-            </a:p>
-            <a:p>
-              <a:endParaRPr lang="en-US" sz="1200" dirty="0">
-                <a:solidFill>
-                  <a:srgbClr val="1F497D"/>
-                </a:solidFill>
-              </a:endParaRPr>
-            </a:p>
-            <a:p>
-              <a:r>
-                <a:rPr lang="en-US" sz="1200" dirty="0" smtClean="0">
-                  <a:solidFill>
-                    <a:srgbClr val="1F497D"/>
-                  </a:solidFill>
-                </a:rPr>
-                <a:t>+ selfChangeState(addr : unsigned, instrType : int, isHit : bool, cycle : int)</a:t>
-              </a:r>
-            </a:p>
-            <a:p>
-              <a:r>
-                <a:rPr lang="en-US" sz="1200" dirty="0" smtClean="0">
-                  <a:solidFill>
-                    <a:srgbClr val="1F497D"/>
-                  </a:solidFill>
-                </a:rPr>
-                <a:t>+</a:t>
-              </a:r>
-              <a:r>
-                <a:rPr lang="en-US" sz="1200" dirty="0">
-                  <a:solidFill>
-                    <a:srgbClr val="1F497D"/>
-                  </a:solidFill>
-                </a:rPr>
-                <a:t> </a:t>
-              </a:r>
-              <a:r>
-                <a:rPr lang="en-US" sz="1200" dirty="0" smtClean="0">
-                  <a:solidFill>
-                    <a:srgbClr val="1F497D"/>
-                  </a:solidFill>
-                </a:rPr>
-                <a:t>otherChangeState(addr : unsigned, transType : int, cycle : int) : int</a:t>
-              </a:r>
-            </a:p>
-            <a:p>
-              <a:r>
-                <a:rPr lang="en-US" sz="1200" dirty="0" smtClean="0">
-                  <a:solidFill>
-                    <a:srgbClr val="1F497D"/>
-                  </a:solidFill>
-                </a:rPr>
-                <a:t>+ isCacheModified(addr : unsigned) : bool</a:t>
-              </a:r>
-            </a:p>
-            <a:p>
-              <a:r>
-                <a:rPr lang="en-US" sz="1200" dirty="0" smtClean="0">
-                  <a:solidFill>
-                    <a:srgbClr val="1F497D"/>
-                  </a:solidFill>
-                </a:rPr>
-                <a:t>+ generateTransaction(addr : unsigned, instrType : int, prIndex : int) : transaction</a:t>
-              </a:r>
-              <a:endParaRPr lang="en-US" sz="1200" dirty="0">
-                <a:solidFill>
-                  <a:srgbClr val="1F497D"/>
-                </a:solidFill>
-              </a:endParaRPr>
-            </a:p>
-          </p:txBody>
-        </p:sp>
-        <p:cxnSp>
-          <p:nvCxnSpPr>
-            <p:cNvPr id="30" name="Straight Connector 29"/>
-            <p:cNvCxnSpPr/>
-            <p:nvPr/>
-          </p:nvCxnSpPr>
-          <p:spPr>
-            <a:xfrm>
-              <a:off x="6857897" y="1521385"/>
-              <a:ext cx="2199793" cy="0"/>
-            </a:xfrm>
-            <a:prstGeom prst="line">
-              <a:avLst/>
-            </a:prstGeom>
-            <a:ln w="28575" cmpd="sng">
-              <a:solidFill>
-                <a:schemeClr val="tx2"/>
-              </a:solidFill>
-            </a:ln>
-            <a:effectLst/>
-          </p:spPr>
-          <p:style>
-            <a:lnRef idx="2">
-              <a:schemeClr val="accent1"/>
-            </a:lnRef>
-            <a:fillRef idx="0">
-              <a:schemeClr val="accent1"/>
-            </a:fillRef>
-            <a:effectRef idx="1">
-              <a:schemeClr val="accent1"/>
-            </a:effectRef>
-            <a:fontRef idx="minor">
-              <a:schemeClr val="tx1"/>
-            </a:fontRef>
-          </p:style>
-        </p:cxnSp>
-      </p:grpSp>
-      <p:cxnSp>
-        <p:nvCxnSpPr>
-          <p:cNvPr id="34" name="Elbow Connector 33"/>
-          <p:cNvCxnSpPr>
-            <a:stCxn id="29" idx="0"/>
-            <a:endCxn id="19" idx="2"/>
-          </p:cNvCxnSpPr>
-          <p:nvPr/>
-        </p:nvCxnSpPr>
-        <p:spPr>
-          <a:xfrm rot="5400000" flipH="1" flipV="1">
-            <a:off x="2103218" y="3430924"/>
-            <a:ext cx="1263410" cy="1839934"/>
-          </a:xfrm>
-          <a:prstGeom prst="bentConnector3">
-            <a:avLst/>
-          </a:prstGeom>
-          <a:ln>
-            <a:solidFill>
-              <a:srgbClr val="1F497D"/>
-            </a:solidFill>
-            <a:tailEnd type="arrow"/>
-          </a:ln>
-          <a:effectLst/>
-        </p:spPr>
-        <p:style>
-          <a:lnRef idx="2">
-            <a:schemeClr val="accent1"/>
-          </a:lnRef>
-          <a:fillRef idx="0">
-            <a:schemeClr val="accent1"/>
-          </a:fillRef>
-          <a:effectRef idx="1">
-            <a:schemeClr val="accent1"/>
-          </a:effectRef>
-          <a:fontRef idx="minor">
-            <a:schemeClr val="tx1"/>
-          </a:fontRef>
-        </p:style>
-      </p:cxnSp>
-      <p:cxnSp>
-        <p:nvCxnSpPr>
-          <p:cNvPr id="35" name="Elbow Connector 34"/>
-          <p:cNvCxnSpPr>
-            <a:stCxn id="25" idx="0"/>
-            <a:endCxn id="19" idx="2"/>
-          </p:cNvCxnSpPr>
-          <p:nvPr/>
-        </p:nvCxnSpPr>
-        <p:spPr>
-          <a:xfrm rot="16200000" flipV="1">
-            <a:off x="3980097" y="3393980"/>
-            <a:ext cx="1263411" cy="1913824"/>
-          </a:xfrm>
-          <a:prstGeom prst="bentConnector3">
-            <a:avLst>
-              <a:gd name="adj1" fmla="val 50000"/>
-            </a:avLst>
-          </a:prstGeom>
-          <a:ln>
-            <a:solidFill>
-              <a:srgbClr val="1F497D"/>
-            </a:solidFill>
-            <a:tailEnd type="arrow"/>
-          </a:ln>
-          <a:effectLst/>
-        </p:spPr>
-        <p:style>
-          <a:lnRef idx="2">
-            <a:schemeClr val="accent1"/>
-          </a:lnRef>
-          <a:fillRef idx="0">
-            <a:schemeClr val="accent1"/>
-          </a:fillRef>
-          <a:effectRef idx="1">
-            <a:schemeClr val="accent1"/>
-          </a:effectRef>
-          <a:fontRef idx="minor">
-            <a:schemeClr val="tx1"/>
-          </a:fontRef>
-        </p:style>
-      </p:cxnSp>
-      <p:grpSp>
-        <p:nvGrpSpPr>
-          <p:cNvPr id="38" name="Group 37"/>
-          <p:cNvGrpSpPr/>
-          <p:nvPr/>
-        </p:nvGrpSpPr>
-        <p:grpSpPr>
-          <a:xfrm>
-            <a:off x="5516772" y="264115"/>
-            <a:ext cx="1949188" cy="1050709"/>
-            <a:chOff x="6857897" y="1247167"/>
-            <a:chExt cx="2199795" cy="2494339"/>
-          </a:xfrm>
-        </p:grpSpPr>
-        <p:sp>
-          <p:nvSpPr>
-            <p:cNvPr id="39" name="Rectangle 38"/>
-            <p:cNvSpPr/>
-            <p:nvPr/>
-          </p:nvSpPr>
-          <p:spPr>
-            <a:xfrm>
-              <a:off x="6861074" y="1247167"/>
-              <a:ext cx="2196618" cy="2494339"/>
-            </a:xfrm>
-            <a:prstGeom prst="rect">
-              <a:avLst/>
-            </a:prstGeom>
-            <a:noFill/>
-            <a:ln w="28575" cmpd="sng">
-              <a:solidFill>
-                <a:schemeClr val="tx2"/>
-              </a:solidFill>
-            </a:ln>
-            <a:effectLst/>
-          </p:spPr>
-          <p:style>
-            <a:lnRef idx="1">
-              <a:schemeClr val="accent1"/>
-            </a:lnRef>
-            <a:fillRef idx="3">
-              <a:schemeClr val="accent1"/>
-            </a:fillRef>
-            <a:effectRef idx="2">
-              <a:schemeClr val="accent1"/>
-            </a:effectRef>
-            <a:fontRef idx="minor">
-              <a:schemeClr val="lt1"/>
-            </a:fontRef>
-          </p:style>
-          <p:txBody>
-            <a:bodyPr rtlCol="0" anchor="t"/>
-            <a:lstStyle/>
-            <a:p>
-              <a:pPr algn="ctr"/>
-              <a:r>
-                <a:rPr lang="en-US" sz="1200" b="1" dirty="0" smtClean="0">
+              </a:ln>
+              <a:effectLst/>
+            </p:spPr>
+            <p:style>
+              <a:lnRef idx="1">
+                <a:schemeClr val="accent1"/>
+              </a:lnRef>
+              <a:fillRef idx="3">
+                <a:schemeClr val="accent1"/>
+              </a:fillRef>
+              <a:effectRef idx="2">
+                <a:schemeClr val="accent1"/>
+              </a:effectRef>
+              <a:fontRef idx="minor">
+                <a:schemeClr val="lt1"/>
+              </a:fontRef>
+            </p:style>
+            <p:txBody>
+              <a:bodyPr rtlCol="0" anchor="t"/>
+              <a:lstStyle/>
+              <a:p>
+                <a:pPr algn="ctr"/>
+                <a:r>
+                  <a:rPr lang="en-US" sz="1200" b="1" dirty="0" smtClean="0">
+                    <a:solidFill>
+                      <a:schemeClr val="tx2"/>
+                    </a:solidFill>
+                  </a:rPr>
+                  <a:t>cacheBlock</a:t>
+                </a:r>
+              </a:p>
+              <a:p>
+                <a:pPr algn="ctr"/>
+                <a:endParaRPr lang="en-US" sz="1200" dirty="0">
                   <a:solidFill>
                     <a:schemeClr val="tx2"/>
                   </a:solidFill>
-                </a:rPr>
-                <a:t>Transaction</a:t>
-              </a:r>
-            </a:p>
-            <a:p>
-              <a:pPr algn="ctr"/>
-              <a:endParaRPr lang="en-US" sz="1200" dirty="0" smtClean="0">
+                </a:endParaRPr>
+              </a:p>
+              <a:p>
+                <a:r>
+                  <a:rPr lang="en-US" sz="1200" dirty="0" smtClean="0">
+                    <a:solidFill>
+                      <a:schemeClr val="tx2"/>
+                    </a:solidFill>
+                  </a:rPr>
+                  <a:t>+ blockStatus : status</a:t>
+                </a:r>
+              </a:p>
+              <a:p>
+                <a:r>
+                  <a:rPr lang="en-US" sz="1200" dirty="0" smtClean="0">
+                    <a:solidFill>
+                      <a:schemeClr val="tx2"/>
+                    </a:solidFill>
+                  </a:rPr>
+                  <a:t>+ tag : int</a:t>
+                </a:r>
+              </a:p>
+              <a:p>
+                <a:r>
+                  <a:rPr lang="en-US" sz="1200" dirty="0" smtClean="0">
+                    <a:solidFill>
+                      <a:schemeClr val="tx2"/>
+                    </a:solidFill>
+                  </a:rPr>
+                  <a:t>+ numOfWords : int</a:t>
+                </a:r>
+              </a:p>
+              <a:p>
+                <a:r>
+                  <a:rPr lang="en-US" sz="1200" dirty="0" smtClean="0">
+                    <a:solidFill>
+                      <a:schemeClr val="tx2"/>
+                    </a:solidFill>
+                  </a:rPr>
+                  <a:t>+ lru : int</a:t>
+                </a:r>
+              </a:p>
+              <a:p>
+                <a:endParaRPr lang="en-US" sz="1200" dirty="0">
+                  <a:solidFill>
+                    <a:schemeClr val="tx2"/>
+                  </a:solidFill>
+                </a:endParaRPr>
+              </a:p>
+              <a:p>
+                <a:r>
+                  <a:rPr lang="en-US" sz="1200" dirty="0" smtClean="0">
+                    <a:solidFill>
+                      <a:schemeClr val="tx2"/>
+                    </a:solidFill>
+                  </a:rPr>
+                  <a:t>+ cacheBlock(blockSize : int)</a:t>
+                </a:r>
+              </a:p>
+            </p:txBody>
+          </p:sp>
+          <p:cxnSp>
+            <p:nvCxnSpPr>
+              <p:cNvPr id="9" name="Straight Connector 8"/>
+              <p:cNvCxnSpPr/>
+              <p:nvPr/>
+            </p:nvCxnSpPr>
+            <p:spPr>
+              <a:xfrm>
+                <a:off x="6857897" y="1775411"/>
+                <a:ext cx="2199793" cy="0"/>
+              </a:xfrm>
+              <a:prstGeom prst="line">
+                <a:avLst/>
+              </a:prstGeom>
+              <a:ln w="28575" cmpd="sng">
                 <a:solidFill>
                   <a:schemeClr val="tx2"/>
                 </a:solidFill>
-              </a:endParaRPr>
-            </a:p>
-            <a:p>
-              <a:r>
-                <a:rPr lang="en-US" sz="1200" dirty="0" smtClean="0">
+              </a:ln>
+              <a:effectLst/>
+            </p:spPr>
+            <p:style>
+              <a:lnRef idx="2">
+                <a:schemeClr val="accent1"/>
+              </a:lnRef>
+              <a:fillRef idx="0">
+                <a:schemeClr val="accent1"/>
+              </a:fillRef>
+              <a:effectRef idx="1">
+                <a:schemeClr val="accent1"/>
+              </a:effectRef>
+              <a:fontRef idx="minor">
+                <a:schemeClr val="tx1"/>
+              </a:fontRef>
+            </p:style>
+          </p:cxnSp>
+          <p:cxnSp>
+            <p:nvCxnSpPr>
+              <p:cNvPr id="12" name="Straight Connector 11"/>
+              <p:cNvCxnSpPr/>
+              <p:nvPr/>
+            </p:nvCxnSpPr>
+            <p:spPr>
+              <a:xfrm>
+                <a:off x="6859185" y="3201934"/>
+                <a:ext cx="2198505" cy="0"/>
+              </a:xfrm>
+              <a:prstGeom prst="line">
+                <a:avLst/>
+              </a:prstGeom>
+              <a:ln w="28575" cmpd="sng">
+                <a:solidFill>
+                  <a:schemeClr val="tx2"/>
+                </a:solidFill>
+              </a:ln>
+              <a:effectLst/>
+            </p:spPr>
+            <p:style>
+              <a:lnRef idx="2">
+                <a:schemeClr val="accent1"/>
+              </a:lnRef>
+              <a:fillRef idx="0">
+                <a:schemeClr val="accent1"/>
+              </a:fillRef>
+              <a:effectRef idx="1">
+                <a:schemeClr val="accent1"/>
+              </a:effectRef>
+              <a:fontRef idx="minor">
+                <a:schemeClr val="tx1"/>
+              </a:fontRef>
+            </p:style>
+          </p:cxnSp>
+        </p:grpSp>
+        <p:grpSp>
+          <p:nvGrpSpPr>
+            <p:cNvPr id="38" name="Group 37"/>
+            <p:cNvGrpSpPr/>
+            <p:nvPr/>
+          </p:nvGrpSpPr>
+          <p:grpSpPr>
+            <a:xfrm>
+              <a:off x="2200235" y="264115"/>
+              <a:ext cx="1949188" cy="1050709"/>
+              <a:chOff x="6857897" y="1247167"/>
+              <a:chExt cx="2199795" cy="2494339"/>
+            </a:xfrm>
+          </p:grpSpPr>
+          <p:sp>
+            <p:nvSpPr>
+              <p:cNvPr id="39" name="Rectangle 38"/>
+              <p:cNvSpPr/>
+              <p:nvPr/>
+            </p:nvSpPr>
+            <p:spPr>
+              <a:xfrm>
+                <a:off x="6861074" y="1247167"/>
+                <a:ext cx="2196618" cy="2494339"/>
+              </a:xfrm>
+              <a:prstGeom prst="rect">
+                <a:avLst/>
+              </a:prstGeom>
+              <a:noFill/>
+              <a:ln w="28575" cmpd="sng">
+                <a:solidFill>
+                  <a:schemeClr val="tx2"/>
+                </a:solidFill>
+              </a:ln>
+              <a:effectLst/>
+            </p:spPr>
+            <p:style>
+              <a:lnRef idx="1">
+                <a:schemeClr val="accent1"/>
+              </a:lnRef>
+              <a:fillRef idx="3">
+                <a:schemeClr val="accent1"/>
+              </a:fillRef>
+              <a:effectRef idx="2">
+                <a:schemeClr val="accent1"/>
+              </a:effectRef>
+              <a:fontRef idx="minor">
+                <a:schemeClr val="lt1"/>
+              </a:fontRef>
+            </p:style>
+            <p:txBody>
+              <a:bodyPr rtlCol="0" anchor="t"/>
+              <a:lstStyle/>
+              <a:p>
+                <a:pPr algn="ctr"/>
+                <a:r>
+                  <a:rPr lang="en-US" sz="1200" b="1" dirty="0" smtClean="0">
+                    <a:solidFill>
+                      <a:schemeClr val="tx2"/>
+                    </a:solidFill>
+                  </a:rPr>
+                  <a:t>Transaction</a:t>
+                </a:r>
+              </a:p>
+              <a:p>
+                <a:pPr algn="ctr"/>
+                <a:endParaRPr lang="en-US" sz="1200" dirty="0" smtClean="0">
                   <a:solidFill>
                     <a:schemeClr val="tx2"/>
                   </a:solidFill>
-                </a:rPr>
-                <a:t>+ addr : unsigned</a:t>
-              </a:r>
-            </a:p>
-            <a:p>
-              <a:r>
-                <a:rPr lang="en-US" sz="1200" dirty="0" smtClean="0">
+                </a:endParaRPr>
+              </a:p>
+              <a:p>
+                <a:r>
+                  <a:rPr lang="en-US" sz="1200" dirty="0" smtClean="0">
+                    <a:solidFill>
+                      <a:schemeClr val="tx2"/>
+                    </a:solidFill>
+                  </a:rPr>
+                  <a:t>+ addr : unsigned</a:t>
+                </a:r>
+              </a:p>
+              <a:p>
+                <a:r>
+                  <a:rPr lang="en-US" sz="1200" dirty="0" smtClean="0">
+                    <a:solidFill>
+                      <a:schemeClr val="tx2"/>
+                    </a:solidFill>
+                  </a:rPr>
+                  <a:t>+ transType : int</a:t>
+                </a:r>
+              </a:p>
+              <a:p>
+                <a:r>
+                  <a:rPr lang="en-US" sz="1200" dirty="0" smtClean="0">
+                    <a:solidFill>
+                      <a:schemeClr val="tx2"/>
+                    </a:solidFill>
+                  </a:rPr>
+                  <a:t>+ prIndex : int</a:t>
+                </a:r>
+                <a:endParaRPr lang="en-US" sz="1200" dirty="0">
                   <a:solidFill>
                     <a:schemeClr val="tx2"/>
                   </a:solidFill>
-                </a:rPr>
-                <a:t>+ transType : int</a:t>
-              </a:r>
-            </a:p>
-            <a:p>
-              <a:r>
-                <a:rPr lang="en-US" sz="1200" dirty="0" smtClean="0">
+                </a:endParaRPr>
+              </a:p>
+            </p:txBody>
+          </p:sp>
+          <p:cxnSp>
+            <p:nvCxnSpPr>
+              <p:cNvPr id="40" name="Straight Connector 39"/>
+              <p:cNvCxnSpPr/>
+              <p:nvPr/>
+            </p:nvCxnSpPr>
+            <p:spPr>
+              <a:xfrm>
+                <a:off x="6857897" y="2023696"/>
+                <a:ext cx="2199793" cy="0"/>
+              </a:xfrm>
+              <a:prstGeom prst="line">
+                <a:avLst/>
+              </a:prstGeom>
+              <a:ln w="28575" cmpd="sng">
+                <a:solidFill>
+                  <a:schemeClr val="tx2"/>
+                </a:solidFill>
+              </a:ln>
+              <a:effectLst/>
+            </p:spPr>
+            <p:style>
+              <a:lnRef idx="2">
+                <a:schemeClr val="accent1"/>
+              </a:lnRef>
+              <a:fillRef idx="0">
+                <a:schemeClr val="accent1"/>
+              </a:fillRef>
+              <a:effectRef idx="1">
+                <a:schemeClr val="accent1"/>
+              </a:effectRef>
+              <a:fontRef idx="minor">
+                <a:schemeClr val="tx1"/>
+              </a:fontRef>
+            </p:style>
+          </p:cxnSp>
+        </p:grpSp>
+        <p:grpSp>
+          <p:nvGrpSpPr>
+            <p:cNvPr id="45" name="Group 44"/>
+            <p:cNvGrpSpPr/>
+            <p:nvPr/>
+          </p:nvGrpSpPr>
+          <p:grpSpPr>
+            <a:xfrm>
+              <a:off x="0" y="2314100"/>
+              <a:ext cx="1949188" cy="1273994"/>
+              <a:chOff x="6857897" y="1247167"/>
+              <a:chExt cx="2199795" cy="2494339"/>
+            </a:xfrm>
+          </p:grpSpPr>
+          <p:sp>
+            <p:nvSpPr>
+              <p:cNvPr id="46" name="Rectangle 45"/>
+              <p:cNvSpPr/>
+              <p:nvPr/>
+            </p:nvSpPr>
+            <p:spPr>
+              <a:xfrm>
+                <a:off x="6861074" y="1247167"/>
+                <a:ext cx="2196618" cy="2494339"/>
+              </a:xfrm>
+              <a:prstGeom prst="rect">
+                <a:avLst/>
+              </a:prstGeom>
+              <a:noFill/>
+              <a:ln w="28575" cmpd="sng">
+                <a:solidFill>
+                  <a:schemeClr val="tx2"/>
+                </a:solidFill>
+              </a:ln>
+              <a:effectLst/>
+            </p:spPr>
+            <p:style>
+              <a:lnRef idx="1">
+                <a:schemeClr val="accent1"/>
+              </a:lnRef>
+              <a:fillRef idx="3">
+                <a:schemeClr val="accent1"/>
+              </a:fillRef>
+              <a:effectRef idx="2">
+                <a:schemeClr val="accent1"/>
+              </a:effectRef>
+              <a:fontRef idx="minor">
+                <a:schemeClr val="lt1"/>
+              </a:fontRef>
+            </p:style>
+            <p:txBody>
+              <a:bodyPr rtlCol="0" anchor="t"/>
+              <a:lstStyle/>
+              <a:p>
+                <a:pPr algn="ctr"/>
+                <a:r>
+                  <a:rPr lang="en-US" sz="1200" b="1" dirty="0" smtClean="0">
+                    <a:solidFill>
+                      <a:schemeClr val="tx2"/>
+                    </a:solidFill>
+                  </a:rPr>
+                  <a:t>instruction</a:t>
+                </a:r>
+              </a:p>
+              <a:p>
+                <a:pPr algn="ctr"/>
+                <a:endParaRPr lang="en-US" sz="1200" dirty="0">
                   <a:solidFill>
                     <a:schemeClr val="tx2"/>
                   </a:solidFill>
-                </a:rPr>
-                <a:t>+ prIndex : int</a:t>
-              </a:r>
-              <a:endParaRPr lang="en-US" sz="1200" dirty="0">
+                </a:endParaRPr>
+              </a:p>
+              <a:p>
+                <a:r>
+                  <a:rPr lang="en-US" sz="1200" dirty="0" smtClean="0">
+                    <a:solidFill>
+                      <a:schemeClr val="tx2"/>
+                    </a:solidFill>
+                  </a:rPr>
+                  <a:t>+ instrType : int</a:t>
+                </a:r>
+                <a:endParaRPr lang="en-US" sz="1200" dirty="0">
+                  <a:solidFill>
+                    <a:schemeClr val="tx2"/>
+                  </a:solidFill>
+                </a:endParaRPr>
+              </a:p>
+              <a:p>
+                <a:r>
+                  <a:rPr lang="en-US" sz="1200" dirty="0" smtClean="0">
+                    <a:solidFill>
+                      <a:schemeClr val="tx2"/>
+                    </a:solidFill>
+                  </a:rPr>
+                  <a:t>+ addr : unsigned</a:t>
+                </a:r>
+              </a:p>
+              <a:p>
+                <a:endParaRPr lang="en-US" sz="1200" dirty="0">
+                  <a:solidFill>
+                    <a:schemeClr val="tx2"/>
+                  </a:solidFill>
+                </a:endParaRPr>
+              </a:p>
+              <a:p>
+                <a:r>
+                  <a:rPr lang="en-US" sz="1200" dirty="0" smtClean="0">
+                    <a:solidFill>
+                      <a:schemeClr val="tx2"/>
+                    </a:solidFill>
+                  </a:rPr>
+                  <a:t>+ instruction()</a:t>
+                </a:r>
+              </a:p>
+            </p:txBody>
+          </p:sp>
+          <p:cxnSp>
+            <p:nvCxnSpPr>
+              <p:cNvPr id="47" name="Straight Connector 46"/>
+              <p:cNvCxnSpPr/>
+              <p:nvPr/>
+            </p:nvCxnSpPr>
+            <p:spPr>
+              <a:xfrm>
+                <a:off x="6857897" y="1863170"/>
+                <a:ext cx="2199793" cy="0"/>
+              </a:xfrm>
+              <a:prstGeom prst="line">
+                <a:avLst/>
+              </a:prstGeom>
+              <a:ln w="28575" cmpd="sng">
                 <a:solidFill>
                   <a:schemeClr val="tx2"/>
                 </a:solidFill>
-              </a:endParaRPr>
-            </a:p>
-          </p:txBody>
-        </p:sp>
-        <p:cxnSp>
-          <p:nvCxnSpPr>
-            <p:cNvPr id="40" name="Straight Connector 39"/>
-            <p:cNvCxnSpPr/>
+              </a:ln>
+              <a:effectLst/>
+            </p:spPr>
+            <p:style>
+              <a:lnRef idx="2">
+                <a:schemeClr val="accent1"/>
+              </a:lnRef>
+              <a:fillRef idx="0">
+                <a:schemeClr val="accent1"/>
+              </a:fillRef>
+              <a:effectRef idx="1">
+                <a:schemeClr val="accent1"/>
+              </a:effectRef>
+              <a:fontRef idx="minor">
+                <a:schemeClr val="tx1"/>
+              </a:fontRef>
+            </p:style>
+          </p:cxnSp>
+          <p:cxnSp>
+            <p:nvCxnSpPr>
+              <p:cNvPr id="48" name="Straight Connector 47"/>
+              <p:cNvCxnSpPr/>
+              <p:nvPr/>
+            </p:nvCxnSpPr>
+            <p:spPr>
+              <a:xfrm>
+                <a:off x="6859185" y="3062592"/>
+                <a:ext cx="2198505" cy="0"/>
+              </a:xfrm>
+              <a:prstGeom prst="line">
+                <a:avLst/>
+              </a:prstGeom>
+              <a:ln w="28575" cmpd="sng">
+                <a:solidFill>
+                  <a:schemeClr val="tx2"/>
+                </a:solidFill>
+              </a:ln>
+              <a:effectLst/>
+            </p:spPr>
+            <p:style>
+              <a:lnRef idx="2">
+                <a:schemeClr val="accent1"/>
+              </a:lnRef>
+              <a:fillRef idx="0">
+                <a:schemeClr val="accent1"/>
+              </a:fillRef>
+              <a:effectRef idx="1">
+                <a:schemeClr val="accent1"/>
+              </a:effectRef>
+              <a:fontRef idx="minor">
+                <a:schemeClr val="tx1"/>
+              </a:fontRef>
+            </p:style>
+          </p:cxnSp>
+        </p:grpSp>
+        <p:grpSp>
+          <p:nvGrpSpPr>
+            <p:cNvPr id="49" name="Group 48"/>
+            <p:cNvGrpSpPr/>
             <p:nvPr/>
-          </p:nvCxnSpPr>
-          <p:spPr>
+          </p:nvGrpSpPr>
+          <p:grpSpPr>
             <a:xfrm>
-              <a:off x="6857897" y="2023696"/>
-              <a:ext cx="2199793" cy="0"/>
+              <a:off x="2200232" y="1630068"/>
+              <a:ext cx="2700877" cy="1964091"/>
+              <a:chOff x="6857897" y="1247167"/>
+              <a:chExt cx="2199795" cy="2494339"/>
             </a:xfrm>
-            <a:prstGeom prst="line">
-              <a:avLst/>
-            </a:prstGeom>
-            <a:ln w="28575" cmpd="sng">
-              <a:solidFill>
-                <a:schemeClr val="tx2"/>
-              </a:solidFill>
-            </a:ln>
-            <a:effectLst/>
-          </p:spPr>
-          <p:style>
-            <a:lnRef idx="2">
-              <a:schemeClr val="accent1"/>
-            </a:lnRef>
-            <a:fillRef idx="0">
-              <a:schemeClr val="accent1"/>
-            </a:fillRef>
-            <a:effectRef idx="1">
-              <a:schemeClr val="accent1"/>
-            </a:effectRef>
-            <a:fontRef idx="minor">
-              <a:schemeClr val="tx1"/>
-            </a:fontRef>
-          </p:style>
-        </p:cxnSp>
-      </p:grpSp>
-      <p:grpSp>
-        <p:nvGrpSpPr>
-          <p:cNvPr id="45" name="Group 44"/>
-          <p:cNvGrpSpPr/>
-          <p:nvPr/>
-        </p:nvGrpSpPr>
-        <p:grpSpPr>
-          <a:xfrm>
-            <a:off x="-136474" y="2267066"/>
-            <a:ext cx="1949188" cy="1273994"/>
-            <a:chOff x="6857897" y="1247167"/>
-            <a:chExt cx="2199795" cy="2494339"/>
-          </a:xfrm>
-        </p:grpSpPr>
-        <p:sp>
-          <p:nvSpPr>
-            <p:cNvPr id="46" name="Rectangle 45"/>
-            <p:cNvSpPr/>
-            <p:nvPr/>
-          </p:nvSpPr>
-          <p:spPr>
-            <a:xfrm>
-              <a:off x="6861074" y="1247167"/>
-              <a:ext cx="2196618" cy="2494339"/>
-            </a:xfrm>
-            <a:prstGeom prst="rect">
-              <a:avLst/>
-            </a:prstGeom>
-            <a:noFill/>
-            <a:ln w="28575" cmpd="sng">
-              <a:solidFill>
-                <a:schemeClr val="tx2"/>
-              </a:solidFill>
-            </a:ln>
-            <a:effectLst/>
-          </p:spPr>
-          <p:style>
-            <a:lnRef idx="1">
-              <a:schemeClr val="accent1"/>
-            </a:lnRef>
-            <a:fillRef idx="3">
-              <a:schemeClr val="accent1"/>
-            </a:fillRef>
-            <a:effectRef idx="2">
-              <a:schemeClr val="accent1"/>
-            </a:effectRef>
-            <a:fontRef idx="minor">
-              <a:schemeClr val="lt1"/>
-            </a:fontRef>
-          </p:style>
-          <p:txBody>
-            <a:bodyPr rtlCol="0" anchor="t"/>
-            <a:lstStyle/>
-            <a:p>
-              <a:pPr algn="ctr"/>
-              <a:r>
-                <a:rPr lang="en-US" sz="1200" b="1" dirty="0" smtClean="0">
+          </p:grpSpPr>
+          <p:sp>
+            <p:nvSpPr>
+              <p:cNvPr id="50" name="Rectangle 49"/>
+              <p:cNvSpPr/>
+              <p:nvPr/>
+            </p:nvSpPr>
+            <p:spPr>
+              <a:xfrm>
+                <a:off x="6861074" y="1247167"/>
+                <a:ext cx="2196618" cy="2494339"/>
+              </a:xfrm>
+              <a:prstGeom prst="rect">
+                <a:avLst/>
+              </a:prstGeom>
+              <a:noFill/>
+              <a:ln w="28575" cmpd="sng">
+                <a:solidFill>
+                  <a:schemeClr val="tx2"/>
+                </a:solidFill>
+              </a:ln>
+              <a:effectLst/>
+            </p:spPr>
+            <p:style>
+              <a:lnRef idx="1">
+                <a:schemeClr val="accent1"/>
+              </a:lnRef>
+              <a:fillRef idx="3">
+                <a:schemeClr val="accent1"/>
+              </a:fillRef>
+              <a:effectRef idx="2">
+                <a:schemeClr val="accent1"/>
+              </a:effectRef>
+              <a:fontRef idx="minor">
+                <a:schemeClr val="lt1"/>
+              </a:fontRef>
+            </p:style>
+            <p:txBody>
+              <a:bodyPr rtlCol="0" anchor="t"/>
+              <a:lstStyle/>
+              <a:p>
+                <a:pPr algn="ctr"/>
+                <a:r>
+                  <a:rPr lang="en-US" sz="1200" b="1" dirty="0" smtClean="0">
+                    <a:solidFill>
+                      <a:schemeClr val="tx2"/>
+                    </a:solidFill>
+                  </a:rPr>
+                  <a:t>busRequest</a:t>
+                </a:r>
+              </a:p>
+              <a:p>
+                <a:pPr algn="ctr"/>
+                <a:endParaRPr lang="en-US" sz="1200" dirty="0">
                   <a:solidFill>
                     <a:schemeClr val="tx2"/>
                   </a:solidFill>
-                </a:rPr>
-                <a:t>instruction</a:t>
-              </a:r>
-            </a:p>
-            <a:p>
-              <a:pPr algn="ctr"/>
-              <a:endParaRPr lang="en-US" sz="1200" dirty="0">
+                </a:endParaRPr>
+              </a:p>
+              <a:p>
+                <a:r>
+                  <a:rPr lang="en-US" sz="1200" dirty="0" smtClean="0">
+                    <a:solidFill>
+                      <a:schemeClr val="tx2"/>
+                    </a:solidFill>
+                  </a:rPr>
+                  <a:t>+ prIndex : int</a:t>
+                </a:r>
+              </a:p>
+              <a:p>
+                <a:r>
+                  <a:rPr lang="en-US" sz="1200" dirty="0" smtClean="0">
+                    <a:solidFill>
+                      <a:schemeClr val="tx2"/>
+                    </a:solidFill>
+                  </a:rPr>
+                  <a:t>+ addr : unsigned</a:t>
+                </a:r>
+              </a:p>
+              <a:p>
+                <a:r>
+                  <a:rPr lang="en-US" sz="1200" dirty="0" smtClean="0">
+                    <a:solidFill>
+                      <a:schemeClr val="tx2"/>
+                    </a:solidFill>
+                  </a:rPr>
+                  <a:t>+ countDown : int</a:t>
+                </a:r>
+              </a:p>
+              <a:p>
+                <a:r>
+                  <a:rPr lang="en-US" sz="1200" dirty="0" smtClean="0">
+                    <a:solidFill>
+                      <a:schemeClr val="tx2"/>
+                    </a:solidFill>
+                  </a:rPr>
+                  <a:t>+ fromCache : bool</a:t>
+                </a:r>
+              </a:p>
+              <a:p>
+                <a:endParaRPr lang="en-US" sz="1200" dirty="0">
+                  <a:solidFill>
+                    <a:schemeClr val="tx2"/>
+                  </a:solidFill>
+                </a:endParaRPr>
+              </a:p>
+              <a:p>
+                <a:r>
+                  <a:rPr lang="en-US" sz="1200" dirty="0" smtClean="0">
+                    <a:solidFill>
+                      <a:schemeClr val="tx2"/>
+                    </a:solidFill>
+                  </a:rPr>
+                  <a:t>+ busRequest)_</a:t>
+                </a:r>
+              </a:p>
+              <a:p>
+                <a:r>
+                  <a:rPr lang="en-US" sz="1200" dirty="0" smtClean="0">
+                    <a:solidFill>
+                      <a:schemeClr val="tx2"/>
+                    </a:solidFill>
+                  </a:rPr>
+                  <a:t>+ busRequest(inPrIndex : int, inAddr : unsigned, inFromCache : bool)</a:t>
+                </a:r>
+              </a:p>
+              <a:p>
+                <a:endParaRPr lang="en-US" sz="1200" dirty="0">
+                  <a:solidFill>
+                    <a:schemeClr val="tx2"/>
+                  </a:solidFill>
+                </a:endParaRPr>
+              </a:p>
+              <a:p>
+                <a:endParaRPr lang="en-US" sz="1200" dirty="0" smtClean="0">
+                  <a:solidFill>
+                    <a:schemeClr val="tx2"/>
+                  </a:solidFill>
+                </a:endParaRPr>
+              </a:p>
+            </p:txBody>
+          </p:sp>
+          <p:cxnSp>
+            <p:nvCxnSpPr>
+              <p:cNvPr id="51" name="Straight Connector 50"/>
+              <p:cNvCxnSpPr/>
+              <p:nvPr/>
+            </p:nvCxnSpPr>
+            <p:spPr>
+              <a:xfrm>
+                <a:off x="6857897" y="1695839"/>
+                <a:ext cx="2199793" cy="0"/>
+              </a:xfrm>
+              <a:prstGeom prst="line">
+                <a:avLst/>
+              </a:prstGeom>
+              <a:ln w="28575" cmpd="sng">
                 <a:solidFill>
                   <a:schemeClr val="tx2"/>
                 </a:solidFill>
-              </a:endParaRPr>
-            </a:p>
-            <a:p>
-              <a:r>
-                <a:rPr lang="en-US" sz="1200" dirty="0" smtClean="0">
-                  <a:solidFill>
-                    <a:schemeClr val="tx2"/>
-                  </a:solidFill>
-                </a:rPr>
-                <a:t>+ instrType : int</a:t>
-              </a:r>
-              <a:endParaRPr lang="en-US" sz="1200" dirty="0">
+              </a:ln>
+              <a:effectLst/>
+            </p:spPr>
+            <p:style>
+              <a:lnRef idx="2">
+                <a:schemeClr val="accent1"/>
+              </a:lnRef>
+              <a:fillRef idx="0">
+                <a:schemeClr val="accent1"/>
+              </a:fillRef>
+              <a:effectRef idx="1">
+                <a:schemeClr val="accent1"/>
+              </a:effectRef>
+              <a:fontRef idx="minor">
+                <a:schemeClr val="tx1"/>
+              </a:fontRef>
+            </p:style>
+          </p:cxnSp>
+          <p:cxnSp>
+            <p:nvCxnSpPr>
+              <p:cNvPr id="52" name="Straight Connector 51"/>
+              <p:cNvCxnSpPr/>
+              <p:nvPr/>
+            </p:nvCxnSpPr>
+            <p:spPr>
+              <a:xfrm>
+                <a:off x="6859185" y="2872020"/>
+                <a:ext cx="2198505" cy="0"/>
+              </a:xfrm>
+              <a:prstGeom prst="line">
+                <a:avLst/>
+              </a:prstGeom>
+              <a:ln w="28575" cmpd="sng">
                 <a:solidFill>
                   <a:schemeClr val="tx2"/>
                 </a:solidFill>
-              </a:endParaRPr>
-            </a:p>
-            <a:p>
-              <a:r>
-                <a:rPr lang="en-US" sz="1200" dirty="0" smtClean="0">
-                  <a:solidFill>
-                    <a:schemeClr val="tx2"/>
-                  </a:solidFill>
-                </a:rPr>
-                <a:t>+ addr : unsigned</a:t>
-              </a:r>
-            </a:p>
-            <a:p>
-              <a:endParaRPr lang="en-US" sz="1200" dirty="0">
-                <a:solidFill>
-                  <a:schemeClr val="tx2"/>
-                </a:solidFill>
-              </a:endParaRPr>
-            </a:p>
-            <a:p>
-              <a:r>
-                <a:rPr lang="en-US" sz="1200" dirty="0" smtClean="0">
-                  <a:solidFill>
-                    <a:schemeClr val="tx2"/>
-                  </a:solidFill>
-                </a:rPr>
-                <a:t>+ instruction()</a:t>
-              </a:r>
-            </a:p>
-          </p:txBody>
-        </p:sp>
-        <p:cxnSp>
-          <p:nvCxnSpPr>
-            <p:cNvPr id="47" name="Straight Connector 46"/>
-            <p:cNvCxnSpPr/>
-            <p:nvPr/>
-          </p:nvCxnSpPr>
-          <p:spPr>
-            <a:xfrm>
-              <a:off x="6857897" y="1863170"/>
-              <a:ext cx="2199793" cy="0"/>
-            </a:xfrm>
-            <a:prstGeom prst="line">
-              <a:avLst/>
-            </a:prstGeom>
-            <a:ln w="28575" cmpd="sng">
-              <a:solidFill>
-                <a:schemeClr val="tx2"/>
-              </a:solidFill>
-            </a:ln>
-            <a:effectLst/>
-          </p:spPr>
-          <p:style>
-            <a:lnRef idx="2">
-              <a:schemeClr val="accent1"/>
-            </a:lnRef>
-            <a:fillRef idx="0">
-              <a:schemeClr val="accent1"/>
-            </a:fillRef>
-            <a:effectRef idx="1">
-              <a:schemeClr val="accent1"/>
-            </a:effectRef>
-            <a:fontRef idx="minor">
-              <a:schemeClr val="tx1"/>
-            </a:fontRef>
-          </p:style>
-        </p:cxnSp>
-        <p:cxnSp>
-          <p:nvCxnSpPr>
-            <p:cNvPr id="48" name="Straight Connector 47"/>
-            <p:cNvCxnSpPr/>
-            <p:nvPr/>
-          </p:nvCxnSpPr>
-          <p:spPr>
-            <a:xfrm>
-              <a:off x="6859185" y="3062592"/>
-              <a:ext cx="2198505" cy="0"/>
-            </a:xfrm>
-            <a:prstGeom prst="line">
-              <a:avLst/>
-            </a:prstGeom>
-            <a:ln w="28575" cmpd="sng">
-              <a:solidFill>
-                <a:schemeClr val="tx2"/>
-              </a:solidFill>
-            </a:ln>
-            <a:effectLst/>
-          </p:spPr>
-          <p:style>
-            <a:lnRef idx="2">
-              <a:schemeClr val="accent1"/>
-            </a:lnRef>
-            <a:fillRef idx="0">
-              <a:schemeClr val="accent1"/>
-            </a:fillRef>
-            <a:effectRef idx="1">
-              <a:schemeClr val="accent1"/>
-            </a:effectRef>
-            <a:fontRef idx="minor">
-              <a:schemeClr val="tx1"/>
-            </a:fontRef>
-          </p:style>
-        </p:cxnSp>
-      </p:grpSp>
-      <p:grpSp>
-        <p:nvGrpSpPr>
-          <p:cNvPr id="49" name="Group 48"/>
-          <p:cNvGrpSpPr/>
-          <p:nvPr/>
-        </p:nvGrpSpPr>
-        <p:grpSpPr>
-          <a:xfrm>
-            <a:off x="5516769" y="1630068"/>
-            <a:ext cx="2700877" cy="1964091"/>
-            <a:chOff x="6857897" y="1247167"/>
-            <a:chExt cx="2199795" cy="2494339"/>
-          </a:xfrm>
-        </p:grpSpPr>
-        <p:sp>
-          <p:nvSpPr>
-            <p:cNvPr id="50" name="Rectangle 49"/>
-            <p:cNvSpPr/>
-            <p:nvPr/>
-          </p:nvSpPr>
-          <p:spPr>
-            <a:xfrm>
-              <a:off x="6861074" y="1247167"/>
-              <a:ext cx="2196618" cy="2494339"/>
-            </a:xfrm>
-            <a:prstGeom prst="rect">
-              <a:avLst/>
-            </a:prstGeom>
-            <a:noFill/>
-            <a:ln w="28575" cmpd="sng">
-              <a:solidFill>
-                <a:schemeClr val="tx2"/>
-              </a:solidFill>
-            </a:ln>
-            <a:effectLst/>
-          </p:spPr>
-          <p:style>
-            <a:lnRef idx="1">
-              <a:schemeClr val="accent1"/>
-            </a:lnRef>
-            <a:fillRef idx="3">
-              <a:schemeClr val="accent1"/>
-            </a:fillRef>
-            <a:effectRef idx="2">
-              <a:schemeClr val="accent1"/>
-            </a:effectRef>
-            <a:fontRef idx="minor">
-              <a:schemeClr val="lt1"/>
-            </a:fontRef>
-          </p:style>
-          <p:txBody>
-            <a:bodyPr rtlCol="0" anchor="t"/>
-            <a:lstStyle/>
-            <a:p>
-              <a:pPr algn="ctr"/>
-              <a:r>
-                <a:rPr lang="en-US" sz="1200" b="1" dirty="0" smtClean="0">
-                  <a:solidFill>
-                    <a:schemeClr val="tx2"/>
-                  </a:solidFill>
-                </a:rPr>
-                <a:t>busRequest</a:t>
-              </a:r>
-            </a:p>
-            <a:p>
-              <a:pPr algn="ctr"/>
-              <a:endParaRPr lang="en-US" sz="1200" dirty="0">
-                <a:solidFill>
-                  <a:schemeClr val="tx2"/>
-                </a:solidFill>
-              </a:endParaRPr>
-            </a:p>
-            <a:p>
-              <a:r>
-                <a:rPr lang="en-US" sz="1200" dirty="0" smtClean="0">
-                  <a:solidFill>
-                    <a:schemeClr val="tx2"/>
-                  </a:solidFill>
-                </a:rPr>
-                <a:t>+ prIndex : int</a:t>
-              </a:r>
-            </a:p>
-            <a:p>
-              <a:r>
-                <a:rPr lang="en-US" sz="1200" dirty="0" smtClean="0">
-                  <a:solidFill>
-                    <a:schemeClr val="tx2"/>
-                  </a:solidFill>
-                </a:rPr>
-                <a:t>+ addr : unsigned</a:t>
-              </a:r>
-            </a:p>
-            <a:p>
-              <a:r>
-                <a:rPr lang="en-US" sz="1200" dirty="0" smtClean="0">
-                  <a:solidFill>
-                    <a:schemeClr val="tx2"/>
-                  </a:solidFill>
-                </a:rPr>
-                <a:t>+ countDown : int</a:t>
-              </a:r>
-            </a:p>
-            <a:p>
-              <a:r>
-                <a:rPr lang="en-US" sz="1200" dirty="0" smtClean="0">
-                  <a:solidFill>
-                    <a:schemeClr val="tx2"/>
-                  </a:solidFill>
-                </a:rPr>
-                <a:t>+ fromCache : bool</a:t>
-              </a:r>
-            </a:p>
-            <a:p>
-              <a:endParaRPr lang="en-US" sz="1200" dirty="0">
-                <a:solidFill>
-                  <a:schemeClr val="tx2"/>
-                </a:solidFill>
-              </a:endParaRPr>
-            </a:p>
-            <a:p>
-              <a:r>
-                <a:rPr lang="en-US" sz="1200" dirty="0" smtClean="0">
-                  <a:solidFill>
-                    <a:schemeClr val="tx2"/>
-                  </a:solidFill>
-                </a:rPr>
-                <a:t>+ busRequest)_</a:t>
-              </a:r>
-            </a:p>
-            <a:p>
-              <a:r>
-                <a:rPr lang="en-US" sz="1200" dirty="0" smtClean="0">
-                  <a:solidFill>
-                    <a:schemeClr val="tx2"/>
-                  </a:solidFill>
-                </a:rPr>
-                <a:t>+ busRequest(inPrIndex : int, inAddr : unsigned, inFromCache : bool)</a:t>
-              </a:r>
-            </a:p>
-            <a:p>
-              <a:endParaRPr lang="en-US" sz="1200" dirty="0">
-                <a:solidFill>
-                  <a:schemeClr val="tx2"/>
-                </a:solidFill>
-              </a:endParaRPr>
-            </a:p>
-            <a:p>
-              <a:endParaRPr lang="en-US" sz="1200" dirty="0" smtClean="0">
-                <a:solidFill>
-                  <a:schemeClr val="tx2"/>
-                </a:solidFill>
-              </a:endParaRPr>
-            </a:p>
-          </p:txBody>
-        </p:sp>
-        <p:cxnSp>
-          <p:nvCxnSpPr>
-            <p:cNvPr id="51" name="Straight Connector 50"/>
-            <p:cNvCxnSpPr/>
-            <p:nvPr/>
-          </p:nvCxnSpPr>
-          <p:spPr>
-            <a:xfrm>
-              <a:off x="6857897" y="1695839"/>
-              <a:ext cx="2199793" cy="0"/>
-            </a:xfrm>
-            <a:prstGeom prst="line">
-              <a:avLst/>
-            </a:prstGeom>
-            <a:ln w="28575" cmpd="sng">
-              <a:solidFill>
-                <a:schemeClr val="tx2"/>
-              </a:solidFill>
-            </a:ln>
-            <a:effectLst/>
-          </p:spPr>
-          <p:style>
-            <a:lnRef idx="2">
-              <a:schemeClr val="accent1"/>
-            </a:lnRef>
-            <a:fillRef idx="0">
-              <a:schemeClr val="accent1"/>
-            </a:fillRef>
-            <a:effectRef idx="1">
-              <a:schemeClr val="accent1"/>
-            </a:effectRef>
-            <a:fontRef idx="minor">
-              <a:schemeClr val="tx1"/>
-            </a:fontRef>
-          </p:style>
-        </p:cxnSp>
-        <p:cxnSp>
-          <p:nvCxnSpPr>
-            <p:cNvPr id="52" name="Straight Connector 51"/>
-            <p:cNvCxnSpPr/>
-            <p:nvPr/>
-          </p:nvCxnSpPr>
-          <p:spPr>
-            <a:xfrm>
-              <a:off x="6859185" y="2872020"/>
-              <a:ext cx="2198505" cy="0"/>
-            </a:xfrm>
-            <a:prstGeom prst="line">
-              <a:avLst/>
-            </a:prstGeom>
-            <a:ln w="28575" cmpd="sng">
-              <a:solidFill>
-                <a:schemeClr val="tx2"/>
-              </a:solidFill>
-            </a:ln>
-            <a:effectLst/>
-          </p:spPr>
-          <p:style>
-            <a:lnRef idx="2">
-              <a:schemeClr val="accent1"/>
-            </a:lnRef>
-            <a:fillRef idx="0">
-              <a:schemeClr val="accent1"/>
-            </a:fillRef>
-            <a:effectRef idx="1">
-              <a:schemeClr val="accent1"/>
-            </a:effectRef>
-            <a:fontRef idx="minor">
-              <a:schemeClr val="tx1"/>
-            </a:fontRef>
-          </p:style>
-        </p:cxnSp>
+              </a:ln>
+              <a:effectLst/>
+            </p:spPr>
+            <p:style>
+              <a:lnRef idx="2">
+                <a:schemeClr val="accent1"/>
+              </a:lnRef>
+              <a:fillRef idx="0">
+                <a:schemeClr val="accent1"/>
+              </a:fillRef>
+              <a:effectRef idx="1">
+                <a:schemeClr val="accent1"/>
+              </a:effectRef>
+              <a:fontRef idx="minor">
+                <a:schemeClr val="tx1"/>
+              </a:fontRef>
+            </p:style>
+          </p:cxnSp>
+        </p:grpSp>
       </p:grpSp>
     </p:spTree>
     <p:extLst>
@@ -4762,7 +4760,7 @@
       </p:grpSpPr>
       <p:grpSp>
         <p:nvGrpSpPr>
-          <p:cNvPr id="234" name="Group 233"/>
+          <p:cNvPr id="2" name="Group 1"/>
           <p:cNvGrpSpPr/>
           <p:nvPr/>
         </p:nvGrpSpPr>
@@ -4789,7 +4787,7 @@
               <a:avLst/>
             </a:prstGeom>
             <a:solidFill>
-              <a:schemeClr val="tx2"/>
+              <a:srgbClr val="C0504D"/>
             </a:solidFill>
             <a:ln>
               <a:noFill/>
@@ -4889,7 +4887,10 @@
               <a:avLst/>
             </a:prstGeom>
             <a:solidFill>
-              <a:srgbClr val="1F497D"/>
+              <a:schemeClr val="tx2">
+                <a:lumMod val="60000"/>
+                <a:lumOff val="40000"/>
+              </a:schemeClr>
             </a:solidFill>
             <a:ln>
               <a:noFill/>
@@ -5018,7 +5019,7 @@
               <a:avLst/>
             </a:prstGeom>
             <a:solidFill>
-              <a:schemeClr val="tx2"/>
+              <a:srgbClr val="C0504D"/>
             </a:solidFill>
             <a:ln>
               <a:noFill/>
@@ -5198,7 +5199,10 @@
               <a:avLst/>
             </a:prstGeom>
             <a:solidFill>
-              <a:srgbClr val="1F497D"/>
+              <a:schemeClr val="tx2">
+                <a:lumMod val="60000"/>
+                <a:lumOff val="40000"/>
+              </a:schemeClr>
             </a:solidFill>
             <a:ln>
               <a:noFill/>
@@ -5287,7 +5291,7 @@
               <a:avLst/>
             </a:prstGeom>
             <a:solidFill>
-              <a:schemeClr val="tx2"/>
+              <a:srgbClr val="C0504D"/>
             </a:solidFill>
             <a:ln>
               <a:noFill/>
@@ -5467,7 +5471,10 @@
               <a:avLst/>
             </a:prstGeom>
             <a:solidFill>
-              <a:srgbClr val="1F497D"/>
+              <a:schemeClr val="tx2">
+                <a:lumMod val="60000"/>
+                <a:lumOff val="40000"/>
+              </a:schemeClr>
             </a:solidFill>
             <a:ln>
               <a:noFill/>
@@ -5694,7 +5701,7 @@
               <a:avLst/>
             </a:prstGeom>
             <a:solidFill>
-              <a:schemeClr val="tx2"/>
+              <a:srgbClr val="C0504D"/>
             </a:solidFill>
             <a:ln>
               <a:noFill/>
@@ -6230,7 +6237,10 @@
               <a:avLst/>
             </a:prstGeom>
             <a:solidFill>
-              <a:srgbClr val="1F497D"/>
+              <a:schemeClr val="tx2">
+                <a:lumMod val="60000"/>
+                <a:lumOff val="40000"/>
+              </a:schemeClr>
             </a:solidFill>
             <a:ln>
               <a:noFill/>
@@ -6492,7 +6502,10 @@
               <a:avLst/>
             </a:prstGeom>
             <a:solidFill>
-              <a:srgbClr val="1F497D"/>
+              <a:schemeClr val="tx2">
+                <a:lumMod val="60000"/>
+                <a:lumOff val="40000"/>
+              </a:schemeClr>
             </a:solidFill>
             <a:ln>
               <a:noFill/>
@@ -6590,7 +6603,10 @@
               <a:avLst/>
             </a:prstGeom>
             <a:solidFill>
-              <a:srgbClr val="1F497D"/>
+              <a:schemeClr val="tx2">
+                <a:lumMod val="60000"/>
+                <a:lumOff val="40000"/>
+              </a:schemeClr>
             </a:solidFill>
             <a:ln>
               <a:noFill/>
@@ -6719,7 +6735,10 @@
               <a:avLst/>
             </a:prstGeom>
             <a:solidFill>
-              <a:srgbClr val="1F497D"/>
+              <a:schemeClr val="tx2">
+                <a:lumMod val="60000"/>
+                <a:lumOff val="40000"/>
+              </a:schemeClr>
             </a:solidFill>
             <a:ln>
               <a:noFill/>
@@ -7123,7 +7142,10 @@
               <a:avLst/>
             </a:prstGeom>
             <a:solidFill>
-              <a:srgbClr val="1F497D"/>
+              <a:schemeClr val="tx2">
+                <a:lumMod val="60000"/>
+                <a:lumOff val="40000"/>
+              </a:schemeClr>
             </a:solidFill>
             <a:ln>
               <a:noFill/>
@@ -7473,7 +7495,10 @@
               <a:avLst/>
             </a:prstGeom>
             <a:solidFill>
-              <a:srgbClr val="1F497D"/>
+              <a:schemeClr val="tx2">
+                <a:lumMod val="60000"/>
+                <a:lumOff val="40000"/>
+              </a:schemeClr>
             </a:solidFill>
             <a:ln>
               <a:noFill/>

</xml_diff>